<commit_message>
Updating DNP 2020 talk
</commit_message>
<xml_diff>
--- a/Presentations/DNP_October2020/tropiano_dnp_october2020.pptx
+++ b/Presentations/DNP_October2020/tropiano_dnp_october2020.pptx
@@ -225,7 +225,7 @@
             <a:fld id="{0A84EC41-ECD6-7F4B-B508-87B276563826}" type="datetimeFigureOut">
               <a:rPr lang="en-US" smtClean="0"/>
               <a:pPr/>
-              <a:t>10/26/20</a:t>
+              <a:t>10/28/20</a:t>
             </a:fld>
             <a:endParaRPr lang="en-US" dirty="0"/>
           </a:p>
@@ -586,6 +586,302 @@
 </p:notes>
 </file>
 
+<file path=ppt/notesSlides/notesSlide10.xml><?xml version="1.0" encoding="utf-8"?>
+<p:notes xmlns:a="http://schemas.openxmlformats.org/drawingml/2006/main" xmlns:r="http://schemas.openxmlformats.org/officeDocument/2006/relationships" xmlns:p="http://schemas.openxmlformats.org/presentationml/2006/main">
+  <p:cSld>
+    <p:spTree>
+      <p:nvGrpSpPr>
+        <p:cNvPr id="1" name=""/>
+        <p:cNvGrpSpPr/>
+        <p:nvPr/>
+      </p:nvGrpSpPr>
+      <p:grpSpPr>
+        <a:xfrm>
+          <a:off x="0" y="0"/>
+          <a:ext cx="0" cy="0"/>
+          <a:chOff x="0" y="0"/>
+          <a:chExt cx="0" cy="0"/>
+        </a:xfrm>
+      </p:grpSpPr>
+      <p:sp>
+        <p:nvSpPr>
+          <p:cNvPr id="2" name="Slide Image Placeholder 1"/>
+          <p:cNvSpPr>
+            <a:spLocks noGrp="1" noRot="1" noChangeAspect="1"/>
+          </p:cNvSpPr>
+          <p:nvPr>
+            <p:ph type="sldImg"/>
+          </p:nvPr>
+        </p:nvSpPr>
+        <p:spPr/>
+      </p:sp>
+      <p:sp>
+        <p:nvSpPr>
+          <p:cNvPr id="3" name="Notes Placeholder 2"/>
+          <p:cNvSpPr>
+            <a:spLocks noGrp="1"/>
+          </p:cNvSpPr>
+          <p:nvPr>
+            <p:ph type="body" idx="1"/>
+          </p:nvPr>
+        </p:nvSpPr>
+        <p:spPr/>
+        <p:txBody>
+          <a:bodyPr/>
+          <a:lstStyle/>
+          <a:p>
+            <a:pPr marL="0" marR="0" lvl="0" indent="0" algn="l" defTabSz="914400" rtl="0" eaLnBrk="1" fontAlgn="auto" latinLnBrk="0" hangingPunct="1">
+              <a:lnSpc>
+                <a:spcPct val="100000"/>
+              </a:lnSpc>
+              <a:spcBef>
+                <a:spcPts val="0"/>
+              </a:spcBef>
+              <a:spcAft>
+                <a:spcPts val="0"/>
+              </a:spcAft>
+              <a:buClrTx/>
+              <a:buSzTx/>
+              <a:buFontTx/>
+              <a:buNone/>
+              <a:tabLst/>
+              <a:defRPr/>
+            </a:pPr>
+            <a:r>
+              <a:rPr lang="en-US" dirty="0"/>
+              <a:t>Transition to next slide: so what happens in interpreting experimental results? Explain figures. np/p cross section compared to pp/p for electron-carbon scattering. At high RG resolution, tensor force of NN interaction is used to explain dominance of np over pp pairs, because the tensor force requires spin triplet pairs and proton-proton are always spin singlets. But in low RG resolution, tensor force is suppressed. So the SRC physics must be moved to the operator! Leads into “consider the ratio 3S1 over 1S0 momentum projection operators</a:t>
+            </a:r>
+            <a:r>
+              <a:rPr lang="en-US" sz="1200" b="0" i="0" kern="1200" dirty="0">
+                <a:solidFill>
+                  <a:schemeClr val="tx1"/>
+                </a:solidFill>
+                <a:effectLst/>
+                <a:latin typeface="Arial" panose="020B0604020202020204" pitchFamily="34" charset="0"/>
+                <a:ea typeface="+mn-ea"/>
+                <a:cs typeface="+mn-cs"/>
+              </a:rPr>
+              <a:t>.”</a:t>
+            </a:r>
+            <a:endParaRPr lang="en-US" dirty="0"/>
+          </a:p>
+        </p:txBody>
+      </p:sp>
+      <p:sp>
+        <p:nvSpPr>
+          <p:cNvPr id="4" name="Slide Number Placeholder 3"/>
+          <p:cNvSpPr>
+            <a:spLocks noGrp="1"/>
+          </p:cNvSpPr>
+          <p:nvPr>
+            <p:ph type="sldNum" sz="quarter" idx="5"/>
+          </p:nvPr>
+        </p:nvSpPr>
+        <p:spPr/>
+        <p:txBody>
+          <a:bodyPr/>
+          <a:lstStyle/>
+          <a:p>
+            <a:fld id="{1B1E5513-1272-A44C-AF68-F8AE51C323EB}" type="slidenum">
+              <a:rPr lang="en-US" smtClean="0"/>
+              <a:pPr/>
+              <a:t>20</a:t>
+            </a:fld>
+            <a:endParaRPr lang="en-US" dirty="0"/>
+          </a:p>
+        </p:txBody>
+      </p:sp>
+    </p:spTree>
+    <p:extLst>
+      <p:ext uri="{BB962C8B-B14F-4D97-AF65-F5344CB8AC3E}">
+        <p14:creationId xmlns:p14="http://schemas.microsoft.com/office/powerpoint/2010/main" val="3461606560"/>
+      </p:ext>
+    </p:extLst>
+  </p:cSld>
+  <p:clrMapOvr>
+    <a:masterClrMapping/>
+  </p:clrMapOvr>
+</p:notes>
+</file>
+
+<file path=ppt/notesSlides/notesSlide11.xml><?xml version="1.0" encoding="utf-8"?>
+<p:notes xmlns:a="http://schemas.openxmlformats.org/drawingml/2006/main" xmlns:r="http://schemas.openxmlformats.org/officeDocument/2006/relationships" xmlns:p="http://schemas.openxmlformats.org/presentationml/2006/main">
+  <p:cSld>
+    <p:spTree>
+      <p:nvGrpSpPr>
+        <p:cNvPr id="1" name=""/>
+        <p:cNvGrpSpPr/>
+        <p:nvPr/>
+      </p:nvGrpSpPr>
+      <p:grpSpPr>
+        <a:xfrm>
+          <a:off x="0" y="0"/>
+          <a:ext cx="0" cy="0"/>
+          <a:chOff x="0" y="0"/>
+          <a:chExt cx="0" cy="0"/>
+        </a:xfrm>
+      </p:grpSpPr>
+      <p:sp>
+        <p:nvSpPr>
+          <p:cNvPr id="2" name="Slide Image Placeholder 1"/>
+          <p:cNvSpPr>
+            <a:spLocks noGrp="1" noRot="1" noChangeAspect="1"/>
+          </p:cNvSpPr>
+          <p:nvPr>
+            <p:ph type="sldImg"/>
+          </p:nvPr>
+        </p:nvSpPr>
+        <p:spPr/>
+      </p:sp>
+      <p:sp>
+        <p:nvSpPr>
+          <p:cNvPr id="3" name="Notes Placeholder 2"/>
+          <p:cNvSpPr>
+            <a:spLocks noGrp="1"/>
+          </p:cNvSpPr>
+          <p:nvPr>
+            <p:ph type="body" idx="1"/>
+          </p:nvPr>
+        </p:nvSpPr>
+        <p:spPr/>
+        <p:txBody>
+          <a:bodyPr/>
+          <a:lstStyle/>
+          <a:p>
+            <a:endParaRPr lang="en-US" sz="1200" b="0" i="0" kern="1200" dirty="0">
+              <a:solidFill>
+                <a:schemeClr val="tx1"/>
+              </a:solidFill>
+              <a:effectLst/>
+              <a:latin typeface="Arial" panose="020B0604020202020204" pitchFamily="34" charset="0"/>
+              <a:ea typeface="+mn-ea"/>
+              <a:cs typeface="+mn-cs"/>
+            </a:endParaRPr>
+          </a:p>
+        </p:txBody>
+      </p:sp>
+      <p:sp>
+        <p:nvSpPr>
+          <p:cNvPr id="4" name="Slide Number Placeholder 3"/>
+          <p:cNvSpPr>
+            <a:spLocks noGrp="1"/>
+          </p:cNvSpPr>
+          <p:nvPr>
+            <p:ph type="sldNum" sz="quarter" idx="5"/>
+          </p:nvPr>
+        </p:nvSpPr>
+        <p:spPr/>
+        <p:txBody>
+          <a:bodyPr/>
+          <a:lstStyle/>
+          <a:p>
+            <a:fld id="{1B1E5513-1272-A44C-AF68-F8AE51C323EB}" type="slidenum">
+              <a:rPr lang="en-US" smtClean="0"/>
+              <a:pPr/>
+              <a:t>21</a:t>
+            </a:fld>
+            <a:endParaRPr lang="en-US" dirty="0"/>
+          </a:p>
+        </p:txBody>
+      </p:sp>
+    </p:spTree>
+    <p:extLst>
+      <p:ext uri="{BB962C8B-B14F-4D97-AF65-F5344CB8AC3E}">
+        <p14:creationId xmlns:p14="http://schemas.microsoft.com/office/powerpoint/2010/main" val="762877021"/>
+      </p:ext>
+    </p:extLst>
+  </p:cSld>
+  <p:clrMapOvr>
+    <a:masterClrMapping/>
+  </p:clrMapOvr>
+</p:notes>
+</file>
+
+<file path=ppt/notesSlides/notesSlide12.xml><?xml version="1.0" encoding="utf-8"?>
+<p:notes xmlns:a="http://schemas.openxmlformats.org/drawingml/2006/main" xmlns:r="http://schemas.openxmlformats.org/officeDocument/2006/relationships" xmlns:p="http://schemas.openxmlformats.org/presentationml/2006/main">
+  <p:cSld>
+    <p:spTree>
+      <p:nvGrpSpPr>
+        <p:cNvPr id="1" name=""/>
+        <p:cNvGrpSpPr/>
+        <p:nvPr/>
+      </p:nvGrpSpPr>
+      <p:grpSpPr>
+        <a:xfrm>
+          <a:off x="0" y="0"/>
+          <a:ext cx="0" cy="0"/>
+          <a:chOff x="0" y="0"/>
+          <a:chExt cx="0" cy="0"/>
+        </a:xfrm>
+      </p:grpSpPr>
+      <p:sp>
+        <p:nvSpPr>
+          <p:cNvPr id="2" name="Slide Image Placeholder 1"/>
+          <p:cNvSpPr>
+            <a:spLocks noGrp="1" noRot="1" noChangeAspect="1"/>
+          </p:cNvSpPr>
+          <p:nvPr>
+            <p:ph type="sldImg"/>
+          </p:nvPr>
+        </p:nvSpPr>
+        <p:spPr/>
+      </p:sp>
+      <p:sp>
+        <p:nvSpPr>
+          <p:cNvPr id="3" name="Notes Placeholder 2"/>
+          <p:cNvSpPr>
+            <a:spLocks noGrp="1"/>
+          </p:cNvSpPr>
+          <p:nvPr>
+            <p:ph type="body" idx="1"/>
+          </p:nvPr>
+        </p:nvSpPr>
+        <p:spPr/>
+        <p:txBody>
+          <a:bodyPr/>
+          <a:lstStyle/>
+          <a:p>
+            <a:endParaRPr lang="en-US" dirty="0"/>
+          </a:p>
+        </p:txBody>
+      </p:sp>
+      <p:sp>
+        <p:nvSpPr>
+          <p:cNvPr id="4" name="Slide Number Placeholder 3"/>
+          <p:cNvSpPr>
+            <a:spLocks noGrp="1"/>
+          </p:cNvSpPr>
+          <p:nvPr>
+            <p:ph type="sldNum" sz="quarter" idx="5"/>
+          </p:nvPr>
+        </p:nvSpPr>
+        <p:spPr/>
+        <p:txBody>
+          <a:bodyPr/>
+          <a:lstStyle/>
+          <a:p>
+            <a:fld id="{1B1E5513-1272-A44C-AF68-F8AE51C323EB}" type="slidenum">
+              <a:rPr lang="en-US" smtClean="0"/>
+              <a:pPr/>
+              <a:t>24</a:t>
+            </a:fld>
+            <a:endParaRPr lang="en-US" dirty="0"/>
+          </a:p>
+        </p:txBody>
+      </p:sp>
+    </p:spTree>
+    <p:extLst>
+      <p:ext uri="{BB962C8B-B14F-4D97-AF65-F5344CB8AC3E}">
+        <p14:creationId xmlns:p14="http://schemas.microsoft.com/office/powerpoint/2010/main" val="3778553153"/>
+      </p:ext>
+    </p:extLst>
+  </p:cSld>
+  <p:clrMapOvr>
+    <a:masterClrMapping/>
+  </p:clrMapOvr>
+</p:notes>
+</file>
+
 <file path=ppt/notesSlides/notesSlide2.xml><?xml version="1.0" encoding="utf-8"?>
 <p:notes xmlns:a="http://schemas.openxmlformats.org/drawingml/2006/main" xmlns:r="http://schemas.openxmlformats.org/officeDocument/2006/relationships" xmlns:p="http://schemas.openxmlformats.org/presentationml/2006/main">
   <p:cSld>
@@ -630,113 +926,10 @@
           <a:bodyPr/>
           <a:lstStyle/>
           <a:p>
-            <a:br>
-              <a:rPr lang="en-US" sz="1200" b="0" i="0" kern="1200" dirty="0">
-                <a:solidFill>
-                  <a:schemeClr val="tx1"/>
-                </a:solidFill>
-                <a:effectLst/>
-                <a:latin typeface="Arial" panose="020B0604020202020204" pitchFamily="34" charset="0"/>
-                <a:ea typeface="+mn-ea"/>
-                <a:cs typeface="+mn-cs"/>
-              </a:rPr>
-            </a:br>
-            <a:endParaRPr lang="en-US" sz="1200" b="0" i="0" kern="1200" dirty="0">
-              <a:solidFill>
-                <a:schemeClr val="tx1"/>
-              </a:solidFill>
-              <a:effectLst/>
-              <a:latin typeface="Arial" panose="020B0604020202020204" pitchFamily="34" charset="0"/>
-              <a:ea typeface="+mn-ea"/>
-              <a:cs typeface="+mn-cs"/>
-            </a:endParaRPr>
-          </a:p>
-          <a:p>
-            <a:r>
-              <a:rPr lang="en-US" sz="1200" b="0" i="0" kern="1200" dirty="0">
-                <a:solidFill>
-                  <a:schemeClr val="tx1"/>
-                </a:solidFill>
-                <a:effectLst/>
-                <a:latin typeface="Arial" panose="020B0604020202020204" pitchFamily="34" charset="0"/>
-                <a:ea typeface="+mn-ea"/>
-                <a:cs typeface="+mn-cs"/>
-              </a:rPr>
-              <a:t>I. </a:t>
-            </a:r>
-            <a:r>
-              <a:rPr lang="en-US" sz="1200" b="0" i="0" kern="1200" dirty="0" err="1">
-                <a:solidFill>
-                  <a:schemeClr val="tx1"/>
-                </a:solidFill>
-                <a:effectLst/>
-                <a:latin typeface="Arial" panose="020B0604020202020204" pitchFamily="34" charset="0"/>
-                <a:ea typeface="+mn-ea"/>
-                <a:cs typeface="+mn-cs"/>
-              </a:rPr>
-              <a:t>Koroveret</a:t>
-            </a:r>
-            <a:r>
-              <a:rPr lang="en-US" sz="1200" b="0" i="0" kern="1200" dirty="0">
-                <a:solidFill>
-                  <a:schemeClr val="tx1"/>
-                </a:solidFill>
-                <a:effectLst/>
-                <a:latin typeface="Arial" panose="020B0604020202020204" pitchFamily="34" charset="0"/>
-                <a:ea typeface="+mn-ea"/>
-                <a:cs typeface="+mn-cs"/>
-              </a:rPr>
-              <a:t> al.(CLAS), (2020), arXiv:2004.07304 [</a:t>
-            </a:r>
-            <a:r>
-              <a:rPr lang="en-US" sz="1200" b="0" i="0" kern="1200" dirty="0" err="1">
-                <a:solidFill>
-                  <a:schemeClr val="tx1"/>
-                </a:solidFill>
-                <a:effectLst/>
-                <a:latin typeface="Arial" panose="020B0604020202020204" pitchFamily="34" charset="0"/>
-                <a:ea typeface="+mn-ea"/>
-                <a:cs typeface="+mn-cs"/>
-              </a:rPr>
-              <a:t>nucl</a:t>
-            </a:r>
-            <a:r>
-              <a:rPr lang="en-US" sz="1200" b="0" i="0" kern="1200" dirty="0">
-                <a:solidFill>
-                  <a:schemeClr val="tx1"/>
-                </a:solidFill>
-                <a:effectLst/>
-                <a:latin typeface="Arial" panose="020B0604020202020204" pitchFamily="34" charset="0"/>
-                <a:ea typeface="+mn-ea"/>
-                <a:cs typeface="+mn-cs"/>
-              </a:rPr>
-              <a:t>-ex].27</a:t>
-            </a:r>
-          </a:p>
-          <a:p>
-            <a:br>
-              <a:rPr lang="en-US" sz="1200" b="0" i="0" kern="1200" dirty="0">
-                <a:solidFill>
-                  <a:schemeClr val="tx1"/>
-                </a:solidFill>
-                <a:effectLst/>
-                <a:latin typeface="Arial" panose="020B0604020202020204" pitchFamily="34" charset="0"/>
-                <a:ea typeface="+mn-ea"/>
-                <a:cs typeface="+mn-cs"/>
-              </a:rPr>
-            </a:br>
-            <a:endParaRPr lang="en-US" sz="1200" b="0" i="0" kern="1200" dirty="0">
-              <a:solidFill>
-                <a:schemeClr val="tx1"/>
-              </a:solidFill>
-              <a:effectLst/>
-              <a:latin typeface="Arial" panose="020B0604020202020204" pitchFamily="34" charset="0"/>
-              <a:ea typeface="+mn-ea"/>
-              <a:cs typeface="+mn-cs"/>
-            </a:endParaRPr>
-          </a:p>
-          <a:p>
-            <a:endParaRPr lang="en-US" dirty="0"/>
+            <a:r>
+              <a:rPr lang="en-US" dirty="0"/>
+              <a:t>Read first bullet (half)... such as in this diagram. One observes knock-out 2 high-k nucleons, with a one-body current, must mean SRC pair. Leads into third part.</a:t>
+            </a:r>
           </a:p>
         </p:txBody>
       </p:sp>
@@ -758,7 +951,7 @@
             <a:fld id="{1B1E5513-1272-A44C-AF68-F8AE51C323EB}" type="slidenum">
               <a:rPr lang="en-US" smtClean="0"/>
               <a:pPr/>
-              <a:t>19</a:t>
+              <a:t>2</a:t>
             </a:fld>
             <a:endParaRPr lang="en-US" dirty="0"/>
           </a:p>
@@ -767,7 +960,7 @@
     </p:spTree>
     <p:extLst>
       <p:ext uri="{BB962C8B-B14F-4D97-AF65-F5344CB8AC3E}">
-        <p14:creationId xmlns:p14="http://schemas.microsoft.com/office/powerpoint/2010/main" val="3611583059"/>
+        <p14:creationId xmlns:p14="http://schemas.microsoft.com/office/powerpoint/2010/main" val="2224933161"/>
       </p:ext>
     </p:extLst>
   </p:cSld>
@@ -843,7 +1036,7 @@
             <a:fld id="{1B1E5513-1272-A44C-AF68-F8AE51C323EB}" type="slidenum">
               <a:rPr lang="en-US" smtClean="0"/>
               <a:pPr/>
-              <a:t>20</a:t>
+              <a:t>3</a:t>
             </a:fld>
             <a:endParaRPr lang="en-US" dirty="0"/>
           </a:p>
@@ -852,7 +1045,7 @@
     </p:spTree>
     <p:extLst>
       <p:ext uri="{BB962C8B-B14F-4D97-AF65-F5344CB8AC3E}">
-        <p14:creationId xmlns:p14="http://schemas.microsoft.com/office/powerpoint/2010/main" val="3461606560"/>
+        <p14:creationId xmlns:p14="http://schemas.microsoft.com/office/powerpoint/2010/main" val="1253351044"/>
       </p:ext>
     </p:extLst>
   </p:cSld>
@@ -906,15 +1099,10 @@
           <a:bodyPr/>
           <a:lstStyle/>
           <a:p>
-            <a:endParaRPr lang="en-US" sz="1200" b="0" i="0" kern="1200" dirty="0">
-              <a:solidFill>
-                <a:schemeClr val="tx1"/>
-              </a:solidFill>
-              <a:effectLst/>
-              <a:latin typeface="Arial" panose="020B0604020202020204" pitchFamily="34" charset="0"/>
-              <a:ea typeface="+mn-ea"/>
-              <a:cs typeface="+mn-cs"/>
-            </a:endParaRPr>
+            <a:r>
+              <a:rPr lang="en-US" dirty="0"/>
+              <a:t>Describe the figures, then explain what the SRG is doing. This will hit both bullet points.</a:t>
+            </a:r>
           </a:p>
         </p:txBody>
       </p:sp>
@@ -936,7 +1124,7 @@
             <a:fld id="{1B1E5513-1272-A44C-AF68-F8AE51C323EB}" type="slidenum">
               <a:rPr lang="en-US" smtClean="0"/>
               <a:pPr/>
-              <a:t>21</a:t>
+              <a:t>7</a:t>
             </a:fld>
             <a:endParaRPr lang="en-US" dirty="0"/>
           </a:p>
@@ -945,7 +1133,474 @@
     </p:spTree>
     <p:extLst>
       <p:ext uri="{BB962C8B-B14F-4D97-AF65-F5344CB8AC3E}">
-        <p14:creationId xmlns:p14="http://schemas.microsoft.com/office/powerpoint/2010/main" val="762877021"/>
+        <p14:creationId xmlns:p14="http://schemas.microsoft.com/office/powerpoint/2010/main" val="137572709"/>
+      </p:ext>
+    </p:extLst>
+  </p:cSld>
+  <p:clrMapOvr>
+    <a:masterClrMapping/>
+  </p:clrMapOvr>
+</p:notes>
+</file>
+
+<file path=ppt/notesSlides/notesSlide5.xml><?xml version="1.0" encoding="utf-8"?>
+<p:notes xmlns:a="http://schemas.openxmlformats.org/drawingml/2006/main" xmlns:r="http://schemas.openxmlformats.org/officeDocument/2006/relationships" xmlns:p="http://schemas.openxmlformats.org/presentationml/2006/main">
+  <p:cSld>
+    <p:spTree>
+      <p:nvGrpSpPr>
+        <p:cNvPr id="1" name=""/>
+        <p:cNvGrpSpPr/>
+        <p:nvPr/>
+      </p:nvGrpSpPr>
+      <p:grpSpPr>
+        <a:xfrm>
+          <a:off x="0" y="0"/>
+          <a:ext cx="0" cy="0"/>
+          <a:chOff x="0" y="0"/>
+          <a:chExt cx="0" cy="0"/>
+        </a:xfrm>
+      </p:grpSpPr>
+      <p:sp>
+        <p:nvSpPr>
+          <p:cNvPr id="2" name="Slide Image Placeholder 1"/>
+          <p:cNvSpPr>
+            <a:spLocks noGrp="1" noRot="1" noChangeAspect="1"/>
+          </p:cNvSpPr>
+          <p:nvPr>
+            <p:ph type="sldImg"/>
+          </p:nvPr>
+        </p:nvSpPr>
+        <p:spPr/>
+      </p:sp>
+      <p:sp>
+        <p:nvSpPr>
+          <p:cNvPr id="3" name="Notes Placeholder 2"/>
+          <p:cNvSpPr>
+            <a:spLocks noGrp="1"/>
+          </p:cNvSpPr>
+          <p:nvPr>
+            <p:ph type="body" idx="1"/>
+          </p:nvPr>
+        </p:nvSpPr>
+        <p:spPr/>
+        <p:txBody>
+          <a:bodyPr/>
+          <a:lstStyle/>
+          <a:p>
+            <a:r>
+              <a:rPr lang="en-US" dirty="0"/>
+              <a:t>Where does the SRC physics go? Use this as transition into next slide.</a:t>
+            </a:r>
+          </a:p>
+        </p:txBody>
+      </p:sp>
+      <p:sp>
+        <p:nvSpPr>
+          <p:cNvPr id="4" name="Slide Number Placeholder 3"/>
+          <p:cNvSpPr>
+            <a:spLocks noGrp="1"/>
+          </p:cNvSpPr>
+          <p:nvPr>
+            <p:ph type="sldNum" sz="quarter" idx="5"/>
+          </p:nvPr>
+        </p:nvSpPr>
+        <p:spPr/>
+        <p:txBody>
+          <a:bodyPr/>
+          <a:lstStyle/>
+          <a:p>
+            <a:fld id="{1B1E5513-1272-A44C-AF68-F8AE51C323EB}" type="slidenum">
+              <a:rPr lang="en-US" smtClean="0"/>
+              <a:pPr/>
+              <a:t>10</a:t>
+            </a:fld>
+            <a:endParaRPr lang="en-US" dirty="0"/>
+          </a:p>
+        </p:txBody>
+      </p:sp>
+    </p:spTree>
+    <p:extLst>
+      <p:ext uri="{BB962C8B-B14F-4D97-AF65-F5344CB8AC3E}">
+        <p14:creationId xmlns:p14="http://schemas.microsoft.com/office/powerpoint/2010/main" val="2190435053"/>
+      </p:ext>
+    </p:extLst>
+  </p:cSld>
+  <p:clrMapOvr>
+    <a:masterClrMapping/>
+  </p:clrMapOvr>
+</p:notes>
+</file>
+
+<file path=ppt/notesSlides/notesSlide6.xml><?xml version="1.0" encoding="utf-8"?>
+<p:notes xmlns:a="http://schemas.openxmlformats.org/drawingml/2006/main" xmlns:r="http://schemas.openxmlformats.org/officeDocument/2006/relationships" xmlns:p="http://schemas.openxmlformats.org/presentationml/2006/main">
+  <p:cSld>
+    <p:spTree>
+      <p:nvGrpSpPr>
+        <p:cNvPr id="1" name=""/>
+        <p:cNvGrpSpPr/>
+        <p:nvPr/>
+      </p:nvGrpSpPr>
+      <p:grpSpPr>
+        <a:xfrm>
+          <a:off x="0" y="0"/>
+          <a:ext cx="0" cy="0"/>
+          <a:chOff x="0" y="0"/>
+          <a:chExt cx="0" cy="0"/>
+        </a:xfrm>
+      </p:grpSpPr>
+      <p:sp>
+        <p:nvSpPr>
+          <p:cNvPr id="2" name="Slide Image Placeholder 1"/>
+          <p:cNvSpPr>
+            <a:spLocks noGrp="1" noRot="1" noChangeAspect="1"/>
+          </p:cNvSpPr>
+          <p:nvPr>
+            <p:ph type="sldImg"/>
+          </p:nvPr>
+        </p:nvSpPr>
+        <p:spPr/>
+      </p:sp>
+      <p:sp>
+        <p:nvSpPr>
+          <p:cNvPr id="3" name="Notes Placeholder 2"/>
+          <p:cNvSpPr>
+            <a:spLocks noGrp="1"/>
+          </p:cNvSpPr>
+          <p:nvPr>
+            <p:ph type="body" idx="1"/>
+          </p:nvPr>
+        </p:nvSpPr>
+        <p:spPr/>
+        <p:txBody>
+          <a:bodyPr/>
+          <a:lstStyle/>
+          <a:p>
+            <a:r>
+              <a:rPr lang="en-US" dirty="0"/>
+              <a:t>SRC physics from wave function goes to the operator. Use this as transition.</a:t>
+            </a:r>
+          </a:p>
+        </p:txBody>
+      </p:sp>
+      <p:sp>
+        <p:nvSpPr>
+          <p:cNvPr id="4" name="Slide Number Placeholder 3"/>
+          <p:cNvSpPr>
+            <a:spLocks noGrp="1"/>
+          </p:cNvSpPr>
+          <p:nvPr>
+            <p:ph type="sldNum" sz="quarter" idx="5"/>
+          </p:nvPr>
+        </p:nvSpPr>
+        <p:spPr/>
+        <p:txBody>
+          <a:bodyPr/>
+          <a:lstStyle/>
+          <a:p>
+            <a:fld id="{1B1E5513-1272-A44C-AF68-F8AE51C323EB}" type="slidenum">
+              <a:rPr lang="en-US" smtClean="0"/>
+              <a:pPr/>
+              <a:t>11</a:t>
+            </a:fld>
+            <a:endParaRPr lang="en-US" dirty="0"/>
+          </a:p>
+        </p:txBody>
+      </p:sp>
+    </p:spTree>
+    <p:extLst>
+      <p:ext uri="{BB962C8B-B14F-4D97-AF65-F5344CB8AC3E}">
+        <p14:creationId xmlns:p14="http://schemas.microsoft.com/office/powerpoint/2010/main" val="3064228867"/>
+      </p:ext>
+    </p:extLst>
+  </p:cSld>
+  <p:clrMapOvr>
+    <a:masterClrMapping/>
+  </p:clrMapOvr>
+</p:notes>
+</file>
+
+<file path=ppt/notesSlides/notesSlide7.xml><?xml version="1.0" encoding="utf-8"?>
+<p:notes xmlns:a="http://schemas.openxmlformats.org/drawingml/2006/main" xmlns:r="http://schemas.openxmlformats.org/officeDocument/2006/relationships" xmlns:p="http://schemas.openxmlformats.org/presentationml/2006/main">
+  <p:cSld>
+    <p:spTree>
+      <p:nvGrpSpPr>
+        <p:cNvPr id="1" name=""/>
+        <p:cNvGrpSpPr/>
+        <p:nvPr/>
+      </p:nvGrpSpPr>
+      <p:grpSpPr>
+        <a:xfrm>
+          <a:off x="0" y="0"/>
+          <a:ext cx="0" cy="0"/>
+          <a:chOff x="0" y="0"/>
+          <a:chExt cx="0" cy="0"/>
+        </a:xfrm>
+      </p:grpSpPr>
+      <p:sp>
+        <p:nvSpPr>
+          <p:cNvPr id="2" name="Slide Image Placeholder 1"/>
+          <p:cNvSpPr>
+            <a:spLocks noGrp="1" noRot="1" noChangeAspect="1"/>
+          </p:cNvSpPr>
+          <p:nvPr>
+            <p:ph type="sldImg"/>
+          </p:nvPr>
+        </p:nvSpPr>
+        <p:spPr/>
+      </p:sp>
+      <p:sp>
+        <p:nvSpPr>
+          <p:cNvPr id="3" name="Notes Placeholder 2"/>
+          <p:cNvSpPr>
+            <a:spLocks noGrp="1"/>
+          </p:cNvSpPr>
+          <p:nvPr>
+            <p:ph type="body" idx="1"/>
+          </p:nvPr>
+        </p:nvSpPr>
+        <p:spPr/>
+        <p:txBody>
+          <a:bodyPr/>
+          <a:lstStyle/>
+          <a:p>
+            <a:endParaRPr lang="en-US" dirty="0"/>
+          </a:p>
+        </p:txBody>
+      </p:sp>
+      <p:sp>
+        <p:nvSpPr>
+          <p:cNvPr id="4" name="Slide Number Placeholder 3"/>
+          <p:cNvSpPr>
+            <a:spLocks noGrp="1"/>
+          </p:cNvSpPr>
+          <p:nvPr>
+            <p:ph type="sldNum" sz="quarter" idx="5"/>
+          </p:nvPr>
+        </p:nvSpPr>
+        <p:spPr/>
+        <p:txBody>
+          <a:bodyPr/>
+          <a:lstStyle/>
+          <a:p>
+            <a:fld id="{1B1E5513-1272-A44C-AF68-F8AE51C323EB}" type="slidenum">
+              <a:rPr lang="en-US" smtClean="0"/>
+              <a:pPr/>
+              <a:t>16</a:t>
+            </a:fld>
+            <a:endParaRPr lang="en-US" dirty="0"/>
+          </a:p>
+        </p:txBody>
+      </p:sp>
+    </p:spTree>
+    <p:extLst>
+      <p:ext uri="{BB962C8B-B14F-4D97-AF65-F5344CB8AC3E}">
+        <p14:creationId xmlns:p14="http://schemas.microsoft.com/office/powerpoint/2010/main" val="2428308408"/>
+      </p:ext>
+    </p:extLst>
+  </p:cSld>
+  <p:clrMapOvr>
+    <a:masterClrMapping/>
+  </p:clrMapOvr>
+</p:notes>
+</file>
+
+<file path=ppt/notesSlides/notesSlide8.xml><?xml version="1.0" encoding="utf-8"?>
+<p:notes xmlns:a="http://schemas.openxmlformats.org/drawingml/2006/main" xmlns:r="http://schemas.openxmlformats.org/officeDocument/2006/relationships" xmlns:p="http://schemas.openxmlformats.org/presentationml/2006/main">
+  <p:cSld>
+    <p:spTree>
+      <p:nvGrpSpPr>
+        <p:cNvPr id="1" name=""/>
+        <p:cNvGrpSpPr/>
+        <p:nvPr/>
+      </p:nvGrpSpPr>
+      <p:grpSpPr>
+        <a:xfrm>
+          <a:off x="0" y="0"/>
+          <a:ext cx="0" cy="0"/>
+          <a:chOff x="0" y="0"/>
+          <a:chExt cx="0" cy="0"/>
+        </a:xfrm>
+      </p:grpSpPr>
+      <p:sp>
+        <p:nvSpPr>
+          <p:cNvPr id="2" name="Slide Image Placeholder 1"/>
+          <p:cNvSpPr>
+            <a:spLocks noGrp="1" noRot="1" noChangeAspect="1"/>
+          </p:cNvSpPr>
+          <p:nvPr>
+            <p:ph type="sldImg"/>
+          </p:nvPr>
+        </p:nvSpPr>
+        <p:spPr/>
+      </p:sp>
+      <p:sp>
+        <p:nvSpPr>
+          <p:cNvPr id="3" name="Notes Placeholder 2"/>
+          <p:cNvSpPr>
+            <a:spLocks noGrp="1"/>
+          </p:cNvSpPr>
+          <p:nvPr>
+            <p:ph type="body" idx="1"/>
+          </p:nvPr>
+        </p:nvSpPr>
+        <p:spPr/>
+        <p:txBody>
+          <a:bodyPr/>
+          <a:lstStyle/>
+          <a:p>
+            <a:r>
+              <a:rPr lang="en-US" dirty="0"/>
+              <a:t>Transition to next slide: so what happens in interpreting experimental results which are typically explained with the heavy contribution from the tensor force?</a:t>
+            </a:r>
+          </a:p>
+        </p:txBody>
+      </p:sp>
+      <p:sp>
+        <p:nvSpPr>
+          <p:cNvPr id="4" name="Slide Number Placeholder 3"/>
+          <p:cNvSpPr>
+            <a:spLocks noGrp="1"/>
+          </p:cNvSpPr>
+          <p:nvPr>
+            <p:ph type="sldNum" sz="quarter" idx="5"/>
+          </p:nvPr>
+        </p:nvSpPr>
+        <p:spPr/>
+        <p:txBody>
+          <a:bodyPr/>
+          <a:lstStyle/>
+          <a:p>
+            <a:fld id="{1B1E5513-1272-A44C-AF68-F8AE51C323EB}" type="slidenum">
+              <a:rPr lang="en-US" smtClean="0"/>
+              <a:pPr/>
+              <a:t>18</a:t>
+            </a:fld>
+            <a:endParaRPr lang="en-US" dirty="0"/>
+          </a:p>
+        </p:txBody>
+      </p:sp>
+    </p:spTree>
+    <p:extLst>
+      <p:ext uri="{BB962C8B-B14F-4D97-AF65-F5344CB8AC3E}">
+        <p14:creationId xmlns:p14="http://schemas.microsoft.com/office/powerpoint/2010/main" val="1134888560"/>
+      </p:ext>
+    </p:extLst>
+  </p:cSld>
+  <p:clrMapOvr>
+    <a:masterClrMapping/>
+  </p:clrMapOvr>
+</p:notes>
+</file>
+
+<file path=ppt/notesSlides/notesSlide9.xml><?xml version="1.0" encoding="utf-8"?>
+<p:notes xmlns:a="http://schemas.openxmlformats.org/drawingml/2006/main" xmlns:r="http://schemas.openxmlformats.org/officeDocument/2006/relationships" xmlns:p="http://schemas.openxmlformats.org/presentationml/2006/main">
+  <p:cSld>
+    <p:spTree>
+      <p:nvGrpSpPr>
+        <p:cNvPr id="1" name=""/>
+        <p:cNvGrpSpPr/>
+        <p:nvPr/>
+      </p:nvGrpSpPr>
+      <p:grpSpPr>
+        <a:xfrm>
+          <a:off x="0" y="0"/>
+          <a:ext cx="0" cy="0"/>
+          <a:chOff x="0" y="0"/>
+          <a:chExt cx="0" cy="0"/>
+        </a:xfrm>
+      </p:grpSpPr>
+      <p:sp>
+        <p:nvSpPr>
+          <p:cNvPr id="2" name="Slide Image Placeholder 1"/>
+          <p:cNvSpPr>
+            <a:spLocks noGrp="1" noRot="1" noChangeAspect="1"/>
+          </p:cNvSpPr>
+          <p:nvPr>
+            <p:ph type="sldImg"/>
+          </p:nvPr>
+        </p:nvSpPr>
+        <p:spPr/>
+      </p:sp>
+      <p:sp>
+        <p:nvSpPr>
+          <p:cNvPr id="3" name="Notes Placeholder 2"/>
+          <p:cNvSpPr>
+            <a:spLocks noGrp="1"/>
+          </p:cNvSpPr>
+          <p:nvPr>
+            <p:ph type="body" idx="1"/>
+          </p:nvPr>
+        </p:nvSpPr>
+        <p:spPr/>
+        <p:txBody>
+          <a:bodyPr/>
+          <a:lstStyle/>
+          <a:p>
+            <a:pPr marL="0" marR="0" lvl="0" indent="0" algn="l" defTabSz="914400" rtl="0" eaLnBrk="1" fontAlgn="auto" latinLnBrk="0" hangingPunct="1">
+              <a:lnSpc>
+                <a:spcPct val="100000"/>
+              </a:lnSpc>
+              <a:spcBef>
+                <a:spcPts val="0"/>
+              </a:spcBef>
+              <a:spcAft>
+                <a:spcPts val="0"/>
+              </a:spcAft>
+              <a:buClrTx/>
+              <a:buSzTx/>
+              <a:buFontTx/>
+              <a:buNone/>
+              <a:tabLst/>
+              <a:defRPr/>
+            </a:pPr>
+            <a:r>
+              <a:rPr lang="en-US" dirty="0"/>
+              <a:t>Transition to next slide: so what happens in interpreting experimental results? Explain figures. np/p cross section compared to pp/p for electron-carbon scattering. At high RG resolution, tensor force of NN interaction is used to explain dominance of np over pp pairs, because the tensor force requires spin triplet pairs and proton-proton are always spin singlets. But in low RG resolution, tensor force is suppressed. So the SRC physics must be moved to the operator! Leads into “consider the ratio 3S1 over 1S0 momentum projection operators</a:t>
+            </a:r>
+            <a:r>
+              <a:rPr lang="en-US" sz="1200" b="0" i="0" kern="1200" dirty="0">
+                <a:solidFill>
+                  <a:schemeClr val="tx1"/>
+                </a:solidFill>
+                <a:effectLst/>
+                <a:latin typeface="Arial" panose="020B0604020202020204" pitchFamily="34" charset="0"/>
+                <a:ea typeface="+mn-ea"/>
+                <a:cs typeface="+mn-cs"/>
+              </a:rPr>
+              <a:t>.”</a:t>
+            </a:r>
+            <a:endParaRPr lang="en-US" dirty="0"/>
+          </a:p>
+        </p:txBody>
+      </p:sp>
+      <p:sp>
+        <p:nvSpPr>
+          <p:cNvPr id="4" name="Slide Number Placeholder 3"/>
+          <p:cNvSpPr>
+            <a:spLocks noGrp="1"/>
+          </p:cNvSpPr>
+          <p:nvPr>
+            <p:ph type="sldNum" sz="quarter" idx="5"/>
+          </p:nvPr>
+        </p:nvSpPr>
+        <p:spPr/>
+        <p:txBody>
+          <a:bodyPr/>
+          <a:lstStyle/>
+          <a:p>
+            <a:fld id="{1B1E5513-1272-A44C-AF68-F8AE51C323EB}" type="slidenum">
+              <a:rPr lang="en-US" smtClean="0"/>
+              <a:pPr/>
+              <a:t>19</a:t>
+            </a:fld>
+            <a:endParaRPr lang="en-US" dirty="0"/>
+          </a:p>
+        </p:txBody>
+      </p:sp>
+    </p:spTree>
+    <p:extLst>
+      <p:ext uri="{BB962C8B-B14F-4D97-AF65-F5344CB8AC3E}">
+        <p14:creationId xmlns:p14="http://schemas.microsoft.com/office/powerpoint/2010/main" val="3611583059"/>
       </p:ext>
     </p:extLst>
   </p:cSld>
@@ -1102,7 +1757,7 @@
           <a:p>
             <a:fld id="{2F15B853-9033-E54B-8ED3-ACA75527692D}" type="datetime1">
               <a:rPr lang="en-US" smtClean="0"/>
-              <a:t>10/26/20</a:t>
+              <a:t>10/28/20</a:t>
             </a:fld>
             <a:endParaRPr lang="en-US"/>
           </a:p>
@@ -1300,7 +1955,7 @@
           <a:p>
             <a:fld id="{A9285094-3301-894A-B968-9AB7F58AF041}" type="datetime1">
               <a:rPr lang="en-US" smtClean="0"/>
-              <a:t>10/26/20</a:t>
+              <a:t>10/28/20</a:t>
             </a:fld>
             <a:endParaRPr lang="en-US"/>
           </a:p>
@@ -1508,7 +2163,7 @@
           <a:p>
             <a:fld id="{6B308625-4955-8449-821F-C24C954B4CE7}" type="datetime1">
               <a:rPr lang="en-US" smtClean="0"/>
-              <a:t>10/26/20</a:t>
+              <a:t>10/28/20</a:t>
             </a:fld>
             <a:endParaRPr lang="en-US"/>
           </a:p>
@@ -1706,7 +2361,7 @@
           <a:p>
             <a:fld id="{F4339BEE-9082-824F-9FE8-A73B8649373C}" type="datetime1">
               <a:rPr lang="en-US" smtClean="0"/>
-              <a:t>10/26/20</a:t>
+              <a:t>10/28/20</a:t>
             </a:fld>
             <a:endParaRPr lang="en-US"/>
           </a:p>
@@ -1981,7 +2636,7 @@
           <a:p>
             <a:fld id="{0A5BCA3A-B122-CD4B-9E4B-5FC53C67B8A3}" type="datetime1">
               <a:rPr lang="en-US" smtClean="0"/>
-              <a:t>10/26/20</a:t>
+              <a:t>10/28/20</a:t>
             </a:fld>
             <a:endParaRPr lang="en-US"/>
           </a:p>
@@ -2246,7 +2901,7 @@
           <a:p>
             <a:fld id="{E4EAB6FE-AA41-4244-B6ED-DBD0B8C3C94D}" type="datetime1">
               <a:rPr lang="en-US" smtClean="0"/>
-              <a:t>10/26/20</a:t>
+              <a:t>10/28/20</a:t>
             </a:fld>
             <a:endParaRPr lang="en-US"/>
           </a:p>
@@ -2658,7 +3313,7 @@
           <a:p>
             <a:fld id="{0125816F-807B-2B43-B88E-ABC5F6D182F4}" type="datetime1">
               <a:rPr lang="en-US" smtClean="0"/>
-              <a:t>10/26/20</a:t>
+              <a:t>10/28/20</a:t>
             </a:fld>
             <a:endParaRPr lang="en-US"/>
           </a:p>
@@ -2799,7 +3454,7 @@
           <a:p>
             <a:fld id="{FC402AE1-5483-4147-A0B4-4CC8FC31B757}" type="datetime1">
               <a:rPr lang="en-US" smtClean="0"/>
-              <a:t>10/26/20</a:t>
+              <a:t>10/28/20</a:t>
             </a:fld>
             <a:endParaRPr lang="en-US"/>
           </a:p>
@@ -2912,7 +3567,7 @@
           <a:p>
             <a:fld id="{AF6A64FF-219C-7344-A0AC-964997E22DFB}" type="datetime1">
               <a:rPr lang="en-US" smtClean="0"/>
-              <a:t>10/26/20</a:t>
+              <a:t>10/28/20</a:t>
             </a:fld>
             <a:endParaRPr lang="en-US"/>
           </a:p>
@@ -3223,7 +3878,7 @@
           <a:p>
             <a:fld id="{939C6B78-8263-F947-8DCB-C192D73C2A8C}" type="datetime1">
               <a:rPr lang="en-US" smtClean="0"/>
-              <a:t>10/26/20</a:t>
+              <a:t>10/28/20</a:t>
             </a:fld>
             <a:endParaRPr lang="en-US"/>
           </a:p>
@@ -3514,7 +4169,7 @@
           <a:p>
             <a:fld id="{099F02DF-4A6E-4345-8766-CA6FCC3AFB8D}" type="datetime1">
               <a:rPr lang="en-US" smtClean="0"/>
-              <a:t>10/26/20</a:t>
+              <a:t>10/28/20</a:t>
             </a:fld>
             <a:endParaRPr lang="en-US"/>
           </a:p>
@@ -3758,7 +4413,7 @@
           <a:p>
             <a:fld id="{C5E7DC65-9412-614E-9DC9-FC959AFBF189}" type="datetime1">
               <a:rPr lang="en-US" smtClean="0"/>
-              <a:t>10/26/20</a:t>
+              <a:t>10/28/20</a:t>
             </a:fld>
             <a:endParaRPr lang="en-US" dirty="0"/>
           </a:p>
@@ -4704,7 +5359,7 @@
           <p:nvPr/>
         </p:nvPicPr>
         <p:blipFill>
-          <a:blip r:embed="rId2"/>
+          <a:blip r:embed="rId3"/>
           <a:stretch>
             <a:fillRect/>
           </a:stretch>
@@ -5477,7 +6132,7 @@
             </p:nvSpPr>
             <p:spPr>
               <a:blipFill>
-                <a:blip r:embed="rId2"/>
+                <a:blip r:embed="rId3"/>
                 <a:stretch>
                   <a:fillRect l="-844" t="-1462"/>
                 </a:stretch>
@@ -7009,50 +7664,6 @@
           </a:fontRef>
         </p:style>
       </p:cxnSp>
-      <p:cxnSp>
-        <p:nvCxnSpPr>
-          <p:cNvPr id="8" name="Straight Arrow Connector 7">
-            <a:extLst>
-              <a:ext uri="{FF2B5EF4-FFF2-40B4-BE49-F238E27FC236}">
-                <a16:creationId xmlns:a16="http://schemas.microsoft.com/office/drawing/2014/main" id="{5A377D44-6772-6F4F-83A0-4D92B7ED42D4}"/>
-              </a:ext>
-            </a:extLst>
-          </p:cNvPr>
-          <p:cNvCxnSpPr>
-            <a:cxnSpLocks/>
-          </p:cNvCxnSpPr>
-          <p:nvPr/>
-        </p:nvCxnSpPr>
-        <p:spPr>
-          <a:xfrm>
-            <a:off x="3878274" y="3289737"/>
-            <a:ext cx="0" cy="1319048"/>
-          </a:xfrm>
-          <a:prstGeom prst="straightConnector1">
-            <a:avLst/>
-          </a:prstGeom>
-          <a:ln w="38100">
-            <a:solidFill>
-              <a:srgbClr val="FF0000"/>
-            </a:solidFill>
-            <a:tailEnd type="triangle"/>
-          </a:ln>
-        </p:spPr>
-        <p:style>
-          <a:lnRef idx="1">
-            <a:schemeClr val="accent1"/>
-          </a:lnRef>
-          <a:fillRef idx="0">
-            <a:schemeClr val="accent1"/>
-          </a:fillRef>
-          <a:effectRef idx="0">
-            <a:schemeClr val="accent1"/>
-          </a:effectRef>
-          <a:fontRef idx="minor">
-            <a:schemeClr val="tx1"/>
-          </a:fontRef>
-        </p:style>
-      </p:cxnSp>
       <p:sp>
         <p:nvSpPr>
           <p:cNvPr id="9" name="TextBox 8">
@@ -7088,45 +7699,6 @@
                 </a:solidFill>
               </a:rPr>
               <a:t>Scale</a:t>
-            </a:r>
-          </a:p>
-        </p:txBody>
-      </p:sp>
-      <p:sp>
-        <p:nvSpPr>
-          <p:cNvPr id="11" name="TextBox 10">
-            <a:extLst>
-              <a:ext uri="{FF2B5EF4-FFF2-40B4-BE49-F238E27FC236}">
-                <a16:creationId xmlns:a16="http://schemas.microsoft.com/office/drawing/2014/main" id="{B51A2013-4E5C-6A4C-8ED4-7B9882263273}"/>
-              </a:ext>
-            </a:extLst>
-          </p:cNvPr>
-          <p:cNvSpPr txBox="1"/>
-          <p:nvPr/>
-        </p:nvSpPr>
-        <p:spPr>
-          <a:xfrm>
-            <a:off x="2529802" y="4147120"/>
-            <a:ext cx="1170513" cy="461665"/>
-          </a:xfrm>
-          <a:prstGeom prst="rect">
-            <a:avLst/>
-          </a:prstGeom>
-          <a:noFill/>
-        </p:spPr>
-        <p:txBody>
-          <a:bodyPr wrap="none" rtlCol="0">
-            <a:spAutoFit/>
-          </a:bodyPr>
-          <a:lstStyle/>
-          <a:p>
-            <a:r>
-              <a:rPr lang="en-US" sz="2400" dirty="0">
-                <a:solidFill>
-                  <a:srgbClr val="C00000"/>
-                </a:solidFill>
-              </a:rPr>
-              <a:t>Scheme</a:t>
             </a:r>
           </a:p>
         </p:txBody>
@@ -7190,6 +7762,134 @@
           </a:p>
         </p:txBody>
       </p:sp>
+      <p:cxnSp>
+        <p:nvCxnSpPr>
+          <p:cNvPr id="13" name="Straight Arrow Connector 12">
+            <a:extLst>
+              <a:ext uri="{FF2B5EF4-FFF2-40B4-BE49-F238E27FC236}">
+                <a16:creationId xmlns:a16="http://schemas.microsoft.com/office/drawing/2014/main" id="{7A438645-1CDF-344E-A7AC-BE139D877CEC}"/>
+              </a:ext>
+            </a:extLst>
+          </p:cNvPr>
+          <p:cNvCxnSpPr>
+            <a:cxnSpLocks/>
+          </p:cNvCxnSpPr>
+          <p:nvPr/>
+        </p:nvCxnSpPr>
+        <p:spPr>
+          <a:xfrm flipV="1">
+            <a:off x="3397694" y="3669323"/>
+            <a:ext cx="590938" cy="343694"/>
+          </a:xfrm>
+          <a:prstGeom prst="straightConnector1">
+            <a:avLst/>
+          </a:prstGeom>
+          <a:ln w="38100">
+            <a:solidFill>
+              <a:srgbClr val="FF0000"/>
+            </a:solidFill>
+            <a:tailEnd type="triangle"/>
+          </a:ln>
+        </p:spPr>
+        <p:style>
+          <a:lnRef idx="1">
+            <a:schemeClr val="accent1"/>
+          </a:lnRef>
+          <a:fillRef idx="0">
+            <a:schemeClr val="accent1"/>
+          </a:fillRef>
+          <a:effectRef idx="0">
+            <a:schemeClr val="accent1"/>
+          </a:effectRef>
+          <a:fontRef idx="minor">
+            <a:schemeClr val="tx1"/>
+          </a:fontRef>
+        </p:style>
+      </p:cxnSp>
+      <p:sp>
+        <p:nvSpPr>
+          <p:cNvPr id="14" name="TextBox 13">
+            <a:extLst>
+              <a:ext uri="{FF2B5EF4-FFF2-40B4-BE49-F238E27FC236}">
+                <a16:creationId xmlns:a16="http://schemas.microsoft.com/office/drawing/2014/main" id="{5D40AE77-8AF6-2342-9CF7-F559CC187C97}"/>
+              </a:ext>
+            </a:extLst>
+          </p:cNvPr>
+          <p:cNvSpPr txBox="1"/>
+          <p:nvPr/>
+        </p:nvSpPr>
+        <p:spPr>
+          <a:xfrm>
+            <a:off x="2231007" y="3849028"/>
+            <a:ext cx="1170513" cy="461665"/>
+          </a:xfrm>
+          <a:prstGeom prst="rect">
+            <a:avLst/>
+          </a:prstGeom>
+          <a:noFill/>
+        </p:spPr>
+        <p:txBody>
+          <a:bodyPr wrap="none" rtlCol="0">
+            <a:spAutoFit/>
+          </a:bodyPr>
+          <a:lstStyle/>
+          <a:p>
+            <a:r>
+              <a:rPr lang="en-US" sz="2400" dirty="0">
+                <a:solidFill>
+                  <a:srgbClr val="C00000"/>
+                </a:solidFill>
+              </a:rPr>
+              <a:t>Scheme</a:t>
+            </a:r>
+          </a:p>
+        </p:txBody>
+      </p:sp>
+      <p:cxnSp>
+        <p:nvCxnSpPr>
+          <p:cNvPr id="15" name="Straight Arrow Connector 14">
+            <a:extLst>
+              <a:ext uri="{FF2B5EF4-FFF2-40B4-BE49-F238E27FC236}">
+                <a16:creationId xmlns:a16="http://schemas.microsoft.com/office/drawing/2014/main" id="{AEF7AE1D-5A43-5D49-8EC5-955936ADA52B}"/>
+              </a:ext>
+            </a:extLst>
+          </p:cNvPr>
+          <p:cNvCxnSpPr>
+            <a:cxnSpLocks/>
+            <a:stCxn id="14" idx="3"/>
+          </p:cNvCxnSpPr>
+          <p:nvPr/>
+        </p:nvCxnSpPr>
+        <p:spPr>
+          <a:xfrm>
+            <a:off x="3401520" y="4079861"/>
+            <a:ext cx="469970" cy="503862"/>
+          </a:xfrm>
+          <a:prstGeom prst="straightConnector1">
+            <a:avLst/>
+          </a:prstGeom>
+          <a:ln w="38100">
+            <a:solidFill>
+              <a:srgbClr val="FF0000"/>
+            </a:solidFill>
+            <a:tailEnd type="triangle"/>
+          </a:ln>
+        </p:spPr>
+        <p:style>
+          <a:lnRef idx="1">
+            <a:schemeClr val="accent1"/>
+          </a:lnRef>
+          <a:fillRef idx="0">
+            <a:schemeClr val="accent1"/>
+          </a:fillRef>
+          <a:effectRef idx="0">
+            <a:schemeClr val="accent1"/>
+          </a:effectRef>
+          <a:fontRef idx="minor">
+            <a:schemeClr val="tx1"/>
+          </a:fontRef>
+        </p:style>
+      </p:cxnSp>
     </p:spTree>
     <p:extLst>
       <p:ext uri="{BB962C8B-B14F-4D97-AF65-F5344CB8AC3E}">
@@ -8087,8 +8787,8 @@
           </a:prstGeom>
         </p:spPr>
       </p:pic>
-      <mc:AlternateContent xmlns:mc="http://schemas.openxmlformats.org/markup-compatibility/2006">
-        <mc:Choice xmlns:a14="http://schemas.microsoft.com/office/drawing/2010/main" Requires="a14">
+      <mc:AlternateContent xmlns:mc="http://schemas.openxmlformats.org/markup-compatibility/2006" xmlns:a14="http://schemas.microsoft.com/office/drawing/2010/main">
+        <mc:Choice Requires="a14">
           <p:sp>
             <p:nvSpPr>
               <p:cNvPr id="8" name="TextBox 7">
@@ -8398,7 +9098,7 @@
             </p:txBody>
           </p:sp>
         </mc:Choice>
-        <mc:Fallback>
+        <mc:Fallback xmlns="">
           <p:sp>
             <p:nvSpPr>
               <p:cNvPr id="8" name="TextBox 7">
@@ -9287,7 +9987,7 @@
                 <a:avLst/>
               </a:prstGeom>
               <a:blipFill>
-                <a:blip r:embed="rId2"/>
+                <a:blip r:embed="rId3"/>
                 <a:stretch>
                   <a:fillRect l="-433" b="-11538"/>
                 </a:stretch>
@@ -9603,50 +10303,6 @@
           </a:fontRef>
         </p:style>
       </p:cxnSp>
-      <p:cxnSp>
-        <p:nvCxnSpPr>
-          <p:cNvPr id="10" name="Straight Arrow Connector 9">
-            <a:extLst>
-              <a:ext uri="{FF2B5EF4-FFF2-40B4-BE49-F238E27FC236}">
-                <a16:creationId xmlns:a16="http://schemas.microsoft.com/office/drawing/2014/main" id="{FC1C0286-C4AA-E245-B6E5-288838A9FB94}"/>
-              </a:ext>
-            </a:extLst>
-          </p:cNvPr>
-          <p:cNvCxnSpPr>
-            <a:cxnSpLocks/>
-          </p:cNvCxnSpPr>
-          <p:nvPr/>
-        </p:nvCxnSpPr>
-        <p:spPr>
-          <a:xfrm>
-            <a:off x="3894082" y="3211589"/>
-            <a:ext cx="0" cy="1319048"/>
-          </a:xfrm>
-          <a:prstGeom prst="straightConnector1">
-            <a:avLst/>
-          </a:prstGeom>
-          <a:ln w="38100">
-            <a:solidFill>
-              <a:srgbClr val="FF0000"/>
-            </a:solidFill>
-            <a:tailEnd type="triangle"/>
-          </a:ln>
-        </p:spPr>
-        <p:style>
-          <a:lnRef idx="1">
-            <a:schemeClr val="accent1"/>
-          </a:lnRef>
-          <a:fillRef idx="0">
-            <a:schemeClr val="accent1"/>
-          </a:fillRef>
-          <a:effectRef idx="0">
-            <a:schemeClr val="accent1"/>
-          </a:effectRef>
-          <a:fontRef idx="minor">
-            <a:schemeClr val="tx1"/>
-          </a:fontRef>
-        </p:style>
-      </p:cxnSp>
       <p:sp>
         <p:nvSpPr>
           <p:cNvPr id="11" name="TextBox 10">
@@ -9682,45 +10338,6 @@
                 </a:solidFill>
               </a:rPr>
               <a:t>Scale</a:t>
-            </a:r>
-          </a:p>
-        </p:txBody>
-      </p:sp>
-      <p:sp>
-        <p:nvSpPr>
-          <p:cNvPr id="12" name="TextBox 11">
-            <a:extLst>
-              <a:ext uri="{FF2B5EF4-FFF2-40B4-BE49-F238E27FC236}">
-                <a16:creationId xmlns:a16="http://schemas.microsoft.com/office/drawing/2014/main" id="{71BC27CC-53F3-CE47-B2C1-4DA061F94E7C}"/>
-              </a:ext>
-            </a:extLst>
-          </p:cNvPr>
-          <p:cNvSpPr txBox="1"/>
-          <p:nvPr/>
-        </p:nvSpPr>
-        <p:spPr>
-          <a:xfrm>
-            <a:off x="2723569" y="2887358"/>
-            <a:ext cx="1170513" cy="461665"/>
-          </a:xfrm>
-          <a:prstGeom prst="rect">
-            <a:avLst/>
-          </a:prstGeom>
-          <a:noFill/>
-        </p:spPr>
-        <p:txBody>
-          <a:bodyPr wrap="none" rtlCol="0">
-            <a:spAutoFit/>
-          </a:bodyPr>
-          <a:lstStyle/>
-          <a:p>
-            <a:r>
-              <a:rPr lang="en-US" sz="2400" dirty="0">
-                <a:solidFill>
-                  <a:srgbClr val="C00000"/>
-                </a:solidFill>
-              </a:rPr>
-              <a:t>Scheme</a:t>
             </a:r>
           </a:p>
         </p:txBody>
@@ -9784,6 +10401,134 @@
           </a:p>
         </p:txBody>
       </p:sp>
+      <p:cxnSp>
+        <p:nvCxnSpPr>
+          <p:cNvPr id="13" name="Straight Arrow Connector 12">
+            <a:extLst>
+              <a:ext uri="{FF2B5EF4-FFF2-40B4-BE49-F238E27FC236}">
+                <a16:creationId xmlns:a16="http://schemas.microsoft.com/office/drawing/2014/main" id="{87AB432B-8BBB-CE4F-A716-1316C6F116D3}"/>
+              </a:ext>
+            </a:extLst>
+          </p:cNvPr>
+          <p:cNvCxnSpPr>
+            <a:cxnSpLocks/>
+          </p:cNvCxnSpPr>
+          <p:nvPr/>
+        </p:nvCxnSpPr>
+        <p:spPr>
+          <a:xfrm>
+            <a:off x="3730943" y="3125566"/>
+            <a:ext cx="328556" cy="1248894"/>
+          </a:xfrm>
+          <a:prstGeom prst="straightConnector1">
+            <a:avLst/>
+          </a:prstGeom>
+          <a:ln w="38100">
+            <a:solidFill>
+              <a:srgbClr val="FF0000"/>
+            </a:solidFill>
+            <a:tailEnd type="triangle"/>
+          </a:ln>
+        </p:spPr>
+        <p:style>
+          <a:lnRef idx="1">
+            <a:schemeClr val="accent1"/>
+          </a:lnRef>
+          <a:fillRef idx="0">
+            <a:schemeClr val="accent1"/>
+          </a:fillRef>
+          <a:effectRef idx="0">
+            <a:schemeClr val="accent1"/>
+          </a:effectRef>
+          <a:fontRef idx="minor">
+            <a:schemeClr val="tx1"/>
+          </a:fontRef>
+        </p:style>
+      </p:cxnSp>
+      <p:sp>
+        <p:nvSpPr>
+          <p:cNvPr id="14" name="TextBox 13">
+            <a:extLst>
+              <a:ext uri="{FF2B5EF4-FFF2-40B4-BE49-F238E27FC236}">
+                <a16:creationId xmlns:a16="http://schemas.microsoft.com/office/drawing/2014/main" id="{C8B7A6DE-CF21-214A-9124-FE002CD622E4}"/>
+              </a:ext>
+            </a:extLst>
+          </p:cNvPr>
+          <p:cNvSpPr txBox="1"/>
+          <p:nvPr/>
+        </p:nvSpPr>
+        <p:spPr>
+          <a:xfrm>
+            <a:off x="2607522" y="2748429"/>
+            <a:ext cx="1170513" cy="461665"/>
+          </a:xfrm>
+          <a:prstGeom prst="rect">
+            <a:avLst/>
+          </a:prstGeom>
+          <a:noFill/>
+        </p:spPr>
+        <p:txBody>
+          <a:bodyPr wrap="none" rtlCol="0">
+            <a:spAutoFit/>
+          </a:bodyPr>
+          <a:lstStyle/>
+          <a:p>
+            <a:r>
+              <a:rPr lang="en-US" sz="2400" dirty="0">
+                <a:solidFill>
+                  <a:srgbClr val="C00000"/>
+                </a:solidFill>
+              </a:rPr>
+              <a:t>Scheme</a:t>
+            </a:r>
+          </a:p>
+        </p:txBody>
+      </p:sp>
+      <p:cxnSp>
+        <p:nvCxnSpPr>
+          <p:cNvPr id="15" name="Straight Arrow Connector 14">
+            <a:extLst>
+              <a:ext uri="{FF2B5EF4-FFF2-40B4-BE49-F238E27FC236}">
+                <a16:creationId xmlns:a16="http://schemas.microsoft.com/office/drawing/2014/main" id="{42448A9E-ADD0-214A-927D-0A81ECADD9B5}"/>
+              </a:ext>
+            </a:extLst>
+          </p:cNvPr>
+          <p:cNvCxnSpPr>
+            <a:cxnSpLocks/>
+            <a:stCxn id="14" idx="3"/>
+          </p:cNvCxnSpPr>
+          <p:nvPr/>
+        </p:nvCxnSpPr>
+        <p:spPr>
+          <a:xfrm>
+            <a:off x="3778035" y="2979262"/>
+            <a:ext cx="281464" cy="106624"/>
+          </a:xfrm>
+          <a:prstGeom prst="straightConnector1">
+            <a:avLst/>
+          </a:prstGeom>
+          <a:ln w="38100">
+            <a:solidFill>
+              <a:srgbClr val="FF0000"/>
+            </a:solidFill>
+            <a:tailEnd type="triangle"/>
+          </a:ln>
+        </p:spPr>
+        <p:style>
+          <a:lnRef idx="1">
+            <a:schemeClr val="accent1"/>
+          </a:lnRef>
+          <a:fillRef idx="0">
+            <a:schemeClr val="accent1"/>
+          </a:fillRef>
+          <a:effectRef idx="0">
+            <a:schemeClr val="accent1"/>
+          </a:effectRef>
+          <a:fontRef idx="minor">
+            <a:schemeClr val="tx1"/>
+          </a:fontRef>
+        </p:style>
+      </p:cxnSp>
     </p:spTree>
     <p:extLst>
       <p:ext uri="{BB962C8B-B14F-4D97-AF65-F5344CB8AC3E}">
@@ -9859,8 +10604,8 @@
           </a:p>
         </p:txBody>
       </p:sp>
-      <mc:AlternateContent xmlns:mc="http://schemas.openxmlformats.org/markup-compatibility/2006">
-        <mc:Choice xmlns:a14="http://schemas.microsoft.com/office/drawing/2010/main" Requires="a14">
+      <mc:AlternateContent xmlns:mc="http://schemas.openxmlformats.org/markup-compatibility/2006" xmlns:a14="http://schemas.microsoft.com/office/drawing/2010/main">
+        <mc:Choice Requires="a14">
           <p:sp>
             <p:nvSpPr>
               <p:cNvPr id="8" name="Content Placeholder 2">
@@ -10113,7 +10858,7 @@
             </p:txBody>
           </p:sp>
         </mc:Choice>
-        <mc:Fallback>
+        <mc:Fallback xmlns="">
           <p:sp>
             <p:nvSpPr>
               <p:cNvPr id="8" name="Content Placeholder 2">
@@ -10714,8 +11459,8 @@
           </a:p>
         </p:txBody>
       </p:sp>
-      <mc:AlternateContent xmlns:mc="http://schemas.openxmlformats.org/markup-compatibility/2006">
-        <mc:Choice xmlns:a14="http://schemas.microsoft.com/office/drawing/2010/main" Requires="a14">
+      <mc:AlternateContent xmlns:mc="http://schemas.openxmlformats.org/markup-compatibility/2006" xmlns:a14="http://schemas.microsoft.com/office/drawing/2010/main">
+        <mc:Choice Requires="a14">
           <p:sp>
             <p:nvSpPr>
               <p:cNvPr id="8" name="Content Placeholder 2">
@@ -11263,7 +12008,7 @@
             </p:txBody>
           </p:sp>
         </mc:Choice>
-        <mc:Fallback>
+        <mc:Fallback xmlns="">
           <p:sp>
             <p:nvSpPr>
               <p:cNvPr id="8" name="Content Placeholder 2">
@@ -11286,7 +12031,7 @@
                 <a:ext cx="3337560" cy="4351338"/>
               </a:xfrm>
               <a:blipFill>
-                <a:blip r:embed="rId2"/>
+                <a:blip r:embed="rId3"/>
                 <a:stretch>
                   <a:fillRect l="-2652" t="-872" r="-4545" b="-12209"/>
                 </a:stretch>
@@ -11322,7 +12067,7 @@
           <p:nvPr/>
         </p:nvPicPr>
         <p:blipFill>
-          <a:blip r:embed="rId3"/>
+          <a:blip r:embed="rId4"/>
           <a:stretch>
             <a:fillRect/>
           </a:stretch>
@@ -11739,7 +12484,7 @@
                 <a:avLst/>
               </a:prstGeom>
               <a:blipFill>
-                <a:blip r:embed="rId4"/>
+                <a:blip r:embed="rId5"/>
                 <a:stretch>
                   <a:fillRect l="-433" b="-11538"/>
                 </a:stretch>
@@ -12557,7 +13302,7 @@
           <p:nvPr/>
         </p:nvPicPr>
         <p:blipFill>
-          <a:blip r:embed="rId2"/>
+          <a:blip r:embed="rId3"/>
           <a:stretch>
             <a:fillRect/>
           </a:stretch>
@@ -13112,8 +13857,8 @@
           </a:p>
         </p:txBody>
       </p:sp>
-      <mc:AlternateContent xmlns:mc="http://schemas.openxmlformats.org/markup-compatibility/2006" xmlns:a14="http://schemas.microsoft.com/office/drawing/2010/main">
-        <mc:Choice Requires="a14">
+      <mc:AlternateContent xmlns:mc="http://schemas.openxmlformats.org/markup-compatibility/2006">
+        <mc:Choice xmlns:a14="http://schemas.microsoft.com/office/drawing/2010/main" Requires="a14">
           <p:sp>
             <p:nvSpPr>
               <p:cNvPr id="19" name="TextBox 18">
@@ -13128,8 +13873,8 @@
             </p:nvSpPr>
             <p:spPr>
               <a:xfrm>
-                <a:off x="3789500" y="5412141"/>
-                <a:ext cx="4449248" cy="584775"/>
+                <a:off x="3978597" y="5450240"/>
+                <a:ext cx="4449248" cy="830997"/>
               </a:xfrm>
               <a:prstGeom prst="rect">
                 <a:avLst/>
@@ -13255,15 +14000,59 @@
                     </m:r>
                   </m:oMath>
                 </a14:m>
-                <a:endParaRPr lang="en-US" sz="1600" dirty="0">
-                  <a:latin typeface="Arial" panose="020B0604020202020204" pitchFamily="34" charset="0"/>
-                  <a:cs typeface="Arial" panose="020B0604020202020204" pitchFamily="34" charset="0"/>
-                </a:endParaRPr>
+                <a:r>
+                  <a:rPr lang="en-US" sz="1600" dirty="0">
+                    <a:latin typeface="Arial" panose="020B0604020202020204" pitchFamily="34" charset="0"/>
+                    <a:cs typeface="Arial" panose="020B0604020202020204" pitchFamily="34" charset="0"/>
+                  </a:rPr>
+                  <a:t> where </a:t>
+                </a:r>
+                <a14:m>
+                  <m:oMath xmlns:m="http://schemas.openxmlformats.org/officeDocument/2006/math">
+                    <m:r>
+                      <a:rPr lang="en-US" sz="1600" i="1" smtClean="0">
+                        <a:latin typeface="Cambria Math" panose="02040503050406030204" pitchFamily="18" charset="0"/>
+                        <a:ea typeface="Cambria Math" panose="02040503050406030204" pitchFamily="18" charset="0"/>
+                        <a:cs typeface="Arial" panose="020B0604020202020204" pitchFamily="34" charset="0"/>
+                      </a:rPr>
+                      <m:t>𝜆</m:t>
+                    </m:r>
+                    <m:r>
+                      <a:rPr lang="en-US" sz="1600" b="0" i="1" smtClean="0">
+                        <a:latin typeface="Cambria Math" panose="02040503050406030204" pitchFamily="18" charset="0"/>
+                        <a:ea typeface="Cambria Math" panose="02040503050406030204" pitchFamily="18" charset="0"/>
+                        <a:cs typeface="Arial" panose="020B0604020202020204" pitchFamily="34" charset="0"/>
+                      </a:rPr>
+                      <m:t>=1.35</m:t>
+                    </m:r>
+                  </m:oMath>
+                </a14:m>
+                <a:r>
+                  <a:rPr lang="en-US" sz="1600" dirty="0">
+                    <a:latin typeface="Arial" panose="020B0604020202020204" pitchFamily="34" charset="0"/>
+                    <a:cs typeface="Arial" panose="020B0604020202020204" pitchFamily="34" charset="0"/>
+                  </a:rPr>
+                  <a:t> fm</a:t>
+                </a:r>
+                <a:r>
+                  <a:rPr lang="en-US" sz="1600" baseline="30000" dirty="0">
+                    <a:latin typeface="Arial" panose="020B0604020202020204" pitchFamily="34" charset="0"/>
+                    <a:cs typeface="Arial" panose="020B0604020202020204" pitchFamily="34" charset="0"/>
+                  </a:rPr>
+                  <a:t>-1</a:t>
+                </a:r>
+                <a:r>
+                  <a:rPr lang="en-US" sz="1600" dirty="0">
+                    <a:latin typeface="Arial" panose="020B0604020202020204" pitchFamily="34" charset="0"/>
+                    <a:cs typeface="Arial" panose="020B0604020202020204" pitchFamily="34" charset="0"/>
+                  </a:rPr>
+                  <a:t>.</a:t>
+                </a:r>
               </a:p>
             </p:txBody>
           </p:sp>
         </mc:Choice>
-        <mc:Fallback xmlns="">
+        <mc:Fallback>
           <p:sp>
             <p:nvSpPr>
               <p:cNvPr id="19" name="TextBox 18">
@@ -13280,16 +14069,16 @@
             </p:nvSpPr>
             <p:spPr>
               <a:xfrm>
-                <a:off x="3789500" y="5412141"/>
-                <a:ext cx="4449248" cy="584775"/>
+                <a:off x="3978597" y="5450240"/>
+                <a:ext cx="4449248" cy="830997"/>
               </a:xfrm>
               <a:prstGeom prst="rect">
                 <a:avLst/>
               </a:prstGeom>
               <a:blipFill>
-                <a:blip r:embed="rId6"/>
+                <a:blip r:embed="rId4"/>
                 <a:stretch>
-                  <a:fillRect l="-855" t="-4255" r="-285" b="-12766"/>
+                  <a:fillRect l="-855" t="-3030" r="-285" b="-9091"/>
                 </a:stretch>
               </a:blipFill>
             </p:spPr>
@@ -13522,382 +14311,6 @@
           </a:p>
         </p:txBody>
       </p:sp>
-      <p:pic>
-        <p:nvPicPr>
-          <p:cNvPr id="6" name="Picture 5">
-            <a:extLst>
-              <a:ext uri="{FF2B5EF4-FFF2-40B4-BE49-F238E27FC236}">
-                <a16:creationId xmlns:a16="http://schemas.microsoft.com/office/drawing/2014/main" id="{B4EAD1A8-04D0-B446-8D51-692EA966D90B}"/>
-              </a:ext>
-            </a:extLst>
-          </p:cNvPr>
-          <p:cNvPicPr>
-            <a:picLocks noChangeAspect="1"/>
-          </p:cNvPicPr>
-          <p:nvPr/>
-        </p:nvPicPr>
-        <p:blipFill>
-          <a:blip r:embed="rId7"/>
-          <a:stretch>
-            <a:fillRect/>
-          </a:stretch>
-        </p:blipFill>
-        <p:spPr>
-          <a:xfrm>
-            <a:off x="3464474" y="1362445"/>
-            <a:ext cx="4434677" cy="4114800"/>
-          </a:xfrm>
-          <a:prstGeom prst="rect">
-            <a:avLst/>
-          </a:prstGeom>
-        </p:spPr>
-      </p:pic>
-      <mc:AlternateContent xmlns:mc="http://schemas.openxmlformats.org/markup-compatibility/2006">
-        <mc:Choice xmlns:a14="http://schemas.microsoft.com/office/drawing/2010/main" Requires="a14">
-          <p:sp>
-            <p:nvSpPr>
-              <p:cNvPr id="3" name="Content Placeholder 2">
-                <a:extLst>
-                  <a:ext uri="{FF2B5EF4-FFF2-40B4-BE49-F238E27FC236}">
-                    <a16:creationId xmlns:a16="http://schemas.microsoft.com/office/drawing/2014/main" id="{1A8FA9B3-1B32-894B-93C2-F90FB63CBDAA}"/>
-                  </a:ext>
-                </a:extLst>
-              </p:cNvPr>
-              <p:cNvSpPr>
-                <a:spLocks noGrp="1"/>
-              </p:cNvSpPr>
-              <p:nvPr>
-                <p:ph idx="1"/>
-              </p:nvPr>
-            </p:nvSpPr>
-            <p:spPr>
-              <a:xfrm>
-                <a:off x="108754" y="1526771"/>
-                <a:ext cx="3537123" cy="4351338"/>
-              </a:xfrm>
-            </p:spPr>
-            <p:txBody>
-              <a:bodyPr>
-                <a:normAutofit lnSpcReduction="10000"/>
-              </a:bodyPr>
-              <a:lstStyle/>
-              <a:p>
-                <a:pPr>
-                  <a:lnSpc>
-                    <a:spcPct val="110000"/>
-                  </a:lnSpc>
-                </a:pPr>
-                <a:r>
-                  <a:rPr lang="en-US" sz="2200" dirty="0">
-                    <a:latin typeface="Arial" panose="020B0604020202020204" pitchFamily="34" charset="0"/>
-                  </a:rPr>
-                  <a:t>At </a:t>
-                </a:r>
-                <a:r>
-                  <a:rPr lang="en-US" sz="2200" dirty="0">
-                    <a:solidFill>
-                      <a:srgbClr val="C00000"/>
-                    </a:solidFill>
-                    <a:latin typeface="Arial" panose="020B0604020202020204" pitchFamily="34" charset="0"/>
-                  </a:rPr>
-                  <a:t>low RG resolution</a:t>
-                </a:r>
-                <a:r>
-                  <a:rPr lang="en-US" sz="2200" dirty="0">
-                    <a:latin typeface="Arial" panose="020B0604020202020204" pitchFamily="34" charset="0"/>
-                  </a:rPr>
-                  <a:t>, SRCs are suppressed in the potential</a:t>
-                </a:r>
-              </a:p>
-              <a:p>
-                <a:pPr>
-                  <a:lnSpc>
-                    <a:spcPct val="110000"/>
-                  </a:lnSpc>
-                </a:pPr>
-                <a:r>
-                  <a:rPr lang="en-US" sz="2200" dirty="0">
-                    <a:latin typeface="Arial" panose="020B0604020202020204" pitchFamily="34" charset="0"/>
-                  </a:rPr>
-                  <a:t>Consider the ratio of the momentum projection </a:t>
-                </a:r>
-                <a:r>
-                  <a:rPr lang="en-US" sz="2200" dirty="0" err="1">
-                    <a:latin typeface="Arial" panose="020B0604020202020204" pitchFamily="34" charset="0"/>
-                  </a:rPr>
-                  <a:t>operator</a:t>
-                </a:r>
-                <a:r>
-                  <a:rPr lang="en-US" sz="2200" dirty="0">
-                    <a:latin typeface="Arial" panose="020B0604020202020204" pitchFamily="34" charset="0"/>
-                  </a:rPr>
-                  <a:t> </a:t>
-                </a:r>
-                <a14:m>
-                  <m:oMath xmlns:m="http://schemas.openxmlformats.org/officeDocument/2006/math">
-                    <m:sSubSup>
-                      <m:sSubSupPr>
-                        <m:ctrlPr>
-                          <a:rPr lang="en-US" sz="2200" i="1" smtClean="0">
-                            <a:solidFill>
-                              <a:srgbClr val="C00000"/>
-                            </a:solidFill>
-                            <a:latin typeface="Cambria Math" panose="02040503050406030204" pitchFamily="18" charset="0"/>
-                          </a:rPr>
-                        </m:ctrlPr>
-                      </m:sSubSupPr>
-                      <m:e>
-                        <m:r>
-                          <a:rPr lang="en-US" sz="2200" i="1">
-                            <a:solidFill>
-                              <a:srgbClr val="C00000"/>
-                            </a:solidFill>
-                            <a:latin typeface="Cambria Math" panose="02040503050406030204" pitchFamily="18" charset="0"/>
-                          </a:rPr>
-                          <m:t>𝑎</m:t>
-                        </m:r>
-                      </m:e>
-                      <m:sub>
-                        <m:r>
-                          <a:rPr lang="en-US" sz="2200" i="1">
-                            <a:solidFill>
-                              <a:srgbClr val="C00000"/>
-                            </a:solidFill>
-                            <a:latin typeface="Cambria Math" panose="02040503050406030204" pitchFamily="18" charset="0"/>
-                          </a:rPr>
-                          <m:t>𝑞</m:t>
-                        </m:r>
-                      </m:sub>
-                      <m:sup>
-                        <m:r>
-                          <a:rPr lang="en-US" sz="2200" i="1">
-                            <a:solidFill>
-                              <a:srgbClr val="C00000"/>
-                            </a:solidFill>
-                            <a:latin typeface="Cambria Math" panose="02040503050406030204" pitchFamily="18" charset="0"/>
-                            <a:ea typeface="Cambria Math" panose="02040503050406030204" pitchFamily="18" charset="0"/>
-                          </a:rPr>
-                          <m:t>†</m:t>
-                        </m:r>
-                      </m:sup>
-                    </m:sSubSup>
-                    <m:sSub>
-                      <m:sSubPr>
-                        <m:ctrlPr>
-                          <a:rPr lang="en-US" sz="2200" i="1">
-                            <a:solidFill>
-                              <a:srgbClr val="C00000"/>
-                            </a:solidFill>
-                            <a:latin typeface="Cambria Math" panose="02040503050406030204" pitchFamily="18" charset="0"/>
-                          </a:rPr>
-                        </m:ctrlPr>
-                      </m:sSubPr>
-                      <m:e>
-                        <m:r>
-                          <a:rPr lang="en-US" sz="2200" i="1">
-                            <a:solidFill>
-                              <a:srgbClr val="C00000"/>
-                            </a:solidFill>
-                            <a:latin typeface="Cambria Math" panose="02040503050406030204" pitchFamily="18" charset="0"/>
-                          </a:rPr>
-                          <m:t>𝑎</m:t>
-                        </m:r>
-                      </m:e>
-                      <m:sub>
-                        <m:r>
-                          <a:rPr lang="en-US" sz="2200" i="1">
-                            <a:solidFill>
-                              <a:srgbClr val="C00000"/>
-                            </a:solidFill>
-                            <a:latin typeface="Cambria Math" panose="02040503050406030204" pitchFamily="18" charset="0"/>
-                          </a:rPr>
-                          <m:t>𝑞</m:t>
-                        </m:r>
-                      </m:sub>
-                    </m:sSub>
-                  </m:oMath>
-                </a14:m>
-                <a:r>
-                  <a:rPr lang="en-US" sz="2200" dirty="0">
-                    <a:solidFill>
-                      <a:srgbClr val="C00000"/>
-                    </a:solidFill>
-                  </a:rPr>
-                  <a:t> </a:t>
-                </a:r>
-                <a:r>
-                  <a:rPr lang="en-US" sz="2200" dirty="0"/>
-                  <a:t>for </a:t>
-                </a:r>
-                <a:r>
-                  <a:rPr lang="en-US" sz="2200" baseline="30000" dirty="0">
-                    <a:solidFill>
-                      <a:srgbClr val="C00000"/>
-                    </a:solidFill>
-                  </a:rPr>
-                  <a:t>3</a:t>
-                </a:r>
-                <a:r>
-                  <a:rPr lang="en-US" sz="2200" dirty="0">
-                    <a:solidFill>
-                      <a:srgbClr val="C00000"/>
-                    </a:solidFill>
-                  </a:rPr>
-                  <a:t>S</a:t>
-                </a:r>
-                <a:r>
-                  <a:rPr lang="en-US" sz="2200" baseline="-25000" dirty="0">
-                    <a:solidFill>
-                      <a:srgbClr val="C00000"/>
-                    </a:solidFill>
-                  </a:rPr>
-                  <a:t>1</a:t>
-                </a:r>
-                <a:r>
-                  <a:rPr lang="en-US" sz="2200" dirty="0">
-                    <a:solidFill>
-                      <a:srgbClr val="C00000"/>
-                    </a:solidFill>
-                  </a:rPr>
-                  <a:t>/</a:t>
-                </a:r>
-                <a:r>
-                  <a:rPr lang="en-US" sz="2200" baseline="30000" dirty="0">
-                    <a:solidFill>
-                      <a:srgbClr val="C00000"/>
-                    </a:solidFill>
-                  </a:rPr>
-                  <a:t>1</a:t>
-                </a:r>
-                <a:r>
-                  <a:rPr lang="en-US" sz="2200" dirty="0">
-                    <a:solidFill>
-                      <a:srgbClr val="C00000"/>
-                    </a:solidFill>
-                  </a:rPr>
-                  <a:t>S</a:t>
-                </a:r>
-                <a:r>
-                  <a:rPr lang="en-US" sz="2200" baseline="-25000" dirty="0">
-                    <a:solidFill>
-                      <a:srgbClr val="C00000"/>
-                    </a:solidFill>
-                  </a:rPr>
-                  <a:t>0</a:t>
-                </a:r>
-                <a:endParaRPr lang="en-US" sz="2200" dirty="0">
-                  <a:solidFill>
-                    <a:srgbClr val="C00000"/>
-                  </a:solidFill>
-                </a:endParaRPr>
-              </a:p>
-            </p:txBody>
-          </p:sp>
-        </mc:Choice>
-        <mc:Fallback>
-          <p:sp>
-            <p:nvSpPr>
-              <p:cNvPr id="3" name="Content Placeholder 2">
-                <a:extLst>
-                  <a:ext uri="{FF2B5EF4-FFF2-40B4-BE49-F238E27FC236}">
-                    <a16:creationId xmlns:a16="http://schemas.microsoft.com/office/drawing/2014/main" id="{1A8FA9B3-1B32-894B-93C2-F90FB63CBDAA}"/>
-                  </a:ext>
-                </a:extLst>
-              </p:cNvPr>
-              <p:cNvSpPr>
-                <a:spLocks noGrp="1" noRot="1" noChangeAspect="1" noMove="1" noResize="1" noEditPoints="1" noAdjustHandles="1" noChangeArrowheads="1" noChangeShapeType="1" noTextEdit="1"/>
-              </p:cNvSpPr>
-              <p:nvPr>
-                <p:ph idx="1"/>
-              </p:nvPr>
-            </p:nvSpPr>
-            <p:spPr>
-              <a:xfrm>
-                <a:off x="108754" y="1526771"/>
-                <a:ext cx="3537123" cy="4351338"/>
-              </a:xfrm>
-              <a:blipFill>
-                <a:blip r:embed="rId8"/>
-                <a:stretch>
-                  <a:fillRect l="-2143" t="-875" r="-1429"/>
-                </a:stretch>
-              </a:blipFill>
-            </p:spPr>
-            <p:txBody>
-              <a:bodyPr/>
-              <a:lstStyle/>
-              <a:p>
-                <a:r>
-                  <a:rPr lang="en-US">
-                    <a:noFill/>
-                  </a:rPr>
-                  <a:t> </a:t>
-                </a:r>
-              </a:p>
-            </p:txBody>
-          </p:sp>
-        </mc:Fallback>
-      </mc:AlternateContent>
-      <p:sp>
-        <p:nvSpPr>
-          <p:cNvPr id="8" name="TextBox 7">
-            <a:extLst>
-              <a:ext uri="{FF2B5EF4-FFF2-40B4-BE49-F238E27FC236}">
-                <a16:creationId xmlns:a16="http://schemas.microsoft.com/office/drawing/2014/main" id="{91B2F1A1-C1DE-C44E-BB3C-5BD1ACD9E816}"/>
-              </a:ext>
-            </a:extLst>
-          </p:cNvPr>
-          <p:cNvSpPr txBox="1"/>
-          <p:nvPr/>
-        </p:nvSpPr>
-        <p:spPr>
-          <a:xfrm>
-            <a:off x="6727024" y="1670337"/>
-            <a:ext cx="1113692" cy="430887"/>
-          </a:xfrm>
-          <a:prstGeom prst="rect">
-            <a:avLst/>
-          </a:prstGeom>
-          <a:noFill/>
-        </p:spPr>
-        <p:txBody>
-          <a:bodyPr wrap="square" rtlCol="0">
-            <a:spAutoFit/>
-          </a:bodyPr>
-          <a:lstStyle/>
-          <a:p>
-            <a:r>
-              <a:rPr lang="en-US" sz="2200" baseline="30000" dirty="0"/>
-              <a:t>3</a:t>
-            </a:r>
-            <a:r>
-              <a:rPr lang="en-US" sz="2200" dirty="0"/>
-              <a:t>S</a:t>
-            </a:r>
-            <a:r>
-              <a:rPr lang="en-US" sz="2200" baseline="-25000" dirty="0"/>
-              <a:t>1</a:t>
-            </a:r>
-            <a:r>
-              <a:rPr lang="en-US" sz="2200" dirty="0"/>
-              <a:t>/</a:t>
-            </a:r>
-            <a:r>
-              <a:rPr lang="en-US" sz="2200" baseline="30000" dirty="0"/>
-              <a:t>1</a:t>
-            </a:r>
-            <a:r>
-              <a:rPr lang="en-US" sz="2200" dirty="0"/>
-              <a:t>S</a:t>
-            </a:r>
-            <a:r>
-              <a:rPr lang="en-US" sz="2200" baseline="-25000" dirty="0"/>
-              <a:t>0</a:t>
-            </a:r>
-            <a:endParaRPr lang="en-US" sz="2200" baseline="30000" dirty="0"/>
-          </a:p>
-        </p:txBody>
-      </p:sp>
       <p:sp>
         <p:nvSpPr>
           <p:cNvPr id="10" name="Slide Number Placeholder 9">
@@ -13927,42 +14340,12 @@
           </a:p>
         </p:txBody>
       </p:sp>
-    </p:spTree>
-    <p:extLst>
-      <p:ext uri="{BB962C8B-B14F-4D97-AF65-F5344CB8AC3E}">
-        <p14:creationId xmlns:p14="http://schemas.microsoft.com/office/powerpoint/2010/main" val="376960596"/>
-      </p:ext>
-    </p:extLst>
-  </p:cSld>
-  <p:clrMapOvr>
-    <a:masterClrMapping/>
-  </p:clrMapOvr>
-</p:sld>
-</file>
-
-<file path=ppt/slides/slide21.xml><?xml version="1.0" encoding="utf-8"?>
-<p:sld xmlns:a="http://schemas.openxmlformats.org/drawingml/2006/main" xmlns:r="http://schemas.openxmlformats.org/officeDocument/2006/relationships" xmlns:p="http://schemas.openxmlformats.org/presentationml/2006/main">
-  <p:cSld>
-    <p:spTree>
-      <p:nvGrpSpPr>
-        <p:cNvPr id="1" name=""/>
-        <p:cNvGrpSpPr/>
-        <p:nvPr/>
-      </p:nvGrpSpPr>
-      <p:grpSpPr>
-        <a:xfrm>
-          <a:off x="0" y="0"/>
-          <a:ext cx="0" cy="0"/>
-          <a:chOff x="0" y="0"/>
-          <a:chExt cx="0" cy="0"/>
-        </a:xfrm>
-      </p:grpSpPr>
       <p:pic>
         <p:nvPicPr>
-          <p:cNvPr id="5" name="Picture 4">
+          <p:cNvPr id="21" name="Picture 20">
             <a:extLst>
               <a:ext uri="{FF2B5EF4-FFF2-40B4-BE49-F238E27FC236}">
-                <a16:creationId xmlns:a16="http://schemas.microsoft.com/office/drawing/2014/main" id="{A7C4C11B-F0D8-E445-8719-58CB080A4AA6}"/>
+                <a16:creationId xmlns:a16="http://schemas.microsoft.com/office/drawing/2014/main" id="{BB2AA3BC-EB71-9643-B096-BF2C6FE0A047}"/>
               </a:ext>
             </a:extLst>
           </p:cNvPr>
@@ -13972,29 +14355,28 @@
           <p:nvPr/>
         </p:nvPicPr>
         <p:blipFill>
-          <a:blip r:embed="rId3"/>
-          <a:stretch>
-            <a:fillRect/>
-          </a:stretch>
+          <a:blip r:embed="rId5"/>
+          <a:srcRect/>
+          <a:stretch/>
         </p:blipFill>
         <p:spPr>
           <a:xfrm>
-            <a:off x="3367797" y="1489037"/>
-            <a:ext cx="8824203" cy="3291840"/>
+            <a:off x="3470389" y="1371600"/>
+            <a:ext cx="4630993" cy="4114800"/>
           </a:xfrm>
           <a:prstGeom prst="rect">
             <a:avLst/>
           </a:prstGeom>
         </p:spPr>
       </p:pic>
-      <mc:AlternateContent xmlns:mc="http://schemas.openxmlformats.org/markup-compatibility/2006" xmlns:a14="http://schemas.microsoft.com/office/drawing/2010/main">
-        <mc:Choice Requires="a14">
+      <mc:AlternateContent xmlns:mc="http://schemas.openxmlformats.org/markup-compatibility/2006">
+        <mc:Choice xmlns:a14="http://schemas.microsoft.com/office/drawing/2010/main" Requires="a14">
           <p:sp>
             <p:nvSpPr>
-              <p:cNvPr id="10" name="TextBox 9">
+              <p:cNvPr id="4" name="TextBox 3">
                 <a:extLst>
                   <a:ext uri="{FF2B5EF4-FFF2-40B4-BE49-F238E27FC236}">
-                    <a16:creationId xmlns:a16="http://schemas.microsoft.com/office/drawing/2014/main" id="{1CF6EB2F-B56D-8249-AD48-D35B132F8042}"/>
+                    <a16:creationId xmlns:a16="http://schemas.microsoft.com/office/drawing/2014/main" id="{8E79E0F8-D578-D442-A72E-D9DD497D7B28}"/>
                   </a:ext>
                 </a:extLst>
               </p:cNvPr>
@@ -14003,8 +14385,8 @@
             </p:nvSpPr>
             <p:spPr>
               <a:xfrm>
-                <a:off x="3789500" y="5412141"/>
-                <a:ext cx="4449248" cy="584775"/>
+                <a:off x="6280956" y="1589326"/>
+                <a:ext cx="1483996" cy="899092"/>
               </a:xfrm>
               <a:prstGeom prst="rect">
                 <a:avLst/>
@@ -14012,139 +14394,321 @@
               <a:noFill/>
             </p:spPr>
             <p:txBody>
-              <a:bodyPr wrap="square" rtlCol="0">
+              <a:bodyPr wrap="none" lIns="0" tIns="0" rIns="0" bIns="0" rtlCol="0">
                 <a:spAutoFit/>
               </a:bodyPr>
               <a:lstStyle/>
               <a:p>
-                <a:r>
-                  <a:rPr lang="en-US" sz="1600" dirty="0">
-                    <a:latin typeface="Arial" panose="020B0604020202020204" pitchFamily="34" charset="0"/>
-                    <a:cs typeface="Arial" panose="020B0604020202020204" pitchFamily="34" charset="0"/>
-                  </a:rPr>
-                  <a:t>Fig. 7: Ratio of </a:t>
-                </a:r>
-                <a:r>
-                  <a:rPr lang="en-US" sz="1600" baseline="30000" dirty="0">
-                    <a:latin typeface="Arial" panose="020B0604020202020204" pitchFamily="34" charset="0"/>
-                    <a:cs typeface="Arial" panose="020B0604020202020204" pitchFamily="34" charset="0"/>
-                  </a:rPr>
-                  <a:t>3</a:t>
-                </a:r>
-                <a:r>
-                  <a:rPr lang="en-US" sz="1600" dirty="0">
-                    <a:latin typeface="Arial" panose="020B0604020202020204" pitchFamily="34" charset="0"/>
-                    <a:cs typeface="Arial" panose="020B0604020202020204" pitchFamily="34" charset="0"/>
-                  </a:rPr>
-                  <a:t>S</a:t>
-                </a:r>
-                <a:r>
-                  <a:rPr lang="en-US" sz="1600" baseline="-25000" dirty="0">
-                    <a:latin typeface="Arial" panose="020B0604020202020204" pitchFamily="34" charset="0"/>
-                    <a:cs typeface="Arial" panose="020B0604020202020204" pitchFamily="34" charset="0"/>
-                  </a:rPr>
-                  <a:t>1</a:t>
-                </a:r>
-                <a:r>
-                  <a:rPr lang="en-US" sz="1600" dirty="0">
-                    <a:latin typeface="Arial" panose="020B0604020202020204" pitchFamily="34" charset="0"/>
-                    <a:cs typeface="Arial" panose="020B0604020202020204" pitchFamily="34" charset="0"/>
-                  </a:rPr>
-                  <a:t> to </a:t>
-                </a:r>
-                <a:r>
-                  <a:rPr lang="en-US" sz="1600" baseline="30000" dirty="0">
-                    <a:latin typeface="Arial" panose="020B0604020202020204" pitchFamily="34" charset="0"/>
-                    <a:cs typeface="Arial" panose="020B0604020202020204" pitchFamily="34" charset="0"/>
-                  </a:rPr>
-                  <a:t>1</a:t>
-                </a:r>
-                <a:r>
-                  <a:rPr lang="en-US" sz="1600" dirty="0">
-                    <a:latin typeface="Arial" panose="020B0604020202020204" pitchFamily="34" charset="0"/>
-                    <a:cs typeface="Arial" panose="020B0604020202020204" pitchFamily="34" charset="0"/>
-                  </a:rPr>
-                  <a:t>S</a:t>
-                </a:r>
-                <a:r>
-                  <a:rPr lang="en-US" sz="1600" baseline="-25000" dirty="0">
-                    <a:latin typeface="Arial" panose="020B0604020202020204" pitchFamily="34" charset="0"/>
-                    <a:cs typeface="Arial" panose="020B0604020202020204" pitchFamily="34" charset="0"/>
-                  </a:rPr>
-                  <a:t>0</a:t>
-                </a:r>
-                <a:r>
-                  <a:rPr lang="en-US" sz="1600" dirty="0">
-                    <a:latin typeface="Arial" panose="020B0604020202020204" pitchFamily="34" charset="0"/>
-                    <a:cs typeface="Arial" panose="020B0604020202020204" pitchFamily="34" charset="0"/>
-                  </a:rPr>
-                  <a:t> SRG transformations for low momentum </a:t>
-                </a:r>
                 <a14:m>
-                  <m:oMath xmlns:m="http://schemas.openxmlformats.org/officeDocument/2006/math">
-                    <m:sSub>
-                      <m:sSubPr>
-                        <m:ctrlPr>
-                          <a:rPr lang="en-US" sz="1600" i="1">
-                            <a:latin typeface="Cambria Math" panose="02040503050406030204" pitchFamily="18" charset="0"/>
-                            <a:cs typeface="Arial" panose="020B0604020202020204" pitchFamily="34" charset="0"/>
-                          </a:rPr>
-                        </m:ctrlPr>
-                      </m:sSubPr>
-                      <m:e>
-                        <m:r>
-                          <a:rPr lang="en-US" sz="1600" i="1">
-                            <a:latin typeface="Cambria Math" panose="02040503050406030204" pitchFamily="18" charset="0"/>
-                            <a:cs typeface="Arial" panose="020B0604020202020204" pitchFamily="34" charset="0"/>
-                          </a:rPr>
-                          <m:t>𝑘</m:t>
-                        </m:r>
-                      </m:e>
-                      <m:sub>
-                        <m:r>
-                          <a:rPr lang="en-US" sz="1600" i="1">
-                            <a:latin typeface="Cambria Math" panose="02040503050406030204" pitchFamily="18" charset="0"/>
-                            <a:cs typeface="Arial" panose="020B0604020202020204" pitchFamily="34" charset="0"/>
-                          </a:rPr>
-                          <m:t>0</m:t>
-                        </m:r>
-                      </m:sub>
-                    </m:sSub>
-                  </m:oMath>
+                  <m:oMathPara xmlns:m="http://schemas.openxmlformats.org/officeDocument/2006/math">
+                    <m:oMathParaPr>
+                      <m:jc m:val="centerGroup"/>
+                    </m:oMathParaPr>
+                    <m:oMath xmlns:m="http://schemas.openxmlformats.org/officeDocument/2006/math">
+                      <m:f>
+                        <m:fPr>
+                          <m:ctrlPr>
+                            <a:rPr lang="en-US" sz="2200" i="1" smtClean="0">
+                              <a:latin typeface="Cambria Math" panose="02040503050406030204" pitchFamily="18" charset="0"/>
+                            </a:rPr>
+                          </m:ctrlPr>
+                        </m:fPr>
+                        <m:num>
+                          <m:r>
+                            <a:rPr lang="en-US" sz="2200" i="1" smtClean="0">
+                              <a:latin typeface="Cambria Math" panose="02040503050406030204" pitchFamily="18" charset="0"/>
+                            </a:rPr>
+                            <m:t> </m:t>
+                          </m:r>
+                          <m:sSub>
+                            <m:sSubPr>
+                              <m:ctrlPr>
+                                <a:rPr lang="en-US" sz="2200" i="1" smtClean="0">
+                                  <a:latin typeface="Cambria Math" panose="02040503050406030204" pitchFamily="18" charset="0"/>
+                                </a:rPr>
+                              </m:ctrlPr>
+                            </m:sSubPr>
+                            <m:e>
+                              <m:sSup>
+                                <m:sSupPr>
+                                  <m:ctrlPr>
+                                    <a:rPr lang="en-US" sz="2200" i="1">
+                                      <a:latin typeface="Cambria Math" panose="02040503050406030204" pitchFamily="18" charset="0"/>
+                                    </a:rPr>
+                                  </m:ctrlPr>
+                                </m:sSupPr>
+                                <m:e>
+                                  <m:sSubSup>
+                                    <m:sSubSupPr>
+                                      <m:ctrlPr>
+                                        <a:rPr lang="en-US" sz="2200" i="1">
+                                          <a:latin typeface="Cambria Math" panose="02040503050406030204" pitchFamily="18" charset="0"/>
+                                        </a:rPr>
+                                      </m:ctrlPr>
+                                    </m:sSubSupPr>
+                                    <m:e>
+                                      <m:r>
+                                        <a:rPr lang="en-US" sz="2200" i="1">
+                                          <a:latin typeface="Cambria Math" panose="02040503050406030204" pitchFamily="18" charset="0"/>
+                                        </a:rPr>
+                                        <m:t>𝑎</m:t>
+                                      </m:r>
+                                    </m:e>
+                                    <m:sub>
+                                      <m:r>
+                                        <a:rPr lang="en-US" sz="2200" i="1">
+                                          <a:latin typeface="Cambria Math" panose="02040503050406030204" pitchFamily="18" charset="0"/>
+                                        </a:rPr>
+                                        <m:t>𝑞</m:t>
+                                      </m:r>
+                                    </m:sub>
+                                    <m:sup>
+                                      <m:r>
+                                        <a:rPr lang="en-US" sz="2200" i="1">
+                                          <a:latin typeface="Cambria Math" panose="02040503050406030204" pitchFamily="18" charset="0"/>
+                                          <a:ea typeface="Cambria Math" panose="02040503050406030204" pitchFamily="18" charset="0"/>
+                                        </a:rPr>
+                                        <m:t>†</m:t>
+                                      </m:r>
+                                    </m:sup>
+                                  </m:sSubSup>
+                                  <m:sSub>
+                                    <m:sSubPr>
+                                      <m:ctrlPr>
+                                        <a:rPr lang="en-US" sz="2200" i="1">
+                                          <a:latin typeface="Cambria Math" panose="02040503050406030204" pitchFamily="18" charset="0"/>
+                                        </a:rPr>
+                                      </m:ctrlPr>
+                                    </m:sSubPr>
+                                    <m:e>
+                                      <m:r>
+                                        <a:rPr lang="en-US" sz="2200" i="1">
+                                          <a:latin typeface="Cambria Math" panose="02040503050406030204" pitchFamily="18" charset="0"/>
+                                        </a:rPr>
+                                        <m:t>𝑎</m:t>
+                                      </m:r>
+                                    </m:e>
+                                    <m:sub>
+                                      <m:r>
+                                        <a:rPr lang="en-US" sz="2200" i="1">
+                                          <a:latin typeface="Cambria Math" panose="02040503050406030204" pitchFamily="18" charset="0"/>
+                                        </a:rPr>
+                                        <m:t>𝑞</m:t>
+                                      </m:r>
+                                    </m:sub>
+                                  </m:sSub>
+                                  <m:r>
+                                    <a:rPr lang="en-US" sz="2200" i="1">
+                                      <a:latin typeface="Cambria Math" panose="02040503050406030204" pitchFamily="18" charset="0"/>
+                                    </a:rPr>
+                                    <m:t>(</m:t>
+                                  </m:r>
+                                </m:e>
+                                <m:sup>
+                                  <m:r>
+                                    <a:rPr lang="en-US" sz="2200" i="1">
+                                      <a:latin typeface="Cambria Math" panose="02040503050406030204" pitchFamily="18" charset="0"/>
+                                    </a:rPr>
+                                    <m:t>3</m:t>
+                                  </m:r>
+                                </m:sup>
+                              </m:sSup>
+                              <m:sSub>
+                                <m:sSubPr>
+                                  <m:ctrlPr>
+                                    <a:rPr lang="en-US" sz="2200" i="1">
+                                      <a:latin typeface="Cambria Math" panose="02040503050406030204" pitchFamily="18" charset="0"/>
+                                    </a:rPr>
+                                  </m:ctrlPr>
+                                </m:sSubPr>
+                                <m:e>
+                                  <m:r>
+                                    <a:rPr lang="en-US" sz="2200" i="1">
+                                      <a:latin typeface="Cambria Math" panose="02040503050406030204" pitchFamily="18" charset="0"/>
+                                    </a:rPr>
+                                    <m:t>𝑆</m:t>
+                                  </m:r>
+                                </m:e>
+                                <m:sub>
+                                  <m:r>
+                                    <a:rPr lang="en-US" sz="2200" i="1">
+                                      <a:latin typeface="Cambria Math" panose="02040503050406030204" pitchFamily="18" charset="0"/>
+                                    </a:rPr>
+                                    <m:t>1</m:t>
+                                  </m:r>
+                                </m:sub>
+                              </m:sSub>
+                              <m:r>
+                                <a:rPr lang="en-US" sz="2200" i="1">
+                                  <a:latin typeface="Cambria Math" panose="02040503050406030204" pitchFamily="18" charset="0"/>
+                                </a:rPr>
+                                <m:t>)</m:t>
+                              </m:r>
+                            </m:e>
+                            <m:sub>
+                              <m:r>
+                                <a:rPr lang="en-US" sz="2200" i="1" smtClean="0">
+                                  <a:latin typeface="Cambria Math" panose="02040503050406030204" pitchFamily="18" charset="0"/>
+                                  <a:ea typeface="Cambria Math" panose="02040503050406030204" pitchFamily="18" charset="0"/>
+                                </a:rPr>
+                                <m:t>𝜆</m:t>
+                              </m:r>
+                            </m:sub>
+                          </m:sSub>
+                        </m:num>
+                        <m:den>
+                          <m:sSub>
+                            <m:sSubPr>
+                              <m:ctrlPr>
+                                <a:rPr lang="en-US" sz="2200" i="1">
+                                  <a:latin typeface="Cambria Math" panose="02040503050406030204" pitchFamily="18" charset="0"/>
+                                </a:rPr>
+                              </m:ctrlPr>
+                            </m:sSubPr>
+                            <m:e>
+                              <m:sSup>
+                                <m:sSupPr>
+                                  <m:ctrlPr>
+                                    <a:rPr lang="en-US" sz="2200" i="1">
+                                      <a:latin typeface="Cambria Math" panose="02040503050406030204" pitchFamily="18" charset="0"/>
+                                    </a:rPr>
+                                  </m:ctrlPr>
+                                </m:sSupPr>
+                                <m:e>
+                                  <m:sSubSup>
+                                    <m:sSubSupPr>
+                                      <m:ctrlPr>
+                                        <a:rPr lang="en-US" sz="2200" i="1">
+                                          <a:latin typeface="Cambria Math" panose="02040503050406030204" pitchFamily="18" charset="0"/>
+                                        </a:rPr>
+                                      </m:ctrlPr>
+                                    </m:sSubSupPr>
+                                    <m:e>
+                                      <m:r>
+                                        <a:rPr lang="en-US" sz="2200" i="1">
+                                          <a:latin typeface="Cambria Math" panose="02040503050406030204" pitchFamily="18" charset="0"/>
+                                        </a:rPr>
+                                        <m:t>𝑎</m:t>
+                                      </m:r>
+                                    </m:e>
+                                    <m:sub>
+                                      <m:r>
+                                        <a:rPr lang="en-US" sz="2200" i="1">
+                                          <a:latin typeface="Cambria Math" panose="02040503050406030204" pitchFamily="18" charset="0"/>
+                                        </a:rPr>
+                                        <m:t>𝑞</m:t>
+                                      </m:r>
+                                    </m:sub>
+                                    <m:sup>
+                                      <m:r>
+                                        <a:rPr lang="en-US" sz="2200" i="1">
+                                          <a:latin typeface="Cambria Math" panose="02040503050406030204" pitchFamily="18" charset="0"/>
+                                          <a:ea typeface="Cambria Math" panose="02040503050406030204" pitchFamily="18" charset="0"/>
+                                        </a:rPr>
+                                        <m:t>†</m:t>
+                                      </m:r>
+                                    </m:sup>
+                                  </m:sSubSup>
+                                  <m:sSub>
+                                    <m:sSubPr>
+                                      <m:ctrlPr>
+                                        <a:rPr lang="en-US" sz="2200" i="1">
+                                          <a:latin typeface="Cambria Math" panose="02040503050406030204" pitchFamily="18" charset="0"/>
+                                        </a:rPr>
+                                      </m:ctrlPr>
+                                    </m:sSubPr>
+                                    <m:e>
+                                      <m:r>
+                                        <a:rPr lang="en-US" sz="2200" i="1">
+                                          <a:latin typeface="Cambria Math" panose="02040503050406030204" pitchFamily="18" charset="0"/>
+                                        </a:rPr>
+                                        <m:t>𝑎</m:t>
+                                      </m:r>
+                                    </m:e>
+                                    <m:sub>
+                                      <m:r>
+                                        <a:rPr lang="en-US" sz="2200" i="1">
+                                          <a:latin typeface="Cambria Math" panose="02040503050406030204" pitchFamily="18" charset="0"/>
+                                        </a:rPr>
+                                        <m:t>𝑞</m:t>
+                                      </m:r>
+                                    </m:sub>
+                                  </m:sSub>
+                                  <m:r>
+                                    <a:rPr lang="en-US" sz="2200" i="1">
+                                      <a:latin typeface="Cambria Math" panose="02040503050406030204" pitchFamily="18" charset="0"/>
+                                    </a:rPr>
+                                    <m:t>(</m:t>
+                                  </m:r>
+                                </m:e>
+                                <m:sup>
+                                  <m:r>
+                                    <a:rPr lang="en-US" sz="2200" b="0" i="1" smtClean="0">
+                                      <a:latin typeface="Cambria Math" panose="02040503050406030204" pitchFamily="18" charset="0"/>
+                                    </a:rPr>
+                                    <m:t>1</m:t>
+                                  </m:r>
+                                </m:sup>
+                              </m:sSup>
+                              <m:sSub>
+                                <m:sSubPr>
+                                  <m:ctrlPr>
+                                    <a:rPr lang="en-US" sz="2200" i="1">
+                                      <a:latin typeface="Cambria Math" panose="02040503050406030204" pitchFamily="18" charset="0"/>
+                                    </a:rPr>
+                                  </m:ctrlPr>
+                                </m:sSubPr>
+                                <m:e>
+                                  <m:r>
+                                    <a:rPr lang="en-US" sz="2200" i="1">
+                                      <a:latin typeface="Cambria Math" panose="02040503050406030204" pitchFamily="18" charset="0"/>
+                                    </a:rPr>
+                                    <m:t>𝑆</m:t>
+                                  </m:r>
+                                </m:e>
+                                <m:sub>
+                                  <m:r>
+                                    <a:rPr lang="en-US" sz="2200" b="0" i="1" smtClean="0">
+                                      <a:latin typeface="Cambria Math" panose="02040503050406030204" pitchFamily="18" charset="0"/>
+                                    </a:rPr>
+                                    <m:t>0</m:t>
+                                  </m:r>
+                                </m:sub>
+                              </m:sSub>
+                              <m:r>
+                                <a:rPr lang="en-US" sz="2200" i="1">
+                                  <a:latin typeface="Cambria Math" panose="02040503050406030204" pitchFamily="18" charset="0"/>
+                                </a:rPr>
+                                <m:t>)</m:t>
+                              </m:r>
+                            </m:e>
+                            <m:sub>
+                              <m:r>
+                                <a:rPr lang="en-US" sz="2200" i="1">
+                                  <a:latin typeface="Cambria Math" panose="02040503050406030204" pitchFamily="18" charset="0"/>
+                                  <a:ea typeface="Cambria Math" panose="02040503050406030204" pitchFamily="18" charset="0"/>
+                                </a:rPr>
+                                <m:t>𝜆</m:t>
+                              </m:r>
+                            </m:sub>
+                          </m:sSub>
+                        </m:den>
+                      </m:f>
+                    </m:oMath>
+                  </m:oMathPara>
                 </a14:m>
-                <a:r>
-                  <a:rPr lang="en-US" sz="1600" dirty="0">
-                    <a:latin typeface="Arial" panose="020B0604020202020204" pitchFamily="34" charset="0"/>
-                    <a:cs typeface="Arial" panose="020B0604020202020204" pitchFamily="34" charset="0"/>
-                  </a:rPr>
-                  <a:t> and high momentum </a:t>
-                </a:r>
-                <a14:m>
-                  <m:oMath xmlns:m="http://schemas.openxmlformats.org/officeDocument/2006/math">
-                    <m:r>
-                      <a:rPr lang="en-US" sz="1600" b="0" i="1" smtClean="0">
-                        <a:latin typeface="Cambria Math" panose="02040503050406030204" pitchFamily="18" charset="0"/>
-                        <a:cs typeface="Arial" panose="020B0604020202020204" pitchFamily="34" charset="0"/>
-                      </a:rPr>
-                      <m:t>𝑞</m:t>
-                    </m:r>
-                  </m:oMath>
-                </a14:m>
-                <a:endParaRPr lang="en-US" sz="1600" dirty="0">
-                  <a:latin typeface="Arial" panose="020B0604020202020204" pitchFamily="34" charset="0"/>
-                  <a:cs typeface="Arial" panose="020B0604020202020204" pitchFamily="34" charset="0"/>
-                </a:endParaRPr>
+                <a:endParaRPr lang="en-US" sz="2200" dirty="0"/>
               </a:p>
             </p:txBody>
           </p:sp>
         </mc:Choice>
-        <mc:Fallback xmlns="">
+        <mc:Fallback>
           <p:sp>
             <p:nvSpPr>
-              <p:cNvPr id="10" name="TextBox 9">
+              <p:cNvPr id="4" name="TextBox 3">
                 <a:extLst>
                   <a:ext uri="{FF2B5EF4-FFF2-40B4-BE49-F238E27FC236}">
-                    <a16:creationId xmlns:a16="http://schemas.microsoft.com/office/drawing/2014/main" id="{1CF6EB2F-B56D-8249-AD48-D35B132F8042}"/>
+                    <a16:creationId xmlns:a16="http://schemas.microsoft.com/office/drawing/2014/main" id="{8E79E0F8-D578-D442-A72E-D9DD497D7B28}"/>
                   </a:ext>
                 </a:extLst>
               </p:cNvPr>
@@ -14155,16 +14719,16 @@
             </p:nvSpPr>
             <p:spPr>
               <a:xfrm>
-                <a:off x="3789500" y="5412141"/>
-                <a:ext cx="4449248" cy="584775"/>
+                <a:off x="6280956" y="1589326"/>
+                <a:ext cx="1483996" cy="899092"/>
               </a:xfrm>
               <a:prstGeom prst="rect">
                 <a:avLst/>
               </a:prstGeom>
               <a:blipFill>
-                <a:blip r:embed="rId5"/>
+                <a:blip r:embed="rId6"/>
                 <a:stretch>
-                  <a:fillRect l="-855" t="-4255" r="-285" b="-12766"/>
+                  <a:fillRect l="-6780" r="-1695" b="-9859"/>
                 </a:stretch>
               </a:blipFill>
             </p:spPr>
@@ -14183,188 +14747,251 @@
           </p:sp>
         </mc:Fallback>
       </mc:AlternateContent>
-      <p:cxnSp>
-        <p:nvCxnSpPr>
-          <p:cNvPr id="12" name="Straight Arrow Connector 11">
+      <p:sp>
+        <p:nvSpPr>
+          <p:cNvPr id="7" name="Rectangle 6">
             <a:extLst>
               <a:ext uri="{FF2B5EF4-FFF2-40B4-BE49-F238E27FC236}">
-                <a16:creationId xmlns:a16="http://schemas.microsoft.com/office/drawing/2014/main" id="{431343DE-00C1-494C-A482-4C0BDC45E4F2}"/>
+                <a16:creationId xmlns:a16="http://schemas.microsoft.com/office/drawing/2014/main" id="{CA966E8D-897B-8241-B37E-9D29085AEB58}"/>
               </a:ext>
             </a:extLst>
           </p:cNvPr>
-          <p:cNvCxnSpPr>
-            <a:cxnSpLocks/>
-          </p:cNvCxnSpPr>
+          <p:cNvSpPr/>
           <p:nvPr/>
-        </p:nvCxnSpPr>
+        </p:nvSpPr>
         <p:spPr>
           <a:xfrm>
-            <a:off x="11769969" y="1301262"/>
-            <a:ext cx="114643" cy="890953"/>
+            <a:off x="3574514" y="2151819"/>
+            <a:ext cx="406526" cy="1992923"/>
           </a:xfrm>
-          <a:prstGeom prst="straightConnector1">
+          <a:prstGeom prst="rect">
             <a:avLst/>
           </a:prstGeom>
-          <a:ln w="38100">
-            <a:solidFill>
-              <a:srgbClr val="FF0000"/>
-            </a:solidFill>
-            <a:tailEnd type="triangle"/>
+          <a:solidFill>
+            <a:schemeClr val="bg1"/>
+          </a:solidFill>
+          <a:ln>
+            <a:noFill/>
           </a:ln>
         </p:spPr>
         <p:style>
-          <a:lnRef idx="1">
-            <a:schemeClr val="accent1"/>
+          <a:lnRef idx="2">
+            <a:schemeClr val="accent1">
+              <a:shade val="50000"/>
+            </a:schemeClr>
           </a:lnRef>
-          <a:fillRef idx="0">
+          <a:fillRef idx="1">
             <a:schemeClr val="accent1"/>
           </a:fillRef>
           <a:effectRef idx="0">
             <a:schemeClr val="accent1"/>
           </a:effectRef>
           <a:fontRef idx="minor">
-            <a:schemeClr val="tx1"/>
+            <a:schemeClr val="lt1"/>
           </a:fontRef>
         </p:style>
-      </p:cxnSp>
-      <p:sp>
-        <p:nvSpPr>
-          <p:cNvPr id="14" name="TextBox 13">
-            <a:extLst>
-              <a:ext uri="{FF2B5EF4-FFF2-40B4-BE49-F238E27FC236}">
-                <a16:creationId xmlns:a16="http://schemas.microsoft.com/office/drawing/2014/main" id="{537DEB5B-837B-2241-A42B-B9DE25FE1E6B}"/>
-              </a:ext>
-            </a:extLst>
-          </p:cNvPr>
-          <p:cNvSpPr txBox="1"/>
-          <p:nvPr/>
-        </p:nvSpPr>
-        <p:spPr>
-          <a:xfrm>
-            <a:off x="10977607" y="931929"/>
-            <a:ext cx="1213474" cy="369332"/>
-          </a:xfrm>
-          <a:prstGeom prst="rect">
-            <a:avLst/>
-          </a:prstGeom>
-          <a:noFill/>
-        </p:spPr>
         <p:txBody>
-          <a:bodyPr wrap="none" rtlCol="0">
-            <a:spAutoFit/>
-          </a:bodyPr>
+          <a:bodyPr rtlCol="0" anchor="ctr"/>
           <a:lstStyle/>
           <a:p>
-            <a:r>
-              <a:rPr lang="en-US" dirty="0"/>
-              <a:t>Scalar limit</a:t>
-            </a:r>
+            <a:pPr algn="ctr"/>
+            <a:endParaRPr lang="en-US"/>
           </a:p>
         </p:txBody>
       </p:sp>
-      <p:pic>
-        <p:nvPicPr>
-          <p:cNvPr id="23" name="Picture 22">
-            <a:extLst>
-              <a:ext uri="{FF2B5EF4-FFF2-40B4-BE49-F238E27FC236}">
-                <a16:creationId xmlns:a16="http://schemas.microsoft.com/office/drawing/2014/main" id="{98F5B38E-EA97-3E47-B4FB-D4D38E7A0B05}"/>
-              </a:ext>
-            </a:extLst>
-          </p:cNvPr>
-          <p:cNvPicPr>
-            <a:picLocks noChangeAspect="1"/>
-          </p:cNvPicPr>
-          <p:nvPr/>
-        </p:nvPicPr>
-        <p:blipFill>
-          <a:blip r:embed="rId6"/>
-          <a:stretch>
-            <a:fillRect/>
-          </a:stretch>
-        </p:blipFill>
-        <p:spPr>
-          <a:xfrm>
-            <a:off x="3464474" y="1362445"/>
-            <a:ext cx="4434677" cy="4114800"/>
-          </a:xfrm>
-          <a:prstGeom prst="rect">
-            <a:avLst/>
-          </a:prstGeom>
-        </p:spPr>
-      </p:pic>
-      <p:cxnSp>
-        <p:nvCxnSpPr>
-          <p:cNvPr id="16" name="Straight Arrow Connector 15">
-            <a:extLst>
-              <a:ext uri="{FF2B5EF4-FFF2-40B4-BE49-F238E27FC236}">
-                <a16:creationId xmlns:a16="http://schemas.microsoft.com/office/drawing/2014/main" id="{DC33DE1A-E403-3D42-BF15-F346CE02D286}"/>
-              </a:ext>
-            </a:extLst>
-          </p:cNvPr>
-          <p:cNvCxnSpPr>
-            <a:cxnSpLocks/>
-          </p:cNvCxnSpPr>
-          <p:nvPr/>
-        </p:nvCxnSpPr>
-        <p:spPr>
-          <a:xfrm>
-            <a:off x="7420893" y="3065055"/>
-            <a:ext cx="114643" cy="890953"/>
-          </a:xfrm>
-          <a:prstGeom prst="straightConnector1">
-            <a:avLst/>
-          </a:prstGeom>
-          <a:ln w="38100">
-            <a:solidFill>
-              <a:srgbClr val="FF0000"/>
-            </a:solidFill>
-            <a:tailEnd type="triangle"/>
-          </a:ln>
-        </p:spPr>
-        <p:style>
-          <a:lnRef idx="1">
-            <a:schemeClr val="accent1"/>
-          </a:lnRef>
-          <a:fillRef idx="0">
-            <a:schemeClr val="accent1"/>
-          </a:fillRef>
-          <a:effectRef idx="0">
-            <a:schemeClr val="accent1"/>
-          </a:effectRef>
-          <a:fontRef idx="minor">
-            <a:schemeClr val="tx1"/>
-          </a:fontRef>
-        </p:style>
-      </p:cxnSp>
       <mc:AlternateContent xmlns:mc="http://schemas.openxmlformats.org/markup-compatibility/2006">
         <mc:Choice xmlns:a14="http://schemas.microsoft.com/office/drawing/2010/main" Requires="a14">
           <p:sp>
             <p:nvSpPr>
-              <p:cNvPr id="3" name="Content Placeholder 2">
+              <p:cNvPr id="20" name="Content Placeholder 2">
                 <a:extLst>
                   <a:ext uri="{FF2B5EF4-FFF2-40B4-BE49-F238E27FC236}">
-                    <a16:creationId xmlns:a16="http://schemas.microsoft.com/office/drawing/2014/main" id="{1A8FA9B3-1B32-894B-93C2-F90FB63CBDAA}"/>
+                    <a16:creationId xmlns:a16="http://schemas.microsoft.com/office/drawing/2014/main" id="{7F45E35B-88DA-2D46-A701-7F04DC91A295}"/>
                   </a:ext>
                 </a:extLst>
               </p:cNvPr>
-              <p:cNvSpPr>
-                <a:spLocks noGrp="1"/>
+              <p:cNvSpPr txBox="1">
+                <a:spLocks/>
               </p:cNvSpPr>
-              <p:nvPr>
-                <p:ph idx="1"/>
-              </p:nvPr>
+              <p:nvPr/>
             </p:nvSpPr>
             <p:spPr>
               <a:xfrm>
                 <a:off x="108754" y="1526771"/>
-                <a:ext cx="3537123" cy="4351338"/>
+                <a:ext cx="3655403" cy="4351338"/>
               </a:xfrm>
+              <a:prstGeom prst="rect">
+                <a:avLst/>
+              </a:prstGeom>
             </p:spPr>
             <p:txBody>
-              <a:bodyPr>
+              <a:bodyPr vert="horz" lIns="91440" tIns="45720" rIns="91440" bIns="45720" rtlCol="0">
                 <a:normAutofit/>
               </a:bodyPr>
-              <a:lstStyle/>
+              <a:lstStyle>
+                <a:lvl1pPr marL="228600" indent="-228600" algn="l" defTabSz="914400" rtl="0" eaLnBrk="1" latinLnBrk="0" hangingPunct="1">
+                  <a:lnSpc>
+                    <a:spcPct val="90000"/>
+                  </a:lnSpc>
+                  <a:spcBef>
+                    <a:spcPts val="1000"/>
+                  </a:spcBef>
+                  <a:buFont typeface="Arial" panose="020B0604020202020204" pitchFamily="34" charset="0"/>
+                  <a:buChar char="•"/>
+                  <a:defRPr sz="2800" b="0" i="0" kern="1200">
+                    <a:solidFill>
+                      <a:schemeClr val="tx1"/>
+                    </a:solidFill>
+                    <a:latin typeface="Arial" panose="020B0604020202020204" pitchFamily="34" charset="0"/>
+                    <a:ea typeface="+mn-ea"/>
+                    <a:cs typeface="+mn-cs"/>
+                  </a:defRPr>
+                </a:lvl1pPr>
+                <a:lvl2pPr marL="685800" indent="-228600" algn="l" defTabSz="914400" rtl="0" eaLnBrk="1" latinLnBrk="0" hangingPunct="1">
+                  <a:lnSpc>
+                    <a:spcPct val="90000"/>
+                  </a:lnSpc>
+                  <a:spcBef>
+                    <a:spcPts val="500"/>
+                  </a:spcBef>
+                  <a:buFont typeface="Arial" panose="020B0604020202020204" pitchFamily="34" charset="0"/>
+                  <a:buChar char="•"/>
+                  <a:defRPr sz="2400" b="0" i="0" kern="1200">
+                    <a:solidFill>
+                      <a:schemeClr val="tx1"/>
+                    </a:solidFill>
+                    <a:latin typeface="Arial" panose="020B0604020202020204" pitchFamily="34" charset="0"/>
+                    <a:ea typeface="+mn-ea"/>
+                    <a:cs typeface="+mn-cs"/>
+                  </a:defRPr>
+                </a:lvl2pPr>
+                <a:lvl3pPr marL="1143000" indent="-228600" algn="l" defTabSz="914400" rtl="0" eaLnBrk="1" latinLnBrk="0" hangingPunct="1">
+                  <a:lnSpc>
+                    <a:spcPct val="90000"/>
+                  </a:lnSpc>
+                  <a:spcBef>
+                    <a:spcPts val="500"/>
+                  </a:spcBef>
+                  <a:buFont typeface="Arial" panose="020B0604020202020204" pitchFamily="34" charset="0"/>
+                  <a:buChar char="•"/>
+                  <a:defRPr sz="2000" b="0" i="0" kern="1200">
+                    <a:solidFill>
+                      <a:schemeClr val="tx1"/>
+                    </a:solidFill>
+                    <a:latin typeface="Arial" panose="020B0604020202020204" pitchFamily="34" charset="0"/>
+                    <a:ea typeface="+mn-ea"/>
+                    <a:cs typeface="+mn-cs"/>
+                  </a:defRPr>
+                </a:lvl3pPr>
+                <a:lvl4pPr marL="1600200" indent="-228600" algn="l" defTabSz="914400" rtl="0" eaLnBrk="1" latinLnBrk="0" hangingPunct="1">
+                  <a:lnSpc>
+                    <a:spcPct val="90000"/>
+                  </a:lnSpc>
+                  <a:spcBef>
+                    <a:spcPts val="500"/>
+                  </a:spcBef>
+                  <a:buFont typeface="Arial" panose="020B0604020202020204" pitchFamily="34" charset="0"/>
+                  <a:buChar char="•"/>
+                  <a:defRPr sz="1800" b="0" i="0" kern="1200">
+                    <a:solidFill>
+                      <a:schemeClr val="tx1"/>
+                    </a:solidFill>
+                    <a:latin typeface="Arial" panose="020B0604020202020204" pitchFamily="34" charset="0"/>
+                    <a:ea typeface="+mn-ea"/>
+                    <a:cs typeface="+mn-cs"/>
+                  </a:defRPr>
+                </a:lvl4pPr>
+                <a:lvl5pPr marL="2057400" indent="-228600" algn="l" defTabSz="914400" rtl="0" eaLnBrk="1" latinLnBrk="0" hangingPunct="1">
+                  <a:lnSpc>
+                    <a:spcPct val="90000"/>
+                  </a:lnSpc>
+                  <a:spcBef>
+                    <a:spcPts val="500"/>
+                  </a:spcBef>
+                  <a:buFont typeface="Arial" panose="020B0604020202020204" pitchFamily="34" charset="0"/>
+                  <a:buChar char="•"/>
+                  <a:defRPr sz="1800" b="0" i="0" kern="1200">
+                    <a:solidFill>
+                      <a:schemeClr val="tx1"/>
+                    </a:solidFill>
+                    <a:latin typeface="Arial" panose="020B0604020202020204" pitchFamily="34" charset="0"/>
+                    <a:ea typeface="+mn-ea"/>
+                    <a:cs typeface="+mn-cs"/>
+                  </a:defRPr>
+                </a:lvl5pPr>
+                <a:lvl6pPr marL="2514600" indent="-228600" algn="l" defTabSz="914400" rtl="0" eaLnBrk="1" latinLnBrk="0" hangingPunct="1">
+                  <a:lnSpc>
+                    <a:spcPct val="90000"/>
+                  </a:lnSpc>
+                  <a:spcBef>
+                    <a:spcPts val="500"/>
+                  </a:spcBef>
+                  <a:buFont typeface="Arial" panose="020B0604020202020204" pitchFamily="34" charset="0"/>
+                  <a:buChar char="•"/>
+                  <a:defRPr sz="1800" kern="1200">
+                    <a:solidFill>
+                      <a:schemeClr val="tx1"/>
+                    </a:solidFill>
+                    <a:latin typeface="+mn-lt"/>
+                    <a:ea typeface="+mn-ea"/>
+                    <a:cs typeface="+mn-cs"/>
+                  </a:defRPr>
+                </a:lvl6pPr>
+                <a:lvl7pPr marL="2971800" indent="-228600" algn="l" defTabSz="914400" rtl="0" eaLnBrk="1" latinLnBrk="0" hangingPunct="1">
+                  <a:lnSpc>
+                    <a:spcPct val="90000"/>
+                  </a:lnSpc>
+                  <a:spcBef>
+                    <a:spcPts val="500"/>
+                  </a:spcBef>
+                  <a:buFont typeface="Arial" panose="020B0604020202020204" pitchFamily="34" charset="0"/>
+                  <a:buChar char="•"/>
+                  <a:defRPr sz="1800" kern="1200">
+                    <a:solidFill>
+                      <a:schemeClr val="tx1"/>
+                    </a:solidFill>
+                    <a:latin typeface="+mn-lt"/>
+                    <a:ea typeface="+mn-ea"/>
+                    <a:cs typeface="+mn-cs"/>
+                  </a:defRPr>
+                </a:lvl7pPr>
+                <a:lvl8pPr marL="3429000" indent="-228600" algn="l" defTabSz="914400" rtl="0" eaLnBrk="1" latinLnBrk="0" hangingPunct="1">
+                  <a:lnSpc>
+                    <a:spcPct val="90000"/>
+                  </a:lnSpc>
+                  <a:spcBef>
+                    <a:spcPts val="500"/>
+                  </a:spcBef>
+                  <a:buFont typeface="Arial" panose="020B0604020202020204" pitchFamily="34" charset="0"/>
+                  <a:buChar char="•"/>
+                  <a:defRPr sz="1800" kern="1200">
+                    <a:solidFill>
+                      <a:schemeClr val="tx1"/>
+                    </a:solidFill>
+                    <a:latin typeface="+mn-lt"/>
+                    <a:ea typeface="+mn-ea"/>
+                    <a:cs typeface="+mn-cs"/>
+                  </a:defRPr>
+                </a:lvl8pPr>
+                <a:lvl9pPr marL="3886200" indent="-228600" algn="l" defTabSz="914400" rtl="0" eaLnBrk="1" latinLnBrk="0" hangingPunct="1">
+                  <a:lnSpc>
+                    <a:spcPct val="90000"/>
+                  </a:lnSpc>
+                  <a:spcBef>
+                    <a:spcPts val="500"/>
+                  </a:spcBef>
+                  <a:buFont typeface="Arial" panose="020B0604020202020204" pitchFamily="34" charset="0"/>
+                  <a:buChar char="•"/>
+                  <a:defRPr sz="1800" kern="1200">
+                    <a:solidFill>
+                      <a:schemeClr val="tx1"/>
+                    </a:solidFill>
+                    <a:latin typeface="+mn-lt"/>
+                    <a:ea typeface="+mn-ea"/>
+                    <a:cs typeface="+mn-cs"/>
+                  </a:defRPr>
+                </a:lvl9pPr>
+              </a:lstStyle>
               <a:p>
                 <a:pPr>
                   <a:lnSpc>
@@ -14396,15 +15023,79 @@
                 </a:pPr>
                 <a:r>
                   <a:rPr lang="en-US" sz="2200" dirty="0"/>
-                  <a:t>Consider the ratio of the momentum projection </a:t>
-                </a:r>
-                <a:r>
-                  <a:rPr lang="en-US" sz="2200" dirty="0" err="1"/>
-                  <a:t>operator</a:t>
+                  <a:t>Consider the ratio of </a:t>
+                </a:r>
+                <a:r>
+                  <a:rPr lang="en-US" sz="2200" baseline="30000" dirty="0">
+                    <a:solidFill>
+                      <a:srgbClr val="C00000"/>
+                    </a:solidFill>
+                  </a:rPr>
+                  <a:t>3</a:t>
+                </a:r>
+                <a:r>
+                  <a:rPr lang="en-US" sz="2200" dirty="0">
+                    <a:solidFill>
+                      <a:srgbClr val="C00000"/>
+                    </a:solidFill>
+                  </a:rPr>
+                  <a:t>S</a:t>
+                </a:r>
+                <a:r>
+                  <a:rPr lang="en-US" sz="2200" baseline="-25000" dirty="0">
+                    <a:solidFill>
+                      <a:srgbClr val="C00000"/>
+                    </a:solidFill>
+                  </a:rPr>
+                  <a:t>1 </a:t>
                 </a:r>
                 <a:r>
                   <a:rPr lang="en-US" sz="2200" dirty="0"/>
+                  <a:t>to</a:t>
+                </a:r>
+                <a:r>
+                  <a:rPr lang="en-US" sz="2200" baseline="-25000" dirty="0">
+                    <a:solidFill>
+                      <a:srgbClr val="C00000"/>
+                    </a:solidFill>
+                  </a:rPr>
                   <a:t> </a:t>
+                </a:r>
+                <a:r>
+                  <a:rPr lang="en-US" sz="2200" baseline="30000" dirty="0">
+                    <a:solidFill>
+                      <a:srgbClr val="C00000"/>
+                    </a:solidFill>
+                  </a:rPr>
+                  <a:t>1</a:t>
+                </a:r>
+                <a:r>
+                  <a:rPr lang="en-US" sz="2200" dirty="0">
+                    <a:solidFill>
+                      <a:srgbClr val="C00000"/>
+                    </a:solidFill>
+                  </a:rPr>
+                  <a:t>S</a:t>
+                </a:r>
+                <a:r>
+                  <a:rPr lang="en-US" sz="2200" baseline="-25000" dirty="0">
+                    <a:solidFill>
+                      <a:srgbClr val="C00000"/>
+                    </a:solidFill>
+                  </a:rPr>
+                  <a:t>0</a:t>
+                </a:r>
+                <a:r>
+                  <a:rPr lang="en-US" sz="2200" dirty="0">
+                    <a:solidFill>
+                      <a:srgbClr val="C00000"/>
+                    </a:solidFill>
+                  </a:rPr>
+                  <a:t> </a:t>
+                </a:r>
+                <a:r>
+                  <a:rPr lang="en-US" sz="2200" dirty="0"/>
+                  <a:t>evolved momentum projection operators </a:t>
                 </a:r>
                 <a14:m>
                   <m:oMath xmlns:m="http://schemas.openxmlformats.org/officeDocument/2006/math">
@@ -14490,109 +15181,7 @@
                     </m:sSub>
                   </m:oMath>
                 </a14:m>
-                <a:r>
-                  <a:rPr lang="en-US" sz="2200" dirty="0">
-                    <a:solidFill>
-                      <a:srgbClr val="C00000"/>
-                    </a:solidFill>
-                  </a:rPr>
-                  <a:t> </a:t>
-                </a:r>
-                <a:r>
-                  <a:rPr lang="en-US" sz="2200" dirty="0"/>
-                  <a:t>for </a:t>
-                </a:r>
-                <a:r>
-                  <a:rPr lang="en-US" sz="2200" baseline="30000" dirty="0">
-                    <a:solidFill>
-                      <a:srgbClr val="C00000"/>
-                    </a:solidFill>
-                  </a:rPr>
-                  <a:t>3</a:t>
-                </a:r>
-                <a:r>
-                  <a:rPr lang="en-US" sz="2200" dirty="0">
-                    <a:solidFill>
-                      <a:srgbClr val="C00000"/>
-                    </a:solidFill>
-                  </a:rPr>
-                  <a:t>S</a:t>
-                </a:r>
-                <a:r>
-                  <a:rPr lang="en-US" sz="2200" baseline="-25000" dirty="0">
-                    <a:solidFill>
-                      <a:srgbClr val="C00000"/>
-                    </a:solidFill>
-                  </a:rPr>
-                  <a:t>1</a:t>
-                </a:r>
-                <a:r>
-                  <a:rPr lang="en-US" sz="2200" dirty="0">
-                    <a:solidFill>
-                      <a:srgbClr val="C00000"/>
-                    </a:solidFill>
-                  </a:rPr>
-                  <a:t>/</a:t>
-                </a:r>
-                <a:r>
-                  <a:rPr lang="en-US" sz="2200" baseline="30000" dirty="0">
-                    <a:solidFill>
-                      <a:srgbClr val="C00000"/>
-                    </a:solidFill>
-                  </a:rPr>
-                  <a:t>1</a:t>
-                </a:r>
-                <a:r>
-                  <a:rPr lang="en-US" sz="2200" dirty="0">
-                    <a:solidFill>
-                      <a:srgbClr val="C00000"/>
-                    </a:solidFill>
-                  </a:rPr>
-                  <a:t>S</a:t>
-                </a:r>
-                <a:r>
-                  <a:rPr lang="en-US" sz="2200" baseline="-25000" dirty="0">
-                    <a:solidFill>
-                      <a:srgbClr val="C00000"/>
-                    </a:solidFill>
-                  </a:rPr>
-                  <a:t>0</a:t>
-                </a:r>
                 <a:endParaRPr lang="en-US" sz="2200" dirty="0">
-                  <a:solidFill>
-                    <a:srgbClr val="C00000"/>
-                  </a:solidFill>
-                </a:endParaRPr>
-              </a:p>
-              <a:p>
-                <a:pPr>
-                  <a:lnSpc>
-                    <a:spcPct val="100000"/>
-                  </a:lnSpc>
-                </a:pPr>
-                <a:r>
-                  <a:rPr lang="en-US" sz="2200" dirty="0">
-                    <a:latin typeface="Arial" panose="020B0604020202020204" pitchFamily="34" charset="0"/>
-                  </a:rPr>
-                  <a:t>Reproduces the characteristics of the cross section ratios with </a:t>
-                </a:r>
-                <a:r>
-                  <a:rPr lang="en-US" sz="2200" dirty="0">
-                    <a:solidFill>
-                      <a:srgbClr val="C00000"/>
-                    </a:solidFill>
-                    <a:latin typeface="Arial" panose="020B0604020202020204" pitchFamily="34" charset="0"/>
-                  </a:rPr>
-                  <a:t>low RG resolution operators</a:t>
-                </a:r>
-              </a:p>
-              <a:p>
-                <a:pPr>
-                  <a:lnSpc>
-                    <a:spcPct val="100000"/>
-                  </a:lnSpc>
-                </a:pPr>
-                <a:endParaRPr lang="en-US" sz="2400" dirty="0">
                   <a:solidFill>
                     <a:srgbClr val="C00000"/>
                   </a:solidFill>
@@ -14604,29 +15193,30 @@
         <mc:Fallback>
           <p:sp>
             <p:nvSpPr>
-              <p:cNvPr id="3" name="Content Placeholder 2">
+              <p:cNvPr id="20" name="Content Placeholder 2">
                 <a:extLst>
                   <a:ext uri="{FF2B5EF4-FFF2-40B4-BE49-F238E27FC236}">
-                    <a16:creationId xmlns:a16="http://schemas.microsoft.com/office/drawing/2014/main" id="{1A8FA9B3-1B32-894B-93C2-F90FB63CBDAA}"/>
+                    <a16:creationId xmlns:a16="http://schemas.microsoft.com/office/drawing/2014/main" id="{7F45E35B-88DA-2D46-A701-7F04DC91A295}"/>
                   </a:ext>
                 </a:extLst>
               </p:cNvPr>
-              <p:cNvSpPr>
-                <a:spLocks noGrp="1" noRot="1" noChangeAspect="1" noMove="1" noResize="1" noEditPoints="1" noAdjustHandles="1" noChangeArrowheads="1" noChangeShapeType="1" noTextEdit="1"/>
+              <p:cNvSpPr txBox="1">
+                <a:spLocks noRot="1" noChangeAspect="1" noMove="1" noResize="1" noEditPoints="1" noAdjustHandles="1" noChangeArrowheads="1" noChangeShapeType="1" noTextEdit="1"/>
               </p:cNvSpPr>
-              <p:nvPr>
-                <p:ph idx="1"/>
-              </p:nvPr>
+              <p:nvPr/>
             </p:nvSpPr>
             <p:spPr>
               <a:xfrm>
                 <a:off x="108754" y="1526771"/>
-                <a:ext cx="3537123" cy="4351338"/>
+                <a:ext cx="3655403" cy="4351338"/>
               </a:xfrm>
+              <a:prstGeom prst="rect">
+                <a:avLst/>
+              </a:prstGeom>
               <a:blipFill>
                 <a:blip r:embed="rId7"/>
                 <a:stretch>
-                  <a:fillRect l="-2143" t="-875" r="-1429"/>
+                  <a:fillRect l="-2076" t="-875" r="-2768"/>
                 </a:stretch>
               </a:blipFill>
             </p:spPr>
@@ -14645,6 +15235,218 @@
           </p:sp>
         </mc:Fallback>
       </mc:AlternateContent>
+    </p:spTree>
+    <p:extLst>
+      <p:ext uri="{BB962C8B-B14F-4D97-AF65-F5344CB8AC3E}">
+        <p14:creationId xmlns:p14="http://schemas.microsoft.com/office/powerpoint/2010/main" val="376960596"/>
+      </p:ext>
+    </p:extLst>
+  </p:cSld>
+  <p:clrMapOvr>
+    <a:masterClrMapping/>
+  </p:clrMapOvr>
+</p:sld>
+</file>
+
+<file path=ppt/slides/slide21.xml><?xml version="1.0" encoding="utf-8"?>
+<p:sld xmlns:a="http://schemas.openxmlformats.org/drawingml/2006/main" xmlns:r="http://schemas.openxmlformats.org/officeDocument/2006/relationships" xmlns:p="http://schemas.openxmlformats.org/presentationml/2006/main">
+  <p:cSld>
+    <p:spTree>
+      <p:nvGrpSpPr>
+        <p:cNvPr id="1" name=""/>
+        <p:cNvGrpSpPr/>
+        <p:nvPr/>
+      </p:nvGrpSpPr>
+      <p:grpSpPr>
+        <a:xfrm>
+          <a:off x="0" y="0"/>
+          <a:ext cx="0" cy="0"/>
+          <a:chOff x="0" y="0"/>
+          <a:chExt cx="0" cy="0"/>
+        </a:xfrm>
+      </p:grpSpPr>
+      <p:pic>
+        <p:nvPicPr>
+          <p:cNvPr id="5" name="Picture 4">
+            <a:extLst>
+              <a:ext uri="{FF2B5EF4-FFF2-40B4-BE49-F238E27FC236}">
+                <a16:creationId xmlns:a16="http://schemas.microsoft.com/office/drawing/2014/main" id="{A7C4C11B-F0D8-E445-8719-58CB080A4AA6}"/>
+              </a:ext>
+            </a:extLst>
+          </p:cNvPr>
+          <p:cNvPicPr>
+            <a:picLocks noChangeAspect="1"/>
+          </p:cNvPicPr>
+          <p:nvPr/>
+        </p:nvPicPr>
+        <p:blipFill>
+          <a:blip r:embed="rId3"/>
+          <a:stretch>
+            <a:fillRect/>
+          </a:stretch>
+        </p:blipFill>
+        <p:spPr>
+          <a:xfrm>
+            <a:off x="3367797" y="1489037"/>
+            <a:ext cx="8824203" cy="3291840"/>
+          </a:xfrm>
+          <a:prstGeom prst="rect">
+            <a:avLst/>
+          </a:prstGeom>
+        </p:spPr>
+      </p:pic>
+      <p:cxnSp>
+        <p:nvCxnSpPr>
+          <p:cNvPr id="12" name="Straight Arrow Connector 11">
+            <a:extLst>
+              <a:ext uri="{FF2B5EF4-FFF2-40B4-BE49-F238E27FC236}">
+                <a16:creationId xmlns:a16="http://schemas.microsoft.com/office/drawing/2014/main" id="{431343DE-00C1-494C-A482-4C0BDC45E4F2}"/>
+              </a:ext>
+            </a:extLst>
+          </p:cNvPr>
+          <p:cNvCxnSpPr>
+            <a:cxnSpLocks/>
+          </p:cNvCxnSpPr>
+          <p:nvPr/>
+        </p:nvCxnSpPr>
+        <p:spPr>
+          <a:xfrm>
+            <a:off x="11769969" y="1301262"/>
+            <a:ext cx="114643" cy="890953"/>
+          </a:xfrm>
+          <a:prstGeom prst="straightConnector1">
+            <a:avLst/>
+          </a:prstGeom>
+          <a:ln w="38100">
+            <a:solidFill>
+              <a:srgbClr val="FF0000"/>
+            </a:solidFill>
+            <a:tailEnd type="triangle"/>
+          </a:ln>
+        </p:spPr>
+        <p:style>
+          <a:lnRef idx="1">
+            <a:schemeClr val="accent1"/>
+          </a:lnRef>
+          <a:fillRef idx="0">
+            <a:schemeClr val="accent1"/>
+          </a:fillRef>
+          <a:effectRef idx="0">
+            <a:schemeClr val="accent1"/>
+          </a:effectRef>
+          <a:fontRef idx="minor">
+            <a:schemeClr val="tx1"/>
+          </a:fontRef>
+        </p:style>
+      </p:cxnSp>
+      <p:sp>
+        <p:nvSpPr>
+          <p:cNvPr id="14" name="TextBox 13">
+            <a:extLst>
+              <a:ext uri="{FF2B5EF4-FFF2-40B4-BE49-F238E27FC236}">
+                <a16:creationId xmlns:a16="http://schemas.microsoft.com/office/drawing/2014/main" id="{537DEB5B-837B-2241-A42B-B9DE25FE1E6B}"/>
+              </a:ext>
+            </a:extLst>
+          </p:cNvPr>
+          <p:cNvSpPr txBox="1"/>
+          <p:nvPr/>
+        </p:nvSpPr>
+        <p:spPr>
+          <a:xfrm>
+            <a:off x="10977607" y="931929"/>
+            <a:ext cx="1213474" cy="369332"/>
+          </a:xfrm>
+          <a:prstGeom prst="rect">
+            <a:avLst/>
+          </a:prstGeom>
+          <a:noFill/>
+        </p:spPr>
+        <p:txBody>
+          <a:bodyPr wrap="none" rtlCol="0">
+            <a:spAutoFit/>
+          </a:bodyPr>
+          <a:lstStyle/>
+          <a:p>
+            <a:r>
+              <a:rPr lang="en-US" dirty="0"/>
+              <a:t>Scalar limit</a:t>
+            </a:r>
+          </a:p>
+        </p:txBody>
+      </p:sp>
+      <p:pic>
+        <p:nvPicPr>
+          <p:cNvPr id="30" name="Picture 29">
+            <a:extLst>
+              <a:ext uri="{FF2B5EF4-FFF2-40B4-BE49-F238E27FC236}">
+                <a16:creationId xmlns:a16="http://schemas.microsoft.com/office/drawing/2014/main" id="{4D6EFE7B-130F-0D43-ACAC-DD81825C733D}"/>
+              </a:ext>
+            </a:extLst>
+          </p:cNvPr>
+          <p:cNvPicPr>
+            <a:picLocks noChangeAspect="1"/>
+          </p:cNvPicPr>
+          <p:nvPr/>
+        </p:nvPicPr>
+        <p:blipFill>
+          <a:blip r:embed="rId4"/>
+          <a:srcRect/>
+          <a:stretch/>
+        </p:blipFill>
+        <p:spPr>
+          <a:xfrm>
+            <a:off x="3470389" y="1371600"/>
+            <a:ext cx="4630993" cy="4114800"/>
+          </a:xfrm>
+          <a:prstGeom prst="rect">
+            <a:avLst/>
+          </a:prstGeom>
+        </p:spPr>
+      </p:pic>
+      <p:cxnSp>
+        <p:nvCxnSpPr>
+          <p:cNvPr id="16" name="Straight Arrow Connector 15">
+            <a:extLst>
+              <a:ext uri="{FF2B5EF4-FFF2-40B4-BE49-F238E27FC236}">
+                <a16:creationId xmlns:a16="http://schemas.microsoft.com/office/drawing/2014/main" id="{DC33DE1A-E403-3D42-BF15-F346CE02D286}"/>
+              </a:ext>
+            </a:extLst>
+          </p:cNvPr>
+          <p:cNvCxnSpPr>
+            <a:cxnSpLocks/>
+          </p:cNvCxnSpPr>
+          <p:nvPr/>
+        </p:nvCxnSpPr>
+        <p:spPr>
+          <a:xfrm>
+            <a:off x="7420893" y="3065055"/>
+            <a:ext cx="114643" cy="890953"/>
+          </a:xfrm>
+          <a:prstGeom prst="straightConnector1">
+            <a:avLst/>
+          </a:prstGeom>
+          <a:ln w="38100">
+            <a:solidFill>
+              <a:srgbClr val="FF0000"/>
+            </a:solidFill>
+            <a:tailEnd type="triangle"/>
+          </a:ln>
+        </p:spPr>
+        <p:style>
+          <a:lnRef idx="1">
+            <a:schemeClr val="accent1"/>
+          </a:lnRef>
+          <a:fillRef idx="0">
+            <a:schemeClr val="accent1"/>
+          </a:fillRef>
+          <a:effectRef idx="0">
+            <a:schemeClr val="accent1"/>
+          </a:effectRef>
+          <a:fontRef idx="minor">
+            <a:schemeClr val="tx1"/>
+          </a:fontRef>
+        </p:style>
+      </p:cxnSp>
       <p:sp>
         <p:nvSpPr>
           <p:cNvPr id="17" name="TextBox 16">
@@ -14982,6 +15784,35 @@
           </a:p>
         </p:txBody>
       </p:sp>
+      <p:sp>
+        <p:nvSpPr>
+          <p:cNvPr id="2" name="Slide Number Placeholder 1">
+            <a:extLst>
+              <a:ext uri="{FF2B5EF4-FFF2-40B4-BE49-F238E27FC236}">
+                <a16:creationId xmlns:a16="http://schemas.microsoft.com/office/drawing/2014/main" id="{1F671669-20AD-1E43-89ED-4AD0728A8E7B}"/>
+              </a:ext>
+            </a:extLst>
+          </p:cNvPr>
+          <p:cNvSpPr>
+            <a:spLocks noGrp="1"/>
+          </p:cNvSpPr>
+          <p:nvPr>
+            <p:ph type="sldNum" sz="quarter" idx="12"/>
+          </p:nvPr>
+        </p:nvSpPr>
+        <p:spPr/>
+        <p:txBody>
+          <a:bodyPr/>
+          <a:lstStyle/>
+          <a:p>
+            <a:fld id="{DD20F09D-B375-B446-8D61-90653E4EE1AB}" type="slidenum">
+              <a:rPr lang="en-US" smtClean="0"/>
+              <a:t>21</a:t>
+            </a:fld>
+            <a:endParaRPr lang="en-US"/>
+          </a:p>
+        </p:txBody>
+      </p:sp>
       <p:cxnSp>
         <p:nvCxnSpPr>
           <p:cNvPr id="15" name="Straight Arrow Connector 14">
@@ -15024,95 +15855,981 @@
           </a:fontRef>
         </p:style>
       </p:cxnSp>
+      <mc:AlternateContent xmlns:mc="http://schemas.openxmlformats.org/markup-compatibility/2006">
+        <mc:Choice xmlns:a14="http://schemas.microsoft.com/office/drawing/2010/main" Requires="a14">
+          <p:sp>
+            <p:nvSpPr>
+              <p:cNvPr id="31" name="TextBox 30">
+                <a:extLst>
+                  <a:ext uri="{FF2B5EF4-FFF2-40B4-BE49-F238E27FC236}">
+                    <a16:creationId xmlns:a16="http://schemas.microsoft.com/office/drawing/2014/main" id="{A95D0083-91DC-1444-85F5-7C2637DCFF35}"/>
+                  </a:ext>
+                </a:extLst>
+              </p:cNvPr>
+              <p:cNvSpPr txBox="1"/>
+              <p:nvPr/>
+            </p:nvSpPr>
+            <p:spPr>
+              <a:xfrm>
+                <a:off x="6280956" y="1589326"/>
+                <a:ext cx="1483996" cy="899092"/>
+              </a:xfrm>
+              <a:prstGeom prst="rect">
+                <a:avLst/>
+              </a:prstGeom>
+              <a:noFill/>
+            </p:spPr>
+            <p:txBody>
+              <a:bodyPr wrap="none" lIns="0" tIns="0" rIns="0" bIns="0" rtlCol="0">
+                <a:spAutoFit/>
+              </a:bodyPr>
+              <a:lstStyle/>
+              <a:p>
+                <a14:m>
+                  <m:oMathPara xmlns:m="http://schemas.openxmlformats.org/officeDocument/2006/math">
+                    <m:oMathParaPr>
+                      <m:jc m:val="centerGroup"/>
+                    </m:oMathParaPr>
+                    <m:oMath xmlns:m="http://schemas.openxmlformats.org/officeDocument/2006/math">
+                      <m:f>
+                        <m:fPr>
+                          <m:ctrlPr>
+                            <a:rPr lang="en-US" sz="2200" i="1" smtClean="0">
+                              <a:latin typeface="Cambria Math" panose="02040503050406030204" pitchFamily="18" charset="0"/>
+                            </a:rPr>
+                          </m:ctrlPr>
+                        </m:fPr>
+                        <m:num>
+                          <m:r>
+                            <a:rPr lang="en-US" sz="2200" i="1" smtClean="0">
+                              <a:latin typeface="Cambria Math" panose="02040503050406030204" pitchFamily="18" charset="0"/>
+                            </a:rPr>
+                            <m:t> </m:t>
+                          </m:r>
+                          <m:sSub>
+                            <m:sSubPr>
+                              <m:ctrlPr>
+                                <a:rPr lang="en-US" sz="2200" i="1" smtClean="0">
+                                  <a:latin typeface="Cambria Math" panose="02040503050406030204" pitchFamily="18" charset="0"/>
+                                </a:rPr>
+                              </m:ctrlPr>
+                            </m:sSubPr>
+                            <m:e>
+                              <m:sSup>
+                                <m:sSupPr>
+                                  <m:ctrlPr>
+                                    <a:rPr lang="en-US" sz="2200" i="1">
+                                      <a:latin typeface="Cambria Math" panose="02040503050406030204" pitchFamily="18" charset="0"/>
+                                    </a:rPr>
+                                  </m:ctrlPr>
+                                </m:sSupPr>
+                                <m:e>
+                                  <m:sSubSup>
+                                    <m:sSubSupPr>
+                                      <m:ctrlPr>
+                                        <a:rPr lang="en-US" sz="2200" i="1">
+                                          <a:latin typeface="Cambria Math" panose="02040503050406030204" pitchFamily="18" charset="0"/>
+                                        </a:rPr>
+                                      </m:ctrlPr>
+                                    </m:sSubSupPr>
+                                    <m:e>
+                                      <m:r>
+                                        <a:rPr lang="en-US" sz="2200" i="1">
+                                          <a:latin typeface="Cambria Math" panose="02040503050406030204" pitchFamily="18" charset="0"/>
+                                        </a:rPr>
+                                        <m:t>𝑎</m:t>
+                                      </m:r>
+                                    </m:e>
+                                    <m:sub>
+                                      <m:r>
+                                        <a:rPr lang="en-US" sz="2200" i="1">
+                                          <a:latin typeface="Cambria Math" panose="02040503050406030204" pitchFamily="18" charset="0"/>
+                                        </a:rPr>
+                                        <m:t>𝑞</m:t>
+                                      </m:r>
+                                    </m:sub>
+                                    <m:sup>
+                                      <m:r>
+                                        <a:rPr lang="en-US" sz="2200" i="1">
+                                          <a:latin typeface="Cambria Math" panose="02040503050406030204" pitchFamily="18" charset="0"/>
+                                          <a:ea typeface="Cambria Math" panose="02040503050406030204" pitchFamily="18" charset="0"/>
+                                        </a:rPr>
+                                        <m:t>†</m:t>
+                                      </m:r>
+                                    </m:sup>
+                                  </m:sSubSup>
+                                  <m:sSub>
+                                    <m:sSubPr>
+                                      <m:ctrlPr>
+                                        <a:rPr lang="en-US" sz="2200" i="1">
+                                          <a:latin typeface="Cambria Math" panose="02040503050406030204" pitchFamily="18" charset="0"/>
+                                        </a:rPr>
+                                      </m:ctrlPr>
+                                    </m:sSubPr>
+                                    <m:e>
+                                      <m:r>
+                                        <a:rPr lang="en-US" sz="2200" i="1">
+                                          <a:latin typeface="Cambria Math" panose="02040503050406030204" pitchFamily="18" charset="0"/>
+                                        </a:rPr>
+                                        <m:t>𝑎</m:t>
+                                      </m:r>
+                                    </m:e>
+                                    <m:sub>
+                                      <m:r>
+                                        <a:rPr lang="en-US" sz="2200" i="1">
+                                          <a:latin typeface="Cambria Math" panose="02040503050406030204" pitchFamily="18" charset="0"/>
+                                        </a:rPr>
+                                        <m:t>𝑞</m:t>
+                                      </m:r>
+                                    </m:sub>
+                                  </m:sSub>
+                                  <m:r>
+                                    <a:rPr lang="en-US" sz="2200" i="1">
+                                      <a:latin typeface="Cambria Math" panose="02040503050406030204" pitchFamily="18" charset="0"/>
+                                    </a:rPr>
+                                    <m:t>(</m:t>
+                                  </m:r>
+                                </m:e>
+                                <m:sup>
+                                  <m:r>
+                                    <a:rPr lang="en-US" sz="2200" i="1">
+                                      <a:latin typeface="Cambria Math" panose="02040503050406030204" pitchFamily="18" charset="0"/>
+                                    </a:rPr>
+                                    <m:t>3</m:t>
+                                  </m:r>
+                                </m:sup>
+                              </m:sSup>
+                              <m:sSub>
+                                <m:sSubPr>
+                                  <m:ctrlPr>
+                                    <a:rPr lang="en-US" sz="2200" i="1">
+                                      <a:latin typeface="Cambria Math" panose="02040503050406030204" pitchFamily="18" charset="0"/>
+                                    </a:rPr>
+                                  </m:ctrlPr>
+                                </m:sSubPr>
+                                <m:e>
+                                  <m:r>
+                                    <a:rPr lang="en-US" sz="2200" i="1">
+                                      <a:latin typeface="Cambria Math" panose="02040503050406030204" pitchFamily="18" charset="0"/>
+                                    </a:rPr>
+                                    <m:t>𝑆</m:t>
+                                  </m:r>
+                                </m:e>
+                                <m:sub>
+                                  <m:r>
+                                    <a:rPr lang="en-US" sz="2200" i="1">
+                                      <a:latin typeface="Cambria Math" panose="02040503050406030204" pitchFamily="18" charset="0"/>
+                                    </a:rPr>
+                                    <m:t>1</m:t>
+                                  </m:r>
+                                </m:sub>
+                              </m:sSub>
+                              <m:r>
+                                <a:rPr lang="en-US" sz="2200" i="1">
+                                  <a:latin typeface="Cambria Math" panose="02040503050406030204" pitchFamily="18" charset="0"/>
+                                </a:rPr>
+                                <m:t>)</m:t>
+                              </m:r>
+                            </m:e>
+                            <m:sub>
+                              <m:r>
+                                <a:rPr lang="en-US" sz="2200" i="1" smtClean="0">
+                                  <a:latin typeface="Cambria Math" panose="02040503050406030204" pitchFamily="18" charset="0"/>
+                                  <a:ea typeface="Cambria Math" panose="02040503050406030204" pitchFamily="18" charset="0"/>
+                                </a:rPr>
+                                <m:t>𝜆</m:t>
+                              </m:r>
+                            </m:sub>
+                          </m:sSub>
+                        </m:num>
+                        <m:den>
+                          <m:sSub>
+                            <m:sSubPr>
+                              <m:ctrlPr>
+                                <a:rPr lang="en-US" sz="2200" i="1">
+                                  <a:latin typeface="Cambria Math" panose="02040503050406030204" pitchFamily="18" charset="0"/>
+                                </a:rPr>
+                              </m:ctrlPr>
+                            </m:sSubPr>
+                            <m:e>
+                              <m:sSup>
+                                <m:sSupPr>
+                                  <m:ctrlPr>
+                                    <a:rPr lang="en-US" sz="2200" i="1">
+                                      <a:latin typeface="Cambria Math" panose="02040503050406030204" pitchFamily="18" charset="0"/>
+                                    </a:rPr>
+                                  </m:ctrlPr>
+                                </m:sSupPr>
+                                <m:e>
+                                  <m:sSubSup>
+                                    <m:sSubSupPr>
+                                      <m:ctrlPr>
+                                        <a:rPr lang="en-US" sz="2200" i="1">
+                                          <a:latin typeface="Cambria Math" panose="02040503050406030204" pitchFamily="18" charset="0"/>
+                                        </a:rPr>
+                                      </m:ctrlPr>
+                                    </m:sSubSupPr>
+                                    <m:e>
+                                      <m:r>
+                                        <a:rPr lang="en-US" sz="2200" i="1">
+                                          <a:latin typeface="Cambria Math" panose="02040503050406030204" pitchFamily="18" charset="0"/>
+                                        </a:rPr>
+                                        <m:t>𝑎</m:t>
+                                      </m:r>
+                                    </m:e>
+                                    <m:sub>
+                                      <m:r>
+                                        <a:rPr lang="en-US" sz="2200" i="1">
+                                          <a:latin typeface="Cambria Math" panose="02040503050406030204" pitchFamily="18" charset="0"/>
+                                        </a:rPr>
+                                        <m:t>𝑞</m:t>
+                                      </m:r>
+                                    </m:sub>
+                                    <m:sup>
+                                      <m:r>
+                                        <a:rPr lang="en-US" sz="2200" i="1">
+                                          <a:latin typeface="Cambria Math" panose="02040503050406030204" pitchFamily="18" charset="0"/>
+                                          <a:ea typeface="Cambria Math" panose="02040503050406030204" pitchFamily="18" charset="0"/>
+                                        </a:rPr>
+                                        <m:t>†</m:t>
+                                      </m:r>
+                                    </m:sup>
+                                  </m:sSubSup>
+                                  <m:sSub>
+                                    <m:sSubPr>
+                                      <m:ctrlPr>
+                                        <a:rPr lang="en-US" sz="2200" i="1">
+                                          <a:latin typeface="Cambria Math" panose="02040503050406030204" pitchFamily="18" charset="0"/>
+                                        </a:rPr>
+                                      </m:ctrlPr>
+                                    </m:sSubPr>
+                                    <m:e>
+                                      <m:r>
+                                        <a:rPr lang="en-US" sz="2200" i="1">
+                                          <a:latin typeface="Cambria Math" panose="02040503050406030204" pitchFamily="18" charset="0"/>
+                                        </a:rPr>
+                                        <m:t>𝑎</m:t>
+                                      </m:r>
+                                    </m:e>
+                                    <m:sub>
+                                      <m:r>
+                                        <a:rPr lang="en-US" sz="2200" i="1">
+                                          <a:latin typeface="Cambria Math" panose="02040503050406030204" pitchFamily="18" charset="0"/>
+                                        </a:rPr>
+                                        <m:t>𝑞</m:t>
+                                      </m:r>
+                                    </m:sub>
+                                  </m:sSub>
+                                  <m:r>
+                                    <a:rPr lang="en-US" sz="2200" i="1">
+                                      <a:latin typeface="Cambria Math" panose="02040503050406030204" pitchFamily="18" charset="0"/>
+                                    </a:rPr>
+                                    <m:t>(</m:t>
+                                  </m:r>
+                                </m:e>
+                                <m:sup>
+                                  <m:r>
+                                    <a:rPr lang="en-US" sz="2200" b="0" i="1" smtClean="0">
+                                      <a:latin typeface="Cambria Math" panose="02040503050406030204" pitchFamily="18" charset="0"/>
+                                    </a:rPr>
+                                    <m:t>1</m:t>
+                                  </m:r>
+                                </m:sup>
+                              </m:sSup>
+                              <m:sSub>
+                                <m:sSubPr>
+                                  <m:ctrlPr>
+                                    <a:rPr lang="en-US" sz="2200" i="1">
+                                      <a:latin typeface="Cambria Math" panose="02040503050406030204" pitchFamily="18" charset="0"/>
+                                    </a:rPr>
+                                  </m:ctrlPr>
+                                </m:sSubPr>
+                                <m:e>
+                                  <m:r>
+                                    <a:rPr lang="en-US" sz="2200" i="1">
+                                      <a:latin typeface="Cambria Math" panose="02040503050406030204" pitchFamily="18" charset="0"/>
+                                    </a:rPr>
+                                    <m:t>𝑆</m:t>
+                                  </m:r>
+                                </m:e>
+                                <m:sub>
+                                  <m:r>
+                                    <a:rPr lang="en-US" sz="2200" b="0" i="1" smtClean="0">
+                                      <a:latin typeface="Cambria Math" panose="02040503050406030204" pitchFamily="18" charset="0"/>
+                                    </a:rPr>
+                                    <m:t>0</m:t>
+                                  </m:r>
+                                </m:sub>
+                              </m:sSub>
+                              <m:r>
+                                <a:rPr lang="en-US" sz="2200" i="1">
+                                  <a:latin typeface="Cambria Math" panose="02040503050406030204" pitchFamily="18" charset="0"/>
+                                </a:rPr>
+                                <m:t>)</m:t>
+                              </m:r>
+                            </m:e>
+                            <m:sub>
+                              <m:r>
+                                <a:rPr lang="en-US" sz="2200" i="1">
+                                  <a:latin typeface="Cambria Math" panose="02040503050406030204" pitchFamily="18" charset="0"/>
+                                  <a:ea typeface="Cambria Math" panose="02040503050406030204" pitchFamily="18" charset="0"/>
+                                </a:rPr>
+                                <m:t>𝜆</m:t>
+                              </m:r>
+                            </m:sub>
+                          </m:sSub>
+                        </m:den>
+                      </m:f>
+                    </m:oMath>
+                  </m:oMathPara>
+                </a14:m>
+                <a:endParaRPr lang="en-US" sz="2200" dirty="0"/>
+              </a:p>
+            </p:txBody>
+          </p:sp>
+        </mc:Choice>
+        <mc:Fallback>
+          <p:sp>
+            <p:nvSpPr>
+              <p:cNvPr id="31" name="TextBox 30">
+                <a:extLst>
+                  <a:ext uri="{FF2B5EF4-FFF2-40B4-BE49-F238E27FC236}">
+                    <a16:creationId xmlns:a16="http://schemas.microsoft.com/office/drawing/2014/main" id="{A95D0083-91DC-1444-85F5-7C2637DCFF35}"/>
+                  </a:ext>
+                </a:extLst>
+              </p:cNvPr>
+              <p:cNvSpPr txBox="1">
+                <a:spLocks noRot="1" noChangeAspect="1" noMove="1" noResize="1" noEditPoints="1" noAdjustHandles="1" noChangeArrowheads="1" noChangeShapeType="1" noTextEdit="1"/>
+              </p:cNvSpPr>
+              <p:nvPr/>
+            </p:nvSpPr>
+            <p:spPr>
+              <a:xfrm>
+                <a:off x="6280956" y="1589326"/>
+                <a:ext cx="1483996" cy="899092"/>
+              </a:xfrm>
+              <a:prstGeom prst="rect">
+                <a:avLst/>
+              </a:prstGeom>
+              <a:blipFill>
+                <a:blip r:embed="rId5"/>
+                <a:stretch>
+                  <a:fillRect l="-6780" r="-1695" b="-9859"/>
+                </a:stretch>
+              </a:blipFill>
+            </p:spPr>
+            <p:txBody>
+              <a:bodyPr/>
+              <a:lstStyle/>
+              <a:p>
+                <a:r>
+                  <a:rPr lang="en-US">
+                    <a:noFill/>
+                  </a:rPr>
+                  <a:t> </a:t>
+                </a:r>
+              </a:p>
+            </p:txBody>
+          </p:sp>
+        </mc:Fallback>
+      </mc:AlternateContent>
       <p:sp>
         <p:nvSpPr>
-          <p:cNvPr id="24" name="TextBox 23">
+          <p:cNvPr id="32" name="Rectangle 31">
             <a:extLst>
               <a:ext uri="{FF2B5EF4-FFF2-40B4-BE49-F238E27FC236}">
-                <a16:creationId xmlns:a16="http://schemas.microsoft.com/office/drawing/2014/main" id="{1CD41D52-3A49-5B4C-88B6-45ED3C38757B}"/>
+                <a16:creationId xmlns:a16="http://schemas.microsoft.com/office/drawing/2014/main" id="{E9020419-621E-254B-9988-074CBF10A570}"/>
               </a:ext>
             </a:extLst>
           </p:cNvPr>
-          <p:cNvSpPr txBox="1"/>
+          <p:cNvSpPr/>
           <p:nvPr/>
         </p:nvSpPr>
         <p:spPr>
           <a:xfrm>
-            <a:off x="6727024" y="1670337"/>
-            <a:ext cx="1113692" cy="430887"/>
+            <a:off x="3574514" y="2151819"/>
+            <a:ext cx="406526" cy="1992923"/>
           </a:xfrm>
           <a:prstGeom prst="rect">
             <a:avLst/>
           </a:prstGeom>
-          <a:noFill/>
+          <a:solidFill>
+            <a:schemeClr val="bg1"/>
+          </a:solidFill>
+          <a:ln>
+            <a:noFill/>
+          </a:ln>
         </p:spPr>
+        <p:style>
+          <a:lnRef idx="2">
+            <a:schemeClr val="accent1">
+              <a:shade val="50000"/>
+            </a:schemeClr>
+          </a:lnRef>
+          <a:fillRef idx="1">
+            <a:schemeClr val="accent1"/>
+          </a:fillRef>
+          <a:effectRef idx="0">
+            <a:schemeClr val="accent1"/>
+          </a:effectRef>
+          <a:fontRef idx="minor">
+            <a:schemeClr val="lt1"/>
+          </a:fontRef>
+        </p:style>
         <p:txBody>
-          <a:bodyPr wrap="square" rtlCol="0">
-            <a:spAutoFit/>
-          </a:bodyPr>
+          <a:bodyPr rtlCol="0" anchor="ctr"/>
           <a:lstStyle/>
           <a:p>
-            <a:r>
-              <a:rPr lang="en-US" sz="2200" baseline="30000" dirty="0"/>
-              <a:t>3</a:t>
-            </a:r>
-            <a:r>
-              <a:rPr lang="en-US" sz="2200" dirty="0"/>
-              <a:t>S</a:t>
-            </a:r>
-            <a:r>
-              <a:rPr lang="en-US" sz="2200" baseline="-25000" dirty="0"/>
-              <a:t>1</a:t>
-            </a:r>
-            <a:r>
-              <a:rPr lang="en-US" sz="2200" dirty="0"/>
-              <a:t>/</a:t>
-            </a:r>
-            <a:r>
-              <a:rPr lang="en-US" sz="2200" baseline="30000" dirty="0"/>
-              <a:t>1</a:t>
-            </a:r>
-            <a:r>
-              <a:rPr lang="en-US" sz="2200" dirty="0"/>
-              <a:t>S</a:t>
-            </a:r>
-            <a:r>
-              <a:rPr lang="en-US" sz="2200" baseline="-25000" dirty="0"/>
-              <a:t>0</a:t>
-            </a:r>
-            <a:endParaRPr lang="en-US" sz="2200" baseline="30000" dirty="0"/>
+            <a:pPr algn="ctr"/>
+            <a:endParaRPr lang="en-US"/>
           </a:p>
         </p:txBody>
       </p:sp>
-      <p:sp>
-        <p:nvSpPr>
-          <p:cNvPr id="2" name="Slide Number Placeholder 1">
-            <a:extLst>
-              <a:ext uri="{FF2B5EF4-FFF2-40B4-BE49-F238E27FC236}">
-                <a16:creationId xmlns:a16="http://schemas.microsoft.com/office/drawing/2014/main" id="{1F671669-20AD-1E43-89ED-4AD0728A8E7B}"/>
-              </a:ext>
-            </a:extLst>
-          </p:cNvPr>
-          <p:cNvSpPr>
-            <a:spLocks noGrp="1"/>
-          </p:cNvSpPr>
-          <p:nvPr>
-            <p:ph type="sldNum" sz="quarter" idx="12"/>
-          </p:nvPr>
-        </p:nvSpPr>
-        <p:spPr/>
-        <p:txBody>
-          <a:bodyPr/>
-          <a:lstStyle/>
-          <a:p>
-            <a:fld id="{DD20F09D-B375-B446-8D61-90653E4EE1AB}" type="slidenum">
-              <a:rPr lang="en-US" smtClean="0"/>
-              <a:t>21</a:t>
-            </a:fld>
-            <a:endParaRPr lang="en-US"/>
-          </a:p>
-        </p:txBody>
-      </p:sp>
+      <mc:AlternateContent xmlns:mc="http://schemas.openxmlformats.org/markup-compatibility/2006">
+        <mc:Choice xmlns:a14="http://schemas.microsoft.com/office/drawing/2010/main" Requires="a14">
+          <p:sp>
+            <p:nvSpPr>
+              <p:cNvPr id="3" name="Content Placeholder 2">
+                <a:extLst>
+                  <a:ext uri="{FF2B5EF4-FFF2-40B4-BE49-F238E27FC236}">
+                    <a16:creationId xmlns:a16="http://schemas.microsoft.com/office/drawing/2014/main" id="{1A8FA9B3-1B32-894B-93C2-F90FB63CBDAA}"/>
+                  </a:ext>
+                </a:extLst>
+              </p:cNvPr>
+              <p:cNvSpPr>
+                <a:spLocks noGrp="1"/>
+              </p:cNvSpPr>
+              <p:nvPr>
+                <p:ph idx="1"/>
+              </p:nvPr>
+            </p:nvSpPr>
+            <p:spPr>
+              <a:xfrm>
+                <a:off x="108754" y="1526771"/>
+                <a:ext cx="3655403" cy="4351338"/>
+              </a:xfrm>
+            </p:spPr>
+            <p:txBody>
+              <a:bodyPr>
+                <a:normAutofit/>
+              </a:bodyPr>
+              <a:lstStyle/>
+              <a:p>
+                <a:pPr>
+                  <a:lnSpc>
+                    <a:spcPct val="100000"/>
+                  </a:lnSpc>
+                </a:pPr>
+                <a:r>
+                  <a:rPr lang="en-US" sz="2200" dirty="0"/>
+                  <a:t>At </a:t>
+                </a:r>
+                <a:r>
+                  <a:rPr lang="en-US" sz="2200" dirty="0">
+                    <a:solidFill>
+                      <a:srgbClr val="C00000"/>
+                    </a:solidFill>
+                  </a:rPr>
+                  <a:t>low RG resolution</a:t>
+                </a:r>
+                <a:r>
+                  <a:rPr lang="en-US" sz="2200" dirty="0"/>
+                  <a:t>, SRCs are suppressed in the potential</a:t>
+                </a:r>
+              </a:p>
+              <a:p>
+                <a:pPr>
+                  <a:lnSpc>
+                    <a:spcPct val="100000"/>
+                  </a:lnSpc>
+                </a:pPr>
+                <a:r>
+                  <a:rPr lang="en-US" sz="2200" dirty="0"/>
+                  <a:t>Consider the ratio of </a:t>
+                </a:r>
+                <a:r>
+                  <a:rPr lang="en-US" sz="2200" baseline="30000" dirty="0">
+                    <a:solidFill>
+                      <a:srgbClr val="C00000"/>
+                    </a:solidFill>
+                  </a:rPr>
+                  <a:t>3</a:t>
+                </a:r>
+                <a:r>
+                  <a:rPr lang="en-US" sz="2200" dirty="0">
+                    <a:solidFill>
+                      <a:srgbClr val="C00000"/>
+                    </a:solidFill>
+                  </a:rPr>
+                  <a:t>S</a:t>
+                </a:r>
+                <a:r>
+                  <a:rPr lang="en-US" sz="2200" baseline="-25000" dirty="0">
+                    <a:solidFill>
+                      <a:srgbClr val="C00000"/>
+                    </a:solidFill>
+                  </a:rPr>
+                  <a:t>1 </a:t>
+                </a:r>
+                <a:r>
+                  <a:rPr lang="en-US" sz="2200" dirty="0"/>
+                  <a:t>to</a:t>
+                </a:r>
+                <a:r>
+                  <a:rPr lang="en-US" sz="2200" baseline="-25000" dirty="0">
+                    <a:solidFill>
+                      <a:srgbClr val="C00000"/>
+                    </a:solidFill>
+                  </a:rPr>
+                  <a:t> </a:t>
+                </a:r>
+                <a:r>
+                  <a:rPr lang="en-US" sz="2200" baseline="30000" dirty="0">
+                    <a:solidFill>
+                      <a:srgbClr val="C00000"/>
+                    </a:solidFill>
+                  </a:rPr>
+                  <a:t>1</a:t>
+                </a:r>
+                <a:r>
+                  <a:rPr lang="en-US" sz="2200" dirty="0">
+                    <a:solidFill>
+                      <a:srgbClr val="C00000"/>
+                    </a:solidFill>
+                  </a:rPr>
+                  <a:t>S</a:t>
+                </a:r>
+                <a:r>
+                  <a:rPr lang="en-US" sz="2200" baseline="-25000" dirty="0">
+                    <a:solidFill>
+                      <a:srgbClr val="C00000"/>
+                    </a:solidFill>
+                  </a:rPr>
+                  <a:t>0</a:t>
+                </a:r>
+                <a:r>
+                  <a:rPr lang="en-US" sz="2200" dirty="0">
+                    <a:solidFill>
+                      <a:srgbClr val="C00000"/>
+                    </a:solidFill>
+                  </a:rPr>
+                  <a:t> </a:t>
+                </a:r>
+                <a:r>
+                  <a:rPr lang="en-US" sz="2200" dirty="0"/>
+                  <a:t>evolved momentum projection operators </a:t>
+                </a:r>
+                <a14:m>
+                  <m:oMath xmlns:m="http://schemas.openxmlformats.org/officeDocument/2006/math">
+                    <m:sSubSup>
+                      <m:sSubSupPr>
+                        <m:ctrlPr>
+                          <a:rPr lang="en-US" sz="2200" i="1">
+                            <a:solidFill>
+                              <a:srgbClr val="C00000"/>
+                            </a:solidFill>
+                            <a:latin typeface="Cambria Math" panose="02040503050406030204" pitchFamily="18" charset="0"/>
+                          </a:rPr>
+                        </m:ctrlPr>
+                      </m:sSubSupPr>
+                      <m:e>
+                        <m:r>
+                          <a:rPr lang="en-US" sz="2200" i="1">
+                            <a:solidFill>
+                              <a:srgbClr val="C00000"/>
+                            </a:solidFill>
+                            <a:latin typeface="Cambria Math" panose="02040503050406030204" pitchFamily="18" charset="0"/>
+                          </a:rPr>
+                          <m:t>𝑎</m:t>
+                        </m:r>
+                      </m:e>
+                      <m:sub>
+                        <m:r>
+                          <a:rPr lang="en-US" sz="2200" i="1">
+                            <a:solidFill>
+                              <a:srgbClr val="C00000"/>
+                            </a:solidFill>
+                            <a:latin typeface="Cambria Math" panose="02040503050406030204" pitchFamily="18" charset="0"/>
+                          </a:rPr>
+                          <m:t>𝑞</m:t>
+                        </m:r>
+                      </m:sub>
+                      <m:sup>
+                        <m:r>
+                          <a:rPr lang="en-US" sz="2200" i="1">
+                            <a:solidFill>
+                              <a:srgbClr val="C00000"/>
+                            </a:solidFill>
+                            <a:latin typeface="Cambria Math" panose="02040503050406030204" pitchFamily="18" charset="0"/>
+                            <a:ea typeface="Cambria Math" panose="02040503050406030204" pitchFamily="18" charset="0"/>
+                          </a:rPr>
+                          <m:t>†</m:t>
+                        </m:r>
+                      </m:sup>
+                    </m:sSubSup>
+                    <m:sSub>
+                      <m:sSubPr>
+                        <m:ctrlPr>
+                          <a:rPr lang="en-US" sz="2200" i="1">
+                            <a:solidFill>
+                              <a:srgbClr val="C00000"/>
+                            </a:solidFill>
+                            <a:latin typeface="Cambria Math" panose="02040503050406030204" pitchFamily="18" charset="0"/>
+                          </a:rPr>
+                        </m:ctrlPr>
+                      </m:sSubPr>
+                      <m:e>
+                        <m:r>
+                          <a:rPr lang="en-US" sz="2200" i="1">
+                            <a:solidFill>
+                              <a:srgbClr val="C00000"/>
+                            </a:solidFill>
+                            <a:latin typeface="Cambria Math" panose="02040503050406030204" pitchFamily="18" charset="0"/>
+                          </a:rPr>
+                          <m:t>𝑎</m:t>
+                        </m:r>
+                      </m:e>
+                      <m:sub>
+                        <m:r>
+                          <a:rPr lang="en-US" sz="2200" i="1">
+                            <a:solidFill>
+                              <a:srgbClr val="C00000"/>
+                            </a:solidFill>
+                            <a:latin typeface="Cambria Math" panose="02040503050406030204" pitchFamily="18" charset="0"/>
+                          </a:rPr>
+                          <m:t>𝑞</m:t>
+                        </m:r>
+                      </m:sub>
+                    </m:sSub>
+                  </m:oMath>
+                </a14:m>
+                <a:endParaRPr lang="en-US" sz="2200" dirty="0">
+                  <a:solidFill>
+                    <a:srgbClr val="C00000"/>
+                  </a:solidFill>
+                </a:endParaRPr>
+              </a:p>
+              <a:p>
+                <a:pPr>
+                  <a:lnSpc>
+                    <a:spcPct val="100000"/>
+                  </a:lnSpc>
+                </a:pPr>
+                <a:r>
+                  <a:rPr lang="en-US" sz="2200" dirty="0">
+                    <a:latin typeface="Arial" panose="020B0604020202020204" pitchFamily="34" charset="0"/>
+                  </a:rPr>
+                  <a:t>Reproduces the characteristics of the cross section ratios with </a:t>
+                </a:r>
+                <a:r>
+                  <a:rPr lang="en-US" sz="2200" dirty="0">
+                    <a:solidFill>
+                      <a:srgbClr val="C00000"/>
+                    </a:solidFill>
+                    <a:latin typeface="Arial" panose="020B0604020202020204" pitchFamily="34" charset="0"/>
+                  </a:rPr>
+                  <a:t>low RG resolution operators</a:t>
+                </a:r>
+              </a:p>
+              <a:p>
+                <a:pPr>
+                  <a:lnSpc>
+                    <a:spcPct val="100000"/>
+                  </a:lnSpc>
+                </a:pPr>
+                <a:endParaRPr lang="en-US" sz="2400" dirty="0">
+                  <a:solidFill>
+                    <a:srgbClr val="C00000"/>
+                  </a:solidFill>
+                </a:endParaRPr>
+              </a:p>
+            </p:txBody>
+          </p:sp>
+        </mc:Choice>
+        <mc:Fallback>
+          <p:sp>
+            <p:nvSpPr>
+              <p:cNvPr id="3" name="Content Placeholder 2">
+                <a:extLst>
+                  <a:ext uri="{FF2B5EF4-FFF2-40B4-BE49-F238E27FC236}">
+                    <a16:creationId xmlns:a16="http://schemas.microsoft.com/office/drawing/2014/main" id="{1A8FA9B3-1B32-894B-93C2-F90FB63CBDAA}"/>
+                  </a:ext>
+                </a:extLst>
+              </p:cNvPr>
+              <p:cNvSpPr>
+                <a:spLocks noGrp="1" noRot="1" noChangeAspect="1" noMove="1" noResize="1" noEditPoints="1" noAdjustHandles="1" noChangeArrowheads="1" noChangeShapeType="1" noTextEdit="1"/>
+              </p:cNvSpPr>
+              <p:nvPr>
+                <p:ph idx="1"/>
+              </p:nvPr>
+            </p:nvSpPr>
+            <p:spPr>
+              <a:xfrm>
+                <a:off x="108754" y="1526771"/>
+                <a:ext cx="3655403" cy="4351338"/>
+              </a:xfrm>
+              <a:blipFill>
+                <a:blip r:embed="rId6"/>
+                <a:stretch>
+                  <a:fillRect l="-2076" t="-875" r="-2768"/>
+                </a:stretch>
+              </a:blipFill>
+            </p:spPr>
+            <p:txBody>
+              <a:bodyPr/>
+              <a:lstStyle/>
+              <a:p>
+                <a:r>
+                  <a:rPr lang="en-US">
+                    <a:noFill/>
+                  </a:rPr>
+                  <a:t> </a:t>
+                </a:r>
+              </a:p>
+            </p:txBody>
+          </p:sp>
+        </mc:Fallback>
+      </mc:AlternateContent>
+      <mc:AlternateContent xmlns:mc="http://schemas.openxmlformats.org/markup-compatibility/2006">
+        <mc:Choice xmlns:a14="http://schemas.microsoft.com/office/drawing/2010/main" Requires="a14">
+          <p:sp>
+            <p:nvSpPr>
+              <p:cNvPr id="33" name="TextBox 32">
+                <a:extLst>
+                  <a:ext uri="{FF2B5EF4-FFF2-40B4-BE49-F238E27FC236}">
+                    <a16:creationId xmlns:a16="http://schemas.microsoft.com/office/drawing/2014/main" id="{C54951A8-9DC2-2941-857B-83193EBC0A64}"/>
+                  </a:ext>
+                </a:extLst>
+              </p:cNvPr>
+              <p:cNvSpPr txBox="1"/>
+              <p:nvPr/>
+            </p:nvSpPr>
+            <p:spPr>
+              <a:xfrm>
+                <a:off x="3978597" y="5450240"/>
+                <a:ext cx="4449248" cy="830997"/>
+              </a:xfrm>
+              <a:prstGeom prst="rect">
+                <a:avLst/>
+              </a:prstGeom>
+              <a:noFill/>
+            </p:spPr>
+            <p:txBody>
+              <a:bodyPr wrap="square" rtlCol="0">
+                <a:spAutoFit/>
+              </a:bodyPr>
+              <a:lstStyle/>
+              <a:p>
+                <a:r>
+                  <a:rPr lang="en-US" sz="1600" dirty="0">
+                    <a:latin typeface="Arial" panose="020B0604020202020204" pitchFamily="34" charset="0"/>
+                    <a:cs typeface="Arial" panose="020B0604020202020204" pitchFamily="34" charset="0"/>
+                  </a:rPr>
+                  <a:t>Fig. 7: Ratio of </a:t>
+                </a:r>
+                <a:r>
+                  <a:rPr lang="en-US" sz="1600" baseline="30000" dirty="0">
+                    <a:latin typeface="Arial" panose="020B0604020202020204" pitchFamily="34" charset="0"/>
+                    <a:cs typeface="Arial" panose="020B0604020202020204" pitchFamily="34" charset="0"/>
+                  </a:rPr>
+                  <a:t>3</a:t>
+                </a:r>
+                <a:r>
+                  <a:rPr lang="en-US" sz="1600" dirty="0">
+                    <a:latin typeface="Arial" panose="020B0604020202020204" pitchFamily="34" charset="0"/>
+                    <a:cs typeface="Arial" panose="020B0604020202020204" pitchFamily="34" charset="0"/>
+                  </a:rPr>
+                  <a:t>S</a:t>
+                </a:r>
+                <a:r>
+                  <a:rPr lang="en-US" sz="1600" baseline="-25000" dirty="0">
+                    <a:latin typeface="Arial" panose="020B0604020202020204" pitchFamily="34" charset="0"/>
+                    <a:cs typeface="Arial" panose="020B0604020202020204" pitchFamily="34" charset="0"/>
+                  </a:rPr>
+                  <a:t>1</a:t>
+                </a:r>
+                <a:r>
+                  <a:rPr lang="en-US" sz="1600" dirty="0">
+                    <a:latin typeface="Arial" panose="020B0604020202020204" pitchFamily="34" charset="0"/>
+                    <a:cs typeface="Arial" panose="020B0604020202020204" pitchFamily="34" charset="0"/>
+                  </a:rPr>
+                  <a:t> to </a:t>
+                </a:r>
+                <a:r>
+                  <a:rPr lang="en-US" sz="1600" baseline="30000" dirty="0">
+                    <a:latin typeface="Arial" panose="020B0604020202020204" pitchFamily="34" charset="0"/>
+                    <a:cs typeface="Arial" panose="020B0604020202020204" pitchFamily="34" charset="0"/>
+                  </a:rPr>
+                  <a:t>1</a:t>
+                </a:r>
+                <a:r>
+                  <a:rPr lang="en-US" sz="1600" dirty="0">
+                    <a:latin typeface="Arial" panose="020B0604020202020204" pitchFamily="34" charset="0"/>
+                    <a:cs typeface="Arial" panose="020B0604020202020204" pitchFamily="34" charset="0"/>
+                  </a:rPr>
+                  <a:t>S</a:t>
+                </a:r>
+                <a:r>
+                  <a:rPr lang="en-US" sz="1600" baseline="-25000" dirty="0">
+                    <a:latin typeface="Arial" panose="020B0604020202020204" pitchFamily="34" charset="0"/>
+                    <a:cs typeface="Arial" panose="020B0604020202020204" pitchFamily="34" charset="0"/>
+                  </a:rPr>
+                  <a:t>0</a:t>
+                </a:r>
+                <a:r>
+                  <a:rPr lang="en-US" sz="1600" dirty="0">
+                    <a:latin typeface="Arial" panose="020B0604020202020204" pitchFamily="34" charset="0"/>
+                    <a:cs typeface="Arial" panose="020B0604020202020204" pitchFamily="34" charset="0"/>
+                  </a:rPr>
+                  <a:t> SRG transformations for low momentum </a:t>
+                </a:r>
+                <a14:m>
+                  <m:oMath xmlns:m="http://schemas.openxmlformats.org/officeDocument/2006/math">
+                    <m:sSub>
+                      <m:sSubPr>
+                        <m:ctrlPr>
+                          <a:rPr lang="en-US" sz="1600" i="1">
+                            <a:latin typeface="Cambria Math" panose="02040503050406030204" pitchFamily="18" charset="0"/>
+                            <a:cs typeface="Arial" panose="020B0604020202020204" pitchFamily="34" charset="0"/>
+                          </a:rPr>
+                        </m:ctrlPr>
+                      </m:sSubPr>
+                      <m:e>
+                        <m:r>
+                          <a:rPr lang="en-US" sz="1600" i="1">
+                            <a:latin typeface="Cambria Math" panose="02040503050406030204" pitchFamily="18" charset="0"/>
+                            <a:cs typeface="Arial" panose="020B0604020202020204" pitchFamily="34" charset="0"/>
+                          </a:rPr>
+                          <m:t>𝑘</m:t>
+                        </m:r>
+                      </m:e>
+                      <m:sub>
+                        <m:r>
+                          <a:rPr lang="en-US" sz="1600" i="1">
+                            <a:latin typeface="Cambria Math" panose="02040503050406030204" pitchFamily="18" charset="0"/>
+                            <a:cs typeface="Arial" panose="020B0604020202020204" pitchFamily="34" charset="0"/>
+                          </a:rPr>
+                          <m:t>0</m:t>
+                        </m:r>
+                      </m:sub>
+                    </m:sSub>
+                  </m:oMath>
+                </a14:m>
+                <a:r>
+                  <a:rPr lang="en-US" sz="1600" dirty="0">
+                    <a:latin typeface="Arial" panose="020B0604020202020204" pitchFamily="34" charset="0"/>
+                    <a:cs typeface="Arial" panose="020B0604020202020204" pitchFamily="34" charset="0"/>
+                  </a:rPr>
+                  <a:t> and high momentum </a:t>
+                </a:r>
+                <a14:m>
+                  <m:oMath xmlns:m="http://schemas.openxmlformats.org/officeDocument/2006/math">
+                    <m:r>
+                      <a:rPr lang="en-US" sz="1600" b="0" i="1" smtClean="0">
+                        <a:latin typeface="Cambria Math" panose="02040503050406030204" pitchFamily="18" charset="0"/>
+                        <a:cs typeface="Arial" panose="020B0604020202020204" pitchFamily="34" charset="0"/>
+                      </a:rPr>
+                      <m:t>𝑞</m:t>
+                    </m:r>
+                  </m:oMath>
+                </a14:m>
+                <a:r>
+                  <a:rPr lang="en-US" sz="1600" dirty="0">
+                    <a:latin typeface="Arial" panose="020B0604020202020204" pitchFamily="34" charset="0"/>
+                    <a:cs typeface="Arial" panose="020B0604020202020204" pitchFamily="34" charset="0"/>
+                  </a:rPr>
+                  <a:t> where </a:t>
+                </a:r>
+                <a14:m>
+                  <m:oMath xmlns:m="http://schemas.openxmlformats.org/officeDocument/2006/math">
+                    <m:r>
+                      <a:rPr lang="en-US" sz="1600" i="1" smtClean="0">
+                        <a:latin typeface="Cambria Math" panose="02040503050406030204" pitchFamily="18" charset="0"/>
+                        <a:ea typeface="Cambria Math" panose="02040503050406030204" pitchFamily="18" charset="0"/>
+                        <a:cs typeface="Arial" panose="020B0604020202020204" pitchFamily="34" charset="0"/>
+                      </a:rPr>
+                      <m:t>𝜆</m:t>
+                    </m:r>
+                    <m:r>
+                      <a:rPr lang="en-US" sz="1600" b="0" i="1" smtClean="0">
+                        <a:latin typeface="Cambria Math" panose="02040503050406030204" pitchFamily="18" charset="0"/>
+                        <a:ea typeface="Cambria Math" panose="02040503050406030204" pitchFamily="18" charset="0"/>
+                        <a:cs typeface="Arial" panose="020B0604020202020204" pitchFamily="34" charset="0"/>
+                      </a:rPr>
+                      <m:t>=1.35</m:t>
+                    </m:r>
+                  </m:oMath>
+                </a14:m>
+                <a:r>
+                  <a:rPr lang="en-US" sz="1600" dirty="0">
+                    <a:latin typeface="Arial" panose="020B0604020202020204" pitchFamily="34" charset="0"/>
+                    <a:cs typeface="Arial" panose="020B0604020202020204" pitchFamily="34" charset="0"/>
+                  </a:rPr>
+                  <a:t> fm</a:t>
+                </a:r>
+                <a:r>
+                  <a:rPr lang="en-US" sz="1600" baseline="30000" dirty="0">
+                    <a:latin typeface="Arial" panose="020B0604020202020204" pitchFamily="34" charset="0"/>
+                    <a:cs typeface="Arial" panose="020B0604020202020204" pitchFamily="34" charset="0"/>
+                  </a:rPr>
+                  <a:t>-1</a:t>
+                </a:r>
+                <a:r>
+                  <a:rPr lang="en-US" sz="1600" dirty="0">
+                    <a:latin typeface="Arial" panose="020B0604020202020204" pitchFamily="34" charset="0"/>
+                    <a:cs typeface="Arial" panose="020B0604020202020204" pitchFamily="34" charset="0"/>
+                  </a:rPr>
+                  <a:t>.</a:t>
+                </a:r>
+              </a:p>
+            </p:txBody>
+          </p:sp>
+        </mc:Choice>
+        <mc:Fallback>
+          <p:sp>
+            <p:nvSpPr>
+              <p:cNvPr id="33" name="TextBox 32">
+                <a:extLst>
+                  <a:ext uri="{FF2B5EF4-FFF2-40B4-BE49-F238E27FC236}">
+                    <a16:creationId xmlns:a16="http://schemas.microsoft.com/office/drawing/2014/main" id="{C54951A8-9DC2-2941-857B-83193EBC0A64}"/>
+                  </a:ext>
+                </a:extLst>
+              </p:cNvPr>
+              <p:cNvSpPr txBox="1">
+                <a:spLocks noRot="1" noChangeAspect="1" noMove="1" noResize="1" noEditPoints="1" noAdjustHandles="1" noChangeArrowheads="1" noChangeShapeType="1" noTextEdit="1"/>
+              </p:cNvSpPr>
+              <p:nvPr/>
+            </p:nvSpPr>
+            <p:spPr>
+              <a:xfrm>
+                <a:off x="3978597" y="5450240"/>
+                <a:ext cx="4449248" cy="830997"/>
+              </a:xfrm>
+              <a:prstGeom prst="rect">
+                <a:avLst/>
+              </a:prstGeom>
+              <a:blipFill>
+                <a:blip r:embed="rId7"/>
+                <a:stretch>
+                  <a:fillRect l="-855" t="-3030" r="-285" b="-9091"/>
+                </a:stretch>
+              </a:blipFill>
+            </p:spPr>
+            <p:txBody>
+              <a:bodyPr/>
+              <a:lstStyle/>
+              <a:p>
+                <a:r>
+                  <a:rPr lang="en-US">
+                    <a:noFill/>
+                  </a:rPr>
+                  <a:t> </a:t>
+                </a:r>
+              </a:p>
+            </p:txBody>
+          </p:sp>
+        </mc:Fallback>
+      </mc:AlternateContent>
     </p:spTree>
     <p:extLst>
       <p:ext uri="{BB962C8B-B14F-4D97-AF65-F5344CB8AC3E}">
@@ -15716,7 +17433,7 @@
                 <a:avLst/>
               </a:prstGeom>
               <a:blipFill>
-                <a:blip r:embed="rId2"/>
+                <a:blip r:embed="rId3"/>
                 <a:stretch>
                   <a:fillRect l="-354" t="-3030" b="-9091"/>
                 </a:stretch>
@@ -15816,7 +17533,7 @@
           <p:nvPr/>
         </p:nvPicPr>
         <p:blipFill>
-          <a:blip r:embed="rId3"/>
+          <a:blip r:embed="rId4"/>
           <a:stretch>
             <a:fillRect/>
           </a:stretch>
@@ -16050,7 +17767,7 @@
           <p:nvPr/>
         </p:nvPicPr>
         <p:blipFill>
-          <a:blip r:embed="rId2"/>
+          <a:blip r:embed="rId3"/>
           <a:stretch>
             <a:fillRect/>
           </a:stretch>
@@ -16865,13 +18582,13 @@
                 </a:solidFill>
                 <a:latin typeface="Arial" panose="020B0604020202020204" pitchFamily="34" charset="0"/>
               </a:rPr>
-              <a:t>SRG formalism</a:t>
+              <a:t>Similarity renormalization group (SRG)</a:t>
             </a:r>
           </a:p>
         </p:txBody>
       </p:sp>
-      <mc:AlternateContent xmlns:mc="http://schemas.openxmlformats.org/markup-compatibility/2006" xmlns:a14="http://schemas.microsoft.com/office/drawing/2010/main">
-        <mc:Choice Requires="a14">
+      <mc:AlternateContent xmlns:mc="http://schemas.openxmlformats.org/markup-compatibility/2006">
+        <mc:Choice xmlns:a14="http://schemas.microsoft.com/office/drawing/2010/main" Requires="a14">
           <p:sp>
             <p:nvSpPr>
               <p:cNvPr id="3" name="Content Placeholder 2">
@@ -16907,7 +18624,7 @@
                   <a:rPr lang="en-US" sz="2600" dirty="0">
                     <a:cs typeface="Arial" panose="020B0604020202020204" pitchFamily="34" charset="0"/>
                   </a:rPr>
-                  <a:t>We use the similarity renormalization group (SRG) to evolve operators to low RG resolution</a:t>
+                  <a:t>Evolve operators to low RG resolution</a:t>
                 </a:r>
               </a:p>
               <a:p>
@@ -17622,7 +19339,7 @@
             </p:txBody>
           </p:sp>
         </mc:Choice>
-        <mc:Fallback xmlns="">
+        <mc:Fallback>
           <p:sp>
             <p:nvSpPr>
               <p:cNvPr id="3" name="Content Placeholder 2">
@@ -17758,15 +19475,20 @@
                 <a:solidFill>
                   <a:srgbClr val="002060"/>
                 </a:solidFill>
-                <a:latin typeface="Arial" panose="020B0604020202020204" pitchFamily="34" charset="0"/>
               </a:rPr>
-              <a:t>SRG formalism</a:t>
-            </a:r>
+              <a:t>Similarity renormalization group (SRG)</a:t>
+            </a:r>
+            <a:endParaRPr lang="en-US" dirty="0">
+              <a:solidFill>
+                <a:srgbClr val="002060"/>
+              </a:solidFill>
+              <a:latin typeface="Arial" panose="020B0604020202020204" pitchFamily="34" charset="0"/>
+            </a:endParaRPr>
           </a:p>
         </p:txBody>
       </p:sp>
-      <mc:AlternateContent xmlns:mc="http://schemas.openxmlformats.org/markup-compatibility/2006" xmlns:a14="http://schemas.microsoft.com/office/drawing/2010/main">
-        <mc:Choice Requires="a14">
+      <mc:AlternateContent xmlns:mc="http://schemas.openxmlformats.org/markup-compatibility/2006">
+        <mc:Choice xmlns:a14="http://schemas.microsoft.com/office/drawing/2010/main" Requires="a14">
           <p:sp>
             <p:nvSpPr>
               <p:cNvPr id="3" name="Content Placeholder 2">
@@ -17802,7 +19524,7 @@
                   <a:rPr lang="en-US" sz="2600" dirty="0">
                     <a:cs typeface="Arial" panose="020B0604020202020204" pitchFamily="34" charset="0"/>
                   </a:rPr>
-                  <a:t>We use the similarity renormalization group (SRG) to evolve operators to low RG resolution</a:t>
+                  <a:t>Evolve operators to low RG resolution</a:t>
                 </a:r>
               </a:p>
               <a:p>
@@ -18579,7 +20301,7 @@
             </p:txBody>
           </p:sp>
         </mc:Choice>
-        <mc:Fallback xmlns="">
+        <mc:Fallback>
           <p:sp>
             <p:nvSpPr>
               <p:cNvPr id="3" name="Content Placeholder 2">
@@ -18604,7 +20326,7 @@
               <a:blipFill>
                 <a:blip r:embed="rId2"/>
                 <a:stretch>
-                  <a:fillRect l="-928" t="-1163" b="-3198"/>
+                  <a:fillRect l="-928" t="-1163"/>
                 </a:stretch>
               </a:blipFill>
             </p:spPr>
@@ -19565,9 +21287,9 @@
           <p:nvPr/>
         </p:nvCxnSpPr>
         <p:spPr>
-          <a:xfrm>
-            <a:off x="3101062" y="3514461"/>
-            <a:ext cx="0" cy="1319048"/>
+          <a:xfrm flipV="1">
+            <a:off x="2712169" y="3657600"/>
+            <a:ext cx="590938" cy="343694"/>
           </a:xfrm>
           <a:prstGeom prst="straightConnector1">
             <a:avLst/>
@@ -19647,7 +21369,7 @@
         </p:nvSpPr>
         <p:spPr>
           <a:xfrm>
-            <a:off x="1803390" y="4001294"/>
+            <a:off x="1545482" y="3837305"/>
             <a:ext cx="1170513" cy="461665"/>
           </a:xfrm>
           <a:prstGeom prst="rect">
@@ -19701,6 +21423,51 @@
           </a:p>
         </p:txBody>
       </p:sp>
+      <p:cxnSp>
+        <p:nvCxnSpPr>
+          <p:cNvPr id="19" name="Straight Arrow Connector 18">
+            <a:extLst>
+              <a:ext uri="{FF2B5EF4-FFF2-40B4-BE49-F238E27FC236}">
+                <a16:creationId xmlns:a16="http://schemas.microsoft.com/office/drawing/2014/main" id="{CC23D02B-66A3-3F4E-8C91-9348A1D281E8}"/>
+              </a:ext>
+            </a:extLst>
+          </p:cNvPr>
+          <p:cNvCxnSpPr>
+            <a:cxnSpLocks/>
+            <a:stCxn id="13" idx="3"/>
+          </p:cNvCxnSpPr>
+          <p:nvPr/>
+        </p:nvCxnSpPr>
+        <p:spPr>
+          <a:xfrm>
+            <a:off x="2715995" y="4068138"/>
+            <a:ext cx="469970" cy="503862"/>
+          </a:xfrm>
+          <a:prstGeom prst="straightConnector1">
+            <a:avLst/>
+          </a:prstGeom>
+          <a:ln w="38100">
+            <a:solidFill>
+              <a:srgbClr val="FF0000"/>
+            </a:solidFill>
+            <a:tailEnd type="triangle"/>
+          </a:ln>
+        </p:spPr>
+        <p:style>
+          <a:lnRef idx="1">
+            <a:schemeClr val="accent1"/>
+          </a:lnRef>
+          <a:fillRef idx="0">
+            <a:schemeClr val="accent1"/>
+          </a:fillRef>
+          <a:effectRef idx="0">
+            <a:schemeClr val="accent1"/>
+          </a:effectRef>
+          <a:fontRef idx="minor">
+            <a:schemeClr val="tx1"/>
+          </a:fontRef>
+        </p:style>
+      </p:cxnSp>
     </p:spTree>
     <p:extLst>
       <p:ext uri="{BB962C8B-B14F-4D97-AF65-F5344CB8AC3E}">

</xml_diff>

<commit_message>
Updating DNP 2020 talk based on SB comments
</commit_message>
<xml_diff>
--- a/Presentations/DNP_October2020/tropiano_dnp_october2020.pptx
+++ b/Presentations/DNP_October2020/tropiano_dnp_october2020.pptx
@@ -225,7 +225,7 @@
             <a:fld id="{0A84EC41-ECD6-7F4B-B508-87B276563826}" type="datetimeFigureOut">
               <a:rPr lang="en-US" smtClean="0"/>
               <a:pPr/>
-              <a:t>10/28/20</a:t>
+              <a:t>10/29/20</a:t>
             </a:fld>
             <a:endParaRPr lang="en-US" dirty="0"/>
           </a:p>
@@ -1757,7 +1757,7 @@
           <a:p>
             <a:fld id="{2F15B853-9033-E54B-8ED3-ACA75527692D}" type="datetime1">
               <a:rPr lang="en-US" smtClean="0"/>
-              <a:t>10/28/20</a:t>
+              <a:t>10/29/20</a:t>
             </a:fld>
             <a:endParaRPr lang="en-US"/>
           </a:p>
@@ -1955,7 +1955,7 @@
           <a:p>
             <a:fld id="{A9285094-3301-894A-B968-9AB7F58AF041}" type="datetime1">
               <a:rPr lang="en-US" smtClean="0"/>
-              <a:t>10/28/20</a:t>
+              <a:t>10/29/20</a:t>
             </a:fld>
             <a:endParaRPr lang="en-US"/>
           </a:p>
@@ -2163,7 +2163,7 @@
           <a:p>
             <a:fld id="{6B308625-4955-8449-821F-C24C954B4CE7}" type="datetime1">
               <a:rPr lang="en-US" smtClean="0"/>
-              <a:t>10/28/20</a:t>
+              <a:t>10/29/20</a:t>
             </a:fld>
             <a:endParaRPr lang="en-US"/>
           </a:p>
@@ -2361,7 +2361,7 @@
           <a:p>
             <a:fld id="{F4339BEE-9082-824F-9FE8-A73B8649373C}" type="datetime1">
               <a:rPr lang="en-US" smtClean="0"/>
-              <a:t>10/28/20</a:t>
+              <a:t>10/29/20</a:t>
             </a:fld>
             <a:endParaRPr lang="en-US"/>
           </a:p>
@@ -2636,7 +2636,7 @@
           <a:p>
             <a:fld id="{0A5BCA3A-B122-CD4B-9E4B-5FC53C67B8A3}" type="datetime1">
               <a:rPr lang="en-US" smtClean="0"/>
-              <a:t>10/28/20</a:t>
+              <a:t>10/29/20</a:t>
             </a:fld>
             <a:endParaRPr lang="en-US"/>
           </a:p>
@@ -2901,7 +2901,7 @@
           <a:p>
             <a:fld id="{E4EAB6FE-AA41-4244-B6ED-DBD0B8C3C94D}" type="datetime1">
               <a:rPr lang="en-US" smtClean="0"/>
-              <a:t>10/28/20</a:t>
+              <a:t>10/29/20</a:t>
             </a:fld>
             <a:endParaRPr lang="en-US"/>
           </a:p>
@@ -3313,7 +3313,7 @@
           <a:p>
             <a:fld id="{0125816F-807B-2B43-B88E-ABC5F6D182F4}" type="datetime1">
               <a:rPr lang="en-US" smtClean="0"/>
-              <a:t>10/28/20</a:t>
+              <a:t>10/29/20</a:t>
             </a:fld>
             <a:endParaRPr lang="en-US"/>
           </a:p>
@@ -3454,7 +3454,7 @@
           <a:p>
             <a:fld id="{FC402AE1-5483-4147-A0B4-4CC8FC31B757}" type="datetime1">
               <a:rPr lang="en-US" smtClean="0"/>
-              <a:t>10/28/20</a:t>
+              <a:t>10/29/20</a:t>
             </a:fld>
             <a:endParaRPr lang="en-US"/>
           </a:p>
@@ -3567,7 +3567,7 @@
           <a:p>
             <a:fld id="{AF6A64FF-219C-7344-A0AC-964997E22DFB}" type="datetime1">
               <a:rPr lang="en-US" smtClean="0"/>
-              <a:t>10/28/20</a:t>
+              <a:t>10/29/20</a:t>
             </a:fld>
             <a:endParaRPr lang="en-US"/>
           </a:p>
@@ -3878,7 +3878,7 @@
           <a:p>
             <a:fld id="{939C6B78-8263-F947-8DCB-C192D73C2A8C}" type="datetime1">
               <a:rPr lang="en-US" smtClean="0"/>
-              <a:t>10/28/20</a:t>
+              <a:t>10/29/20</a:t>
             </a:fld>
             <a:endParaRPr lang="en-US"/>
           </a:p>
@@ -4169,7 +4169,7 @@
           <a:p>
             <a:fld id="{099F02DF-4A6E-4345-8766-CA6FCC3AFB8D}" type="datetime1">
               <a:rPr lang="en-US" smtClean="0"/>
-              <a:t>10/28/20</a:t>
+              <a:t>10/29/20</a:t>
             </a:fld>
             <a:endParaRPr lang="en-US"/>
           </a:p>
@@ -4413,7 +4413,7 @@
           <a:p>
             <a:fld id="{C5E7DC65-9412-614E-9DC9-FC959AFBF189}" type="datetime1">
               <a:rPr lang="en-US" smtClean="0"/>
-              <a:t>10/28/20</a:t>
+              <a:t>10/29/20</a:t>
             </a:fld>
             <a:endParaRPr lang="en-US" dirty="0"/>
           </a:p>
@@ -6255,8 +6255,8 @@
           </a:p>
         </p:txBody>
       </p:sp>
-      <mc:AlternateContent xmlns:mc="http://schemas.openxmlformats.org/markup-compatibility/2006" xmlns:a14="http://schemas.microsoft.com/office/drawing/2010/main">
-        <mc:Choice Requires="a14">
+      <mc:AlternateContent xmlns:mc="http://schemas.openxmlformats.org/markup-compatibility/2006">
+        <mc:Choice xmlns:a14="http://schemas.microsoft.com/office/drawing/2010/main" Requires="a14">
           <p:sp>
             <p:nvSpPr>
               <p:cNvPr id="3" name="Content Placeholder 2">
@@ -6828,7 +6828,7 @@
                       <a:srgbClr val="C00000"/>
                     </a:solidFill>
                   </a:rPr>
-                  <a:t>Mismatch of scales leads to incorrect observable (e.g., theory knock-out cross section compared to experiment)</a:t>
+                  <a:t>Mismatch of scales leads to incorrect observable by an overall scale factor (e.g., theory knock-out cross section compared to experiment)</a:t>
                 </a:r>
               </a:p>
               <a:p>
@@ -6842,7 +6842,7 @@
             </p:txBody>
           </p:sp>
         </mc:Choice>
-        <mc:Fallback xmlns="">
+        <mc:Fallback>
           <p:sp>
             <p:nvSpPr>
               <p:cNvPr id="3" name="Content Placeholder 2">
@@ -6863,7 +6863,7 @@
               <a:blipFill>
                 <a:blip r:embed="rId2"/>
                 <a:stretch>
-                  <a:fillRect l="-965" t="-1163" r="-483"/>
+                  <a:fillRect l="-965" t="-1163"/>
                 </a:stretch>
               </a:blipFill>
             </p:spPr>
@@ -13857,8 +13857,8 @@
           </a:p>
         </p:txBody>
       </p:sp>
-      <mc:AlternateContent xmlns:mc="http://schemas.openxmlformats.org/markup-compatibility/2006">
-        <mc:Choice xmlns:a14="http://schemas.microsoft.com/office/drawing/2010/main" Requires="a14">
+      <mc:AlternateContent xmlns:mc="http://schemas.openxmlformats.org/markup-compatibility/2006" xmlns:a14="http://schemas.microsoft.com/office/drawing/2010/main">
+        <mc:Choice Requires="a14">
           <p:sp>
             <p:nvSpPr>
               <p:cNvPr id="19" name="TextBox 18">
@@ -14052,7 +14052,7 @@
             </p:txBody>
           </p:sp>
         </mc:Choice>
-        <mc:Fallback>
+        <mc:Fallback xmlns="">
           <p:sp>
             <p:nvSpPr>
               <p:cNvPr id="19" name="TextBox 18">
@@ -14369,8 +14369,8 @@
           </a:prstGeom>
         </p:spPr>
       </p:pic>
-      <mc:AlternateContent xmlns:mc="http://schemas.openxmlformats.org/markup-compatibility/2006">
-        <mc:Choice xmlns:a14="http://schemas.microsoft.com/office/drawing/2010/main" Requires="a14">
+      <mc:AlternateContent xmlns:mc="http://schemas.openxmlformats.org/markup-compatibility/2006" xmlns:a14="http://schemas.microsoft.com/office/drawing/2010/main">
+        <mc:Choice Requires="a14">
           <p:sp>
             <p:nvSpPr>
               <p:cNvPr id="4" name="TextBox 3">
@@ -14399,6 +14399,7 @@
               </a:bodyPr>
               <a:lstStyle/>
               <a:p>
+                <a:pPr/>
                 <a14:m>
                   <m:oMathPara xmlns:m="http://schemas.openxmlformats.org/officeDocument/2006/math">
                     <m:oMathParaPr>
@@ -14702,7 +14703,7 @@
             </p:txBody>
           </p:sp>
         </mc:Choice>
-        <mc:Fallback>
+        <mc:Fallback xmlns="">
           <p:sp>
             <p:nvSpPr>
               <p:cNvPr id="4" name="TextBox 3">
@@ -15012,7 +15013,7 @@
                 </a:r>
                 <a:r>
                   <a:rPr lang="en-US" sz="2200" dirty="0"/>
-                  <a:t>, SRCs are suppressed in the potential</a:t>
+                  <a:t>, SRCs are suppressed in the wave function</a:t>
                 </a:r>
               </a:p>
               <a:p>
@@ -15855,8 +15856,8 @@
           </a:fontRef>
         </p:style>
       </p:cxnSp>
-      <mc:AlternateContent xmlns:mc="http://schemas.openxmlformats.org/markup-compatibility/2006">
-        <mc:Choice xmlns:a14="http://schemas.microsoft.com/office/drawing/2010/main" Requires="a14">
+      <mc:AlternateContent xmlns:mc="http://schemas.openxmlformats.org/markup-compatibility/2006" xmlns:a14="http://schemas.microsoft.com/office/drawing/2010/main">
+        <mc:Choice Requires="a14">
           <p:sp>
             <p:nvSpPr>
               <p:cNvPr id="31" name="TextBox 30">
@@ -15885,6 +15886,7 @@
               </a:bodyPr>
               <a:lstStyle/>
               <a:p>
+                <a:pPr/>
                 <a14:m>
                   <m:oMathPara xmlns:m="http://schemas.openxmlformats.org/officeDocument/2006/math">
                     <m:oMathParaPr>
@@ -16188,7 +16190,7 @@
             </p:txBody>
           </p:sp>
         </mc:Choice>
-        <mc:Fallback>
+        <mc:Fallback xmlns="">
           <p:sp>
             <p:nvSpPr>
               <p:cNvPr id="31" name="TextBox 30">
@@ -16334,7 +16336,7 @@
                 </a:r>
                 <a:r>
                   <a:rPr lang="en-US" sz="2200" dirty="0"/>
-                  <a:t>, SRCs are suppressed in the potential</a:t>
+                  <a:t>, SRCs are suppressed in the wave function</a:t>
                 </a:r>
               </a:p>
               <a:p>
@@ -16590,8 +16592,8 @@
           </p:sp>
         </mc:Fallback>
       </mc:AlternateContent>
-      <mc:AlternateContent xmlns:mc="http://schemas.openxmlformats.org/markup-compatibility/2006">
-        <mc:Choice xmlns:a14="http://schemas.microsoft.com/office/drawing/2010/main" Requires="a14">
+      <mc:AlternateContent xmlns:mc="http://schemas.openxmlformats.org/markup-compatibility/2006" xmlns:a14="http://schemas.microsoft.com/office/drawing/2010/main">
+        <mc:Choice Requires="a14">
           <p:sp>
             <p:nvSpPr>
               <p:cNvPr id="33" name="TextBox 32">
@@ -16785,7 +16787,7 @@
             </p:txBody>
           </p:sp>
         </mc:Choice>
-        <mc:Fallback>
+        <mc:Fallback xmlns="">
           <p:sp>
             <p:nvSpPr>
               <p:cNvPr id="33" name="TextBox 32">
@@ -18587,8 +18589,8 @@
           </a:p>
         </p:txBody>
       </p:sp>
-      <mc:AlternateContent xmlns:mc="http://schemas.openxmlformats.org/markup-compatibility/2006">
-        <mc:Choice xmlns:a14="http://schemas.microsoft.com/office/drawing/2010/main" Requires="a14">
+      <mc:AlternateContent xmlns:mc="http://schemas.openxmlformats.org/markup-compatibility/2006" xmlns:a14="http://schemas.microsoft.com/office/drawing/2010/main">
+        <mc:Choice Requires="a14">
           <p:sp>
             <p:nvSpPr>
               <p:cNvPr id="3" name="Content Placeholder 2">
@@ -19339,7 +19341,7 @@
             </p:txBody>
           </p:sp>
         </mc:Choice>
-        <mc:Fallback>
+        <mc:Fallback xmlns="">
           <p:sp>
             <p:nvSpPr>
               <p:cNvPr id="3" name="Content Placeholder 2">
@@ -19487,8 +19489,8 @@
           </a:p>
         </p:txBody>
       </p:sp>
-      <mc:AlternateContent xmlns:mc="http://schemas.openxmlformats.org/markup-compatibility/2006">
-        <mc:Choice xmlns:a14="http://schemas.microsoft.com/office/drawing/2010/main" Requires="a14">
+      <mc:AlternateContent xmlns:mc="http://schemas.openxmlformats.org/markup-compatibility/2006" xmlns:a14="http://schemas.microsoft.com/office/drawing/2010/main">
+        <mc:Choice Requires="a14">
           <p:sp>
             <p:nvSpPr>
               <p:cNvPr id="3" name="Content Placeholder 2">
@@ -20301,7 +20303,7 @@
             </p:txBody>
           </p:sp>
         </mc:Choice>
-        <mc:Fallback>
+        <mc:Fallback xmlns="">
           <p:sp>
             <p:nvSpPr>
               <p:cNvPr id="3" name="Content Placeholder 2">
@@ -22835,8 +22837,8 @@
         </p:nvSpPr>
         <p:spPr>
           <a:xfrm>
-            <a:off x="8967729" y="2258458"/>
-            <a:ext cx="3062689" cy="2995454"/>
+            <a:off x="8967729" y="2167245"/>
+            <a:ext cx="3107040" cy="3642391"/>
           </a:xfrm>
           <a:prstGeom prst="rect">
             <a:avLst/>
@@ -23199,6 +23201,58 @@
               <a:t>9</a:t>
             </a:fld>
             <a:endParaRPr lang="en-US" dirty="0"/>
+          </a:p>
+        </p:txBody>
+      </p:sp>
+      <p:sp>
+        <p:nvSpPr>
+          <p:cNvPr id="7" name="Rectangle 6">
+            <a:extLst>
+              <a:ext uri="{FF2B5EF4-FFF2-40B4-BE49-F238E27FC236}">
+                <a16:creationId xmlns:a16="http://schemas.microsoft.com/office/drawing/2014/main" id="{188FBB0F-6E99-5A45-8686-938993C0A350}"/>
+              </a:ext>
+            </a:extLst>
+          </p:cNvPr>
+          <p:cNvSpPr/>
+          <p:nvPr/>
+        </p:nvSpPr>
+        <p:spPr>
+          <a:xfrm>
+            <a:off x="8862646" y="5333079"/>
+            <a:ext cx="211016" cy="176767"/>
+          </a:xfrm>
+          <a:prstGeom prst="rect">
+            <a:avLst/>
+          </a:prstGeom>
+          <a:solidFill>
+            <a:schemeClr val="bg1"/>
+          </a:solidFill>
+          <a:ln>
+            <a:noFill/>
+          </a:ln>
+        </p:spPr>
+        <p:style>
+          <a:lnRef idx="2">
+            <a:schemeClr val="accent1">
+              <a:shade val="50000"/>
+            </a:schemeClr>
+          </a:lnRef>
+          <a:fillRef idx="1">
+            <a:schemeClr val="accent1"/>
+          </a:fillRef>
+          <a:effectRef idx="0">
+            <a:schemeClr val="accent1"/>
+          </a:effectRef>
+          <a:fontRef idx="minor">
+            <a:schemeClr val="lt1"/>
+          </a:fontRef>
+        </p:style>
+        <p:txBody>
+          <a:bodyPr rtlCol="0" anchor="ctr"/>
+          <a:lstStyle/>
+          <a:p>
+            <a:pPr algn="ctr"/>
+            <a:endParaRPr lang="en-US"/>
           </a:p>
         </p:txBody>
       </p:sp>

</xml_diff>

<commit_message>
Final updates to DNP 2020 talk
</commit_message>
<xml_diff>
--- a/Presentations/DNP_October2020/tropiano_dnp_october2020.pptx
+++ b/Presentations/DNP_October2020/tropiano_dnp_october2020.pptx
@@ -225,7 +225,7 @@
             <a:fld id="{0A84EC41-ECD6-7F4B-B508-87B276563826}" type="datetimeFigureOut">
               <a:rPr lang="en-US" smtClean="0"/>
               <a:pPr/>
-              <a:t>10/29/20</a:t>
+              <a:t>10/30/20</a:t>
             </a:fld>
             <a:endParaRPr lang="en-US" dirty="0"/>
           </a:p>
@@ -748,15 +748,18 @@
           <a:bodyPr/>
           <a:lstStyle/>
           <a:p>
-            <a:endParaRPr lang="en-US" sz="1200" b="0" i="0" kern="1200" dirty="0">
-              <a:solidFill>
-                <a:schemeClr val="tx1"/>
-              </a:solidFill>
-              <a:effectLst/>
-              <a:latin typeface="Arial" panose="020B0604020202020204" pitchFamily="34" charset="0"/>
-              <a:ea typeface="+mn-ea"/>
-              <a:cs typeface="+mn-cs"/>
-            </a:endParaRPr>
+            <a:r>
+              <a:rPr lang="en-US" sz="1200" b="0" i="0" kern="1200" dirty="0">
+                <a:solidFill>
+                  <a:schemeClr val="tx1"/>
+                </a:solidFill>
+                <a:effectLst/>
+                <a:latin typeface="Arial" panose="020B0604020202020204" pitchFamily="34" charset="0"/>
+                <a:ea typeface="+mn-ea"/>
+                <a:cs typeface="+mn-cs"/>
+              </a:rPr>
+              <a:t>Save last bullet for main takeaway.</a:t>
+            </a:r>
           </a:p>
         </p:txBody>
       </p:sp>
@@ -1189,7 +1192,15 @@
           <a:p>
             <a:r>
               <a:rPr lang="en-US" dirty="0"/>
-              <a:t>Where does the SRC physics go? Use this as transition into next slide.</a:t>
+              <a:t>Also make sure you say AV18 lies on top of </a:t>
+            </a:r>
+            <a:r>
+              <a:rPr lang="en-US" dirty="0" err="1"/>
+              <a:t>Gezerlis</a:t>
+            </a:r>
+            <a:r>
+              <a:rPr lang="en-US" dirty="0"/>
+              <a:t>. Where does the SRC physics go? Use this as transition into next slide.</a:t>
             </a:r>
           </a:p>
         </p:txBody>
@@ -1757,7 +1768,7 @@
           <a:p>
             <a:fld id="{2F15B853-9033-E54B-8ED3-ACA75527692D}" type="datetime1">
               <a:rPr lang="en-US" smtClean="0"/>
-              <a:t>10/29/20</a:t>
+              <a:t>10/30/20</a:t>
             </a:fld>
             <a:endParaRPr lang="en-US"/>
           </a:p>
@@ -1955,7 +1966,7 @@
           <a:p>
             <a:fld id="{A9285094-3301-894A-B968-9AB7F58AF041}" type="datetime1">
               <a:rPr lang="en-US" smtClean="0"/>
-              <a:t>10/29/20</a:t>
+              <a:t>10/30/20</a:t>
             </a:fld>
             <a:endParaRPr lang="en-US"/>
           </a:p>
@@ -2163,7 +2174,7 @@
           <a:p>
             <a:fld id="{6B308625-4955-8449-821F-C24C954B4CE7}" type="datetime1">
               <a:rPr lang="en-US" smtClean="0"/>
-              <a:t>10/29/20</a:t>
+              <a:t>10/30/20</a:t>
             </a:fld>
             <a:endParaRPr lang="en-US"/>
           </a:p>
@@ -2361,7 +2372,7 @@
           <a:p>
             <a:fld id="{F4339BEE-9082-824F-9FE8-A73B8649373C}" type="datetime1">
               <a:rPr lang="en-US" smtClean="0"/>
-              <a:t>10/29/20</a:t>
+              <a:t>10/30/20</a:t>
             </a:fld>
             <a:endParaRPr lang="en-US"/>
           </a:p>
@@ -2636,7 +2647,7 @@
           <a:p>
             <a:fld id="{0A5BCA3A-B122-CD4B-9E4B-5FC53C67B8A3}" type="datetime1">
               <a:rPr lang="en-US" smtClean="0"/>
-              <a:t>10/29/20</a:t>
+              <a:t>10/30/20</a:t>
             </a:fld>
             <a:endParaRPr lang="en-US"/>
           </a:p>
@@ -2901,7 +2912,7 @@
           <a:p>
             <a:fld id="{E4EAB6FE-AA41-4244-B6ED-DBD0B8C3C94D}" type="datetime1">
               <a:rPr lang="en-US" smtClean="0"/>
-              <a:t>10/29/20</a:t>
+              <a:t>10/30/20</a:t>
             </a:fld>
             <a:endParaRPr lang="en-US"/>
           </a:p>
@@ -3313,7 +3324,7 @@
           <a:p>
             <a:fld id="{0125816F-807B-2B43-B88E-ABC5F6D182F4}" type="datetime1">
               <a:rPr lang="en-US" smtClean="0"/>
-              <a:t>10/29/20</a:t>
+              <a:t>10/30/20</a:t>
             </a:fld>
             <a:endParaRPr lang="en-US"/>
           </a:p>
@@ -3454,7 +3465,7 @@
           <a:p>
             <a:fld id="{FC402AE1-5483-4147-A0B4-4CC8FC31B757}" type="datetime1">
               <a:rPr lang="en-US" smtClean="0"/>
-              <a:t>10/29/20</a:t>
+              <a:t>10/30/20</a:t>
             </a:fld>
             <a:endParaRPr lang="en-US"/>
           </a:p>
@@ -3567,7 +3578,7 @@
           <a:p>
             <a:fld id="{AF6A64FF-219C-7344-A0AC-964997E22DFB}" type="datetime1">
               <a:rPr lang="en-US" smtClean="0"/>
-              <a:t>10/29/20</a:t>
+              <a:t>10/30/20</a:t>
             </a:fld>
             <a:endParaRPr lang="en-US"/>
           </a:p>
@@ -3878,7 +3889,7 @@
           <a:p>
             <a:fld id="{939C6B78-8263-F947-8DCB-C192D73C2A8C}" type="datetime1">
               <a:rPr lang="en-US" smtClean="0"/>
-              <a:t>10/29/20</a:t>
+              <a:t>10/30/20</a:t>
             </a:fld>
             <a:endParaRPr lang="en-US"/>
           </a:p>
@@ -4169,7 +4180,7 @@
           <a:p>
             <a:fld id="{099F02DF-4A6E-4345-8766-CA6FCC3AFB8D}" type="datetime1">
               <a:rPr lang="en-US" smtClean="0"/>
-              <a:t>10/29/20</a:t>
+              <a:t>10/30/20</a:t>
             </a:fld>
             <a:endParaRPr lang="en-US"/>
           </a:p>
@@ -4413,7 +4424,7 @@
           <a:p>
             <a:fld id="{C5E7DC65-9412-614E-9DC9-FC959AFBF189}" type="datetime1">
               <a:rPr lang="en-US" smtClean="0"/>
-              <a:t>10/29/20</a:t>
+              <a:t>10/30/20</a:t>
             </a:fld>
             <a:endParaRPr lang="en-US" dirty="0"/>
           </a:p>
@@ -14800,8 +14811,8 @@
           </a:p>
         </p:txBody>
       </p:sp>
-      <mc:AlternateContent xmlns:mc="http://schemas.openxmlformats.org/markup-compatibility/2006" xmlns:a14="http://schemas.microsoft.com/office/drawing/2010/main">
-        <mc:Choice Requires="a14">
+      <mc:AlternateContent xmlns:mc="http://schemas.openxmlformats.org/markup-compatibility/2006">
+        <mc:Choice xmlns:a14="http://schemas.microsoft.com/office/drawing/2010/main" Requires="a14">
           <p:sp>
             <p:nvSpPr>
               <p:cNvPr id="20" name="Content Placeholder 2">
@@ -14819,7 +14830,7 @@
             <p:spPr>
               <a:xfrm>
                 <a:off x="108754" y="1526771"/>
-                <a:ext cx="3655403" cy="4351338"/>
+                <a:ext cx="3749040" cy="4351338"/>
               </a:xfrm>
               <a:prstGeom prst="rect">
                 <a:avLst/>
@@ -15191,7 +15202,7 @@
             </p:txBody>
           </p:sp>
         </mc:Choice>
-        <mc:Fallback xmlns="">
+        <mc:Fallback>
           <p:sp>
             <p:nvSpPr>
               <p:cNvPr id="20" name="Content Placeholder 2">
@@ -15209,7 +15220,7 @@
             <p:spPr>
               <a:xfrm>
                 <a:off x="108754" y="1526771"/>
-                <a:ext cx="3655403" cy="4351338"/>
+                <a:ext cx="3749040" cy="4351338"/>
               </a:xfrm>
               <a:prstGeom prst="rect">
                 <a:avLst/>
@@ -15217,7 +15228,7 @@
               <a:blipFill>
                 <a:blip r:embed="rId7"/>
                 <a:stretch>
-                  <a:fillRect l="-2076" t="-875" r="-2768"/>
+                  <a:fillRect l="-2027" t="-875" r="-338"/>
                 </a:stretch>
               </a:blipFill>
             </p:spPr>
@@ -16287,311 +16298,118 @@
           </a:p>
         </p:txBody>
       </p:sp>
-      <mc:AlternateContent xmlns:mc="http://schemas.openxmlformats.org/markup-compatibility/2006" xmlns:a14="http://schemas.microsoft.com/office/drawing/2010/main">
-        <mc:Choice Requires="a14">
-          <p:sp>
-            <p:nvSpPr>
-              <p:cNvPr id="3" name="Content Placeholder 2">
-                <a:extLst>
-                  <a:ext uri="{FF2B5EF4-FFF2-40B4-BE49-F238E27FC236}">
-                    <a16:creationId xmlns:a16="http://schemas.microsoft.com/office/drawing/2014/main" id="{1A8FA9B3-1B32-894B-93C2-F90FB63CBDAA}"/>
-                  </a:ext>
-                </a:extLst>
-              </p:cNvPr>
-              <p:cNvSpPr>
-                <a:spLocks noGrp="1"/>
-              </p:cNvSpPr>
-              <p:nvPr>
-                <p:ph idx="1"/>
-              </p:nvPr>
-            </p:nvSpPr>
-            <p:spPr>
-              <a:xfrm>
-                <a:off x="108754" y="1526771"/>
-                <a:ext cx="3655403" cy="4351338"/>
-              </a:xfrm>
-            </p:spPr>
-            <p:txBody>
-              <a:bodyPr>
-                <a:normAutofit/>
-              </a:bodyPr>
-              <a:lstStyle/>
-              <a:p>
-                <a:pPr>
-                  <a:lnSpc>
-                    <a:spcPct val="100000"/>
-                  </a:lnSpc>
-                </a:pPr>
-                <a:r>
-                  <a:rPr lang="en-US" sz="2200" dirty="0"/>
-                  <a:t>At </a:t>
-                </a:r>
-                <a:r>
-                  <a:rPr lang="en-US" sz="2200" dirty="0">
-                    <a:solidFill>
-                      <a:srgbClr val="C00000"/>
-                    </a:solidFill>
-                  </a:rPr>
-                  <a:t>low RG resolution</a:t>
-                </a:r>
-                <a:r>
-                  <a:rPr lang="en-US" sz="2200" dirty="0"/>
-                  <a:t>, SRCs are suppressed in the wave function</a:t>
-                </a:r>
-              </a:p>
-              <a:p>
-                <a:pPr>
-                  <a:lnSpc>
-                    <a:spcPct val="100000"/>
-                  </a:lnSpc>
-                </a:pPr>
-                <a:r>
-                  <a:rPr lang="en-US" sz="2200" dirty="0"/>
-                  <a:t>Consider the ratio of </a:t>
-                </a:r>
-                <a:r>
-                  <a:rPr lang="en-US" sz="2200" baseline="30000" dirty="0">
-                    <a:solidFill>
-                      <a:srgbClr val="C00000"/>
-                    </a:solidFill>
-                  </a:rPr>
-                  <a:t>3</a:t>
-                </a:r>
-                <a:r>
-                  <a:rPr lang="en-US" sz="2200" dirty="0">
-                    <a:solidFill>
-                      <a:srgbClr val="C00000"/>
-                    </a:solidFill>
-                  </a:rPr>
-                  <a:t>S</a:t>
-                </a:r>
-                <a:r>
-                  <a:rPr lang="en-US" sz="2200" baseline="-25000" dirty="0">
-                    <a:solidFill>
-                      <a:srgbClr val="C00000"/>
-                    </a:solidFill>
-                  </a:rPr>
-                  <a:t>1 </a:t>
-                </a:r>
-                <a:r>
-                  <a:rPr lang="en-US" sz="2200" dirty="0"/>
-                  <a:t>to</a:t>
-                </a:r>
-                <a:r>
-                  <a:rPr lang="en-US" sz="2200" baseline="-25000" dirty="0">
-                    <a:solidFill>
-                      <a:srgbClr val="C00000"/>
-                    </a:solidFill>
-                  </a:rPr>
-                  <a:t> </a:t>
-                </a:r>
-                <a:r>
-                  <a:rPr lang="en-US" sz="2200" baseline="30000" dirty="0">
-                    <a:solidFill>
-                      <a:srgbClr val="C00000"/>
-                    </a:solidFill>
-                  </a:rPr>
-                  <a:t>1</a:t>
-                </a:r>
-                <a:r>
-                  <a:rPr lang="en-US" sz="2200" dirty="0">
-                    <a:solidFill>
-                      <a:srgbClr val="C00000"/>
-                    </a:solidFill>
-                  </a:rPr>
-                  <a:t>S</a:t>
-                </a:r>
-                <a:r>
-                  <a:rPr lang="en-US" sz="2200" baseline="-25000" dirty="0">
-                    <a:solidFill>
-                      <a:srgbClr val="C00000"/>
-                    </a:solidFill>
-                  </a:rPr>
-                  <a:t>0</a:t>
-                </a:r>
-                <a:r>
-                  <a:rPr lang="en-US" sz="2200" dirty="0">
-                    <a:solidFill>
-                      <a:srgbClr val="C00000"/>
-                    </a:solidFill>
-                  </a:rPr>
-                  <a:t> </a:t>
-                </a:r>
-                <a:r>
-                  <a:rPr lang="en-US" sz="2200" dirty="0"/>
-                  <a:t>evolved momentum projection operators </a:t>
-                </a:r>
-                <a14:m>
-                  <m:oMath xmlns:m="http://schemas.openxmlformats.org/officeDocument/2006/math">
-                    <m:sSubSup>
-                      <m:sSubSupPr>
-                        <m:ctrlPr>
-                          <a:rPr lang="en-US" sz="2200" i="1">
-                            <a:solidFill>
-                              <a:srgbClr val="C00000"/>
-                            </a:solidFill>
-                            <a:latin typeface="Cambria Math" panose="02040503050406030204" pitchFamily="18" charset="0"/>
-                          </a:rPr>
-                        </m:ctrlPr>
-                      </m:sSubSupPr>
-                      <m:e>
-                        <m:r>
-                          <a:rPr lang="en-US" sz="2200" i="1">
-                            <a:solidFill>
-                              <a:srgbClr val="C00000"/>
-                            </a:solidFill>
-                            <a:latin typeface="Cambria Math" panose="02040503050406030204" pitchFamily="18" charset="0"/>
-                          </a:rPr>
-                          <m:t>𝑎</m:t>
-                        </m:r>
-                      </m:e>
-                      <m:sub>
-                        <m:r>
-                          <a:rPr lang="en-US" sz="2200" i="1">
-                            <a:solidFill>
-                              <a:srgbClr val="C00000"/>
-                            </a:solidFill>
-                            <a:latin typeface="Cambria Math" panose="02040503050406030204" pitchFamily="18" charset="0"/>
-                          </a:rPr>
-                          <m:t>𝑞</m:t>
-                        </m:r>
-                      </m:sub>
-                      <m:sup>
-                        <m:r>
-                          <a:rPr lang="en-US" sz="2200" i="1">
-                            <a:solidFill>
-                              <a:srgbClr val="C00000"/>
-                            </a:solidFill>
-                            <a:latin typeface="Cambria Math" panose="02040503050406030204" pitchFamily="18" charset="0"/>
-                            <a:ea typeface="Cambria Math" panose="02040503050406030204" pitchFamily="18" charset="0"/>
-                          </a:rPr>
-                          <m:t>†</m:t>
-                        </m:r>
-                      </m:sup>
-                    </m:sSubSup>
-                    <m:sSub>
-                      <m:sSubPr>
-                        <m:ctrlPr>
-                          <a:rPr lang="en-US" sz="2200" i="1">
-                            <a:solidFill>
-                              <a:srgbClr val="C00000"/>
-                            </a:solidFill>
-                            <a:latin typeface="Cambria Math" panose="02040503050406030204" pitchFamily="18" charset="0"/>
-                          </a:rPr>
-                        </m:ctrlPr>
-                      </m:sSubPr>
-                      <m:e>
-                        <m:r>
-                          <a:rPr lang="en-US" sz="2200" i="1">
-                            <a:solidFill>
-                              <a:srgbClr val="C00000"/>
-                            </a:solidFill>
-                            <a:latin typeface="Cambria Math" panose="02040503050406030204" pitchFamily="18" charset="0"/>
-                          </a:rPr>
-                          <m:t>𝑎</m:t>
-                        </m:r>
-                      </m:e>
-                      <m:sub>
-                        <m:r>
-                          <a:rPr lang="en-US" sz="2200" i="1">
-                            <a:solidFill>
-                              <a:srgbClr val="C00000"/>
-                            </a:solidFill>
-                            <a:latin typeface="Cambria Math" panose="02040503050406030204" pitchFamily="18" charset="0"/>
-                          </a:rPr>
-                          <m:t>𝑞</m:t>
-                        </m:r>
-                      </m:sub>
-                    </m:sSub>
-                  </m:oMath>
-                </a14:m>
-                <a:endParaRPr lang="en-US" sz="2200" dirty="0">
-                  <a:solidFill>
-                    <a:srgbClr val="C00000"/>
-                  </a:solidFill>
-                </a:endParaRPr>
-              </a:p>
-              <a:p>
-                <a:pPr>
-                  <a:lnSpc>
-                    <a:spcPct val="100000"/>
-                  </a:lnSpc>
-                </a:pPr>
-                <a:r>
-                  <a:rPr lang="en-US" sz="2200" dirty="0">
-                    <a:latin typeface="Arial" panose="020B0604020202020204" pitchFamily="34" charset="0"/>
-                  </a:rPr>
-                  <a:t>Reproduces the characteristics of the cross section ratios with </a:t>
-                </a:r>
-                <a:r>
-                  <a:rPr lang="en-US" sz="2200" dirty="0">
-                    <a:solidFill>
-                      <a:srgbClr val="C00000"/>
-                    </a:solidFill>
-                    <a:latin typeface="Arial" panose="020B0604020202020204" pitchFamily="34" charset="0"/>
-                  </a:rPr>
-                  <a:t>low RG resolution operators</a:t>
-                </a:r>
-              </a:p>
-              <a:p>
-                <a:pPr>
-                  <a:lnSpc>
-                    <a:spcPct val="100000"/>
-                  </a:lnSpc>
-                </a:pPr>
-                <a:endParaRPr lang="en-US" sz="2400" dirty="0">
-                  <a:solidFill>
-                    <a:srgbClr val="C00000"/>
-                  </a:solidFill>
-                </a:endParaRPr>
-              </a:p>
-            </p:txBody>
-          </p:sp>
-        </mc:Choice>
-        <mc:Fallback xmlns="">
-          <p:sp>
-            <p:nvSpPr>
-              <p:cNvPr id="3" name="Content Placeholder 2">
-                <a:extLst>
-                  <a:ext uri="{FF2B5EF4-FFF2-40B4-BE49-F238E27FC236}">
-                    <a16:creationId xmlns:a16="http://schemas.microsoft.com/office/drawing/2014/main" id="{1A8FA9B3-1B32-894B-93C2-F90FB63CBDAA}"/>
-                  </a:ext>
-                </a:extLst>
-              </p:cNvPr>
-              <p:cNvSpPr>
-                <a:spLocks noGrp="1" noRot="1" noChangeAspect="1" noMove="1" noResize="1" noEditPoints="1" noAdjustHandles="1" noChangeArrowheads="1" noChangeShapeType="1" noTextEdit="1"/>
-              </p:cNvSpPr>
-              <p:nvPr>
-                <p:ph idx="1"/>
-              </p:nvPr>
-            </p:nvSpPr>
-            <p:spPr>
-              <a:xfrm>
-                <a:off x="108754" y="1526771"/>
-                <a:ext cx="3655403" cy="4351338"/>
-              </a:xfrm>
-              <a:blipFill>
-                <a:blip r:embed="rId6"/>
-                <a:stretch>
-                  <a:fillRect l="-2076" t="-875" r="-2768"/>
-                </a:stretch>
-              </a:blipFill>
-            </p:spPr>
-            <p:txBody>
-              <a:bodyPr/>
-              <a:lstStyle/>
-              <a:p>
-                <a:r>
-                  <a:rPr lang="en-US">
-                    <a:noFill/>
-                  </a:rPr>
-                  <a:t> </a:t>
-                </a:r>
-              </a:p>
-            </p:txBody>
-          </p:sp>
-        </mc:Fallback>
-      </mc:AlternateContent>
+      <p:sp>
+        <p:nvSpPr>
+          <p:cNvPr id="3" name="Content Placeholder 2">
+            <a:extLst>
+              <a:ext uri="{FF2B5EF4-FFF2-40B4-BE49-F238E27FC236}">
+                <a16:creationId xmlns:a16="http://schemas.microsoft.com/office/drawing/2014/main" id="{1A8FA9B3-1B32-894B-93C2-F90FB63CBDAA}"/>
+              </a:ext>
+            </a:extLst>
+          </p:cNvPr>
+          <p:cNvSpPr>
+            <a:spLocks noGrp="1"/>
+          </p:cNvSpPr>
+          <p:nvPr>
+            <p:ph idx="1"/>
+          </p:nvPr>
+        </p:nvSpPr>
+        <p:spPr>
+          <a:xfrm>
+            <a:off x="108754" y="1526771"/>
+            <a:ext cx="3749040" cy="4351338"/>
+          </a:xfrm>
+        </p:spPr>
+        <p:txBody>
+          <a:bodyPr>
+            <a:normAutofit/>
+          </a:bodyPr>
+          <a:lstStyle/>
+          <a:p>
+            <a:pPr>
+              <a:lnSpc>
+                <a:spcPct val="100000"/>
+              </a:lnSpc>
+            </a:pPr>
+            <a:r>
+              <a:rPr lang="en-US" sz="2200" dirty="0">
+                <a:latin typeface="Arial" panose="020B0604020202020204" pitchFamily="34" charset="0"/>
+              </a:rPr>
+              <a:t>Reproduces the characteristics of the cross section ratios with </a:t>
+            </a:r>
+            <a:r>
+              <a:rPr lang="en-US" sz="2200" dirty="0">
+                <a:solidFill>
+                  <a:srgbClr val="C00000"/>
+                </a:solidFill>
+                <a:latin typeface="Arial" panose="020B0604020202020204" pitchFamily="34" charset="0"/>
+              </a:rPr>
+              <a:t>low RG resolution operators</a:t>
+            </a:r>
+          </a:p>
+          <a:p>
+            <a:pPr>
+              <a:lnSpc>
+                <a:spcPct val="100000"/>
+              </a:lnSpc>
+            </a:pPr>
+            <a:r>
+              <a:rPr lang="en-US" sz="2200" dirty="0"/>
+              <a:t>Can calculate pair momentum distributions in nuclei using </a:t>
+            </a:r>
+            <a:r>
+              <a:rPr lang="en-US" sz="2200" dirty="0">
+                <a:solidFill>
+                  <a:srgbClr val="C00000"/>
+                </a:solidFill>
+              </a:rPr>
+              <a:t>simple evolved operators</a:t>
+            </a:r>
+            <a:r>
+              <a:rPr lang="en-US" sz="2200" dirty="0"/>
+              <a:t> with </a:t>
+            </a:r>
+            <a:r>
+              <a:rPr lang="en-US" sz="2200" dirty="0">
+                <a:solidFill>
+                  <a:srgbClr val="C00000"/>
+                </a:solidFill>
+              </a:rPr>
+              <a:t>soft nuclear wave functions</a:t>
+            </a:r>
+            <a:r>
+              <a:rPr lang="en-US" sz="2200" dirty="0"/>
+              <a:t> and </a:t>
+            </a:r>
+            <a:r>
+              <a:rPr lang="en-US" sz="2200" dirty="0">
+                <a:solidFill>
+                  <a:srgbClr val="C00000"/>
+                </a:solidFill>
+              </a:rPr>
+              <a:t>local density approximation (LDA)</a:t>
+            </a:r>
+            <a:endParaRPr lang="en-US" sz="2200" dirty="0">
+              <a:solidFill>
+                <a:srgbClr val="C00000"/>
+              </a:solidFill>
+              <a:latin typeface="Arial" panose="020B0604020202020204" pitchFamily="34" charset="0"/>
+            </a:endParaRPr>
+          </a:p>
+          <a:p>
+            <a:pPr>
+              <a:lnSpc>
+                <a:spcPct val="100000"/>
+              </a:lnSpc>
+            </a:pPr>
+            <a:endParaRPr lang="en-US" sz="2400" dirty="0">
+              <a:solidFill>
+                <a:srgbClr val="C00000"/>
+              </a:solidFill>
+            </a:endParaRPr>
+          </a:p>
+        </p:txBody>
+      </p:sp>
       <mc:AlternateContent xmlns:mc="http://schemas.openxmlformats.org/markup-compatibility/2006" xmlns:a14="http://schemas.microsoft.com/office/drawing/2010/main">
         <mc:Choice Requires="a14">
           <p:sp>
@@ -17114,7 +16932,7 @@
                   <a:srgbClr val="C00000"/>
                 </a:solidFill>
               </a:rPr>
-              <a:t>Calculate pair distributions in nuclei (N=Z, N&gt;Z) using local density approximation</a:t>
+              <a:t>Calculate pair distributions in nuclei (N=Z, N&gt;Z) using LDA</a:t>
             </a:r>
           </a:p>
           <a:p>

</xml_diff>

<commit_message>
Updating to final draft
</commit_message>
<xml_diff>
--- a/Presentations/DNP_October2020/tropiano_dnp_october2020.pptx
+++ b/Presentations/DNP_October2020/tropiano_dnp_october2020.pptx
@@ -225,7 +225,7 @@
             <a:fld id="{0A84EC41-ECD6-7F4B-B508-87B276563826}" type="datetimeFigureOut">
               <a:rPr lang="en-US" smtClean="0"/>
               <a:pPr/>
-              <a:t>10/30/20</a:t>
+              <a:t>11/1/20</a:t>
             </a:fld>
             <a:endParaRPr lang="en-US" dirty="0"/>
           </a:p>
@@ -1768,7 +1768,7 @@
           <a:p>
             <a:fld id="{2F15B853-9033-E54B-8ED3-ACA75527692D}" type="datetime1">
               <a:rPr lang="en-US" smtClean="0"/>
-              <a:t>10/30/20</a:t>
+              <a:t>11/1/20</a:t>
             </a:fld>
             <a:endParaRPr lang="en-US"/>
           </a:p>
@@ -1966,7 +1966,7 @@
           <a:p>
             <a:fld id="{A9285094-3301-894A-B968-9AB7F58AF041}" type="datetime1">
               <a:rPr lang="en-US" smtClean="0"/>
-              <a:t>10/30/20</a:t>
+              <a:t>11/1/20</a:t>
             </a:fld>
             <a:endParaRPr lang="en-US"/>
           </a:p>
@@ -2174,7 +2174,7 @@
           <a:p>
             <a:fld id="{6B308625-4955-8449-821F-C24C954B4CE7}" type="datetime1">
               <a:rPr lang="en-US" smtClean="0"/>
-              <a:t>10/30/20</a:t>
+              <a:t>11/1/20</a:t>
             </a:fld>
             <a:endParaRPr lang="en-US"/>
           </a:p>
@@ -2372,7 +2372,7 @@
           <a:p>
             <a:fld id="{F4339BEE-9082-824F-9FE8-A73B8649373C}" type="datetime1">
               <a:rPr lang="en-US" smtClean="0"/>
-              <a:t>10/30/20</a:t>
+              <a:t>11/1/20</a:t>
             </a:fld>
             <a:endParaRPr lang="en-US"/>
           </a:p>
@@ -2647,7 +2647,7 @@
           <a:p>
             <a:fld id="{0A5BCA3A-B122-CD4B-9E4B-5FC53C67B8A3}" type="datetime1">
               <a:rPr lang="en-US" smtClean="0"/>
-              <a:t>10/30/20</a:t>
+              <a:t>11/1/20</a:t>
             </a:fld>
             <a:endParaRPr lang="en-US"/>
           </a:p>
@@ -2912,7 +2912,7 @@
           <a:p>
             <a:fld id="{E4EAB6FE-AA41-4244-B6ED-DBD0B8C3C94D}" type="datetime1">
               <a:rPr lang="en-US" smtClean="0"/>
-              <a:t>10/30/20</a:t>
+              <a:t>11/1/20</a:t>
             </a:fld>
             <a:endParaRPr lang="en-US"/>
           </a:p>
@@ -3324,7 +3324,7 @@
           <a:p>
             <a:fld id="{0125816F-807B-2B43-B88E-ABC5F6D182F4}" type="datetime1">
               <a:rPr lang="en-US" smtClean="0"/>
-              <a:t>10/30/20</a:t>
+              <a:t>11/1/20</a:t>
             </a:fld>
             <a:endParaRPr lang="en-US"/>
           </a:p>
@@ -3465,7 +3465,7 @@
           <a:p>
             <a:fld id="{FC402AE1-5483-4147-A0B4-4CC8FC31B757}" type="datetime1">
               <a:rPr lang="en-US" smtClean="0"/>
-              <a:t>10/30/20</a:t>
+              <a:t>11/1/20</a:t>
             </a:fld>
             <a:endParaRPr lang="en-US"/>
           </a:p>
@@ -3578,7 +3578,7 @@
           <a:p>
             <a:fld id="{AF6A64FF-219C-7344-A0AC-964997E22DFB}" type="datetime1">
               <a:rPr lang="en-US" smtClean="0"/>
-              <a:t>10/30/20</a:t>
+              <a:t>11/1/20</a:t>
             </a:fld>
             <a:endParaRPr lang="en-US"/>
           </a:p>
@@ -3889,7 +3889,7 @@
           <a:p>
             <a:fld id="{939C6B78-8263-F947-8DCB-C192D73C2A8C}" type="datetime1">
               <a:rPr lang="en-US" smtClean="0"/>
-              <a:t>10/30/20</a:t>
+              <a:t>11/1/20</a:t>
             </a:fld>
             <a:endParaRPr lang="en-US"/>
           </a:p>
@@ -4180,7 +4180,7 @@
           <a:p>
             <a:fld id="{099F02DF-4A6E-4345-8766-CA6FCC3AFB8D}" type="datetime1">
               <a:rPr lang="en-US" smtClean="0"/>
-              <a:t>10/30/20</a:t>
+              <a:t>11/1/20</a:t>
             </a:fld>
             <a:endParaRPr lang="en-US"/>
           </a:p>
@@ -4424,7 +4424,7 @@
           <a:p>
             <a:fld id="{C5E7DC65-9412-614E-9DC9-FC959AFBF189}" type="datetime1">
               <a:rPr lang="en-US" smtClean="0"/>
-              <a:t>10/30/20</a:t>
+              <a:t>11/1/20</a:t>
             </a:fld>
             <a:endParaRPr lang="en-US" dirty="0"/>
           </a:p>
@@ -14811,8 +14811,8 @@
           </a:p>
         </p:txBody>
       </p:sp>
-      <mc:AlternateContent xmlns:mc="http://schemas.openxmlformats.org/markup-compatibility/2006">
-        <mc:Choice xmlns:a14="http://schemas.microsoft.com/office/drawing/2010/main" Requires="a14">
+      <mc:AlternateContent xmlns:mc="http://schemas.openxmlformats.org/markup-compatibility/2006" xmlns:a14="http://schemas.microsoft.com/office/drawing/2010/main">
+        <mc:Choice Requires="a14">
           <p:sp>
             <p:nvSpPr>
               <p:cNvPr id="20" name="Content Placeholder 2">
@@ -15202,7 +15202,7 @@
             </p:txBody>
           </p:sp>
         </mc:Choice>
-        <mc:Fallback>
+        <mc:Fallback xmlns="">
           <p:sp>
             <p:nvSpPr>
               <p:cNvPr id="20" name="Content Placeholder 2">
@@ -22894,7 +22894,7 @@
                 <a:latin typeface="Arial" panose="020B0604020202020204" pitchFamily="34" charset="0"/>
                 <a:cs typeface="Arial" panose="020B0604020202020204" pitchFamily="34" charset="0"/>
               </a:rPr>
-              <a:t>, et al., Phys. Rev. C </a:t>
+              <a:t> et al., Phys. Rev. C </a:t>
             </a:r>
             <a:r>
               <a:rPr lang="en-US" sz="1600" b="1" dirty="0">

</xml_diff>

<commit_message>
Updating high-q SNMD tails figures and adding to APS presentation
</commit_message>
<xml_diff>
--- a/Presentations/DNP_October2020/tropiano_dnp_october2020.pptx
+++ b/Presentations/DNP_October2020/tropiano_dnp_october2020.pptx
@@ -225,7 +225,7 @@
             <a:fld id="{0A84EC41-ECD6-7F4B-B508-87B276563826}" type="datetimeFigureOut">
               <a:rPr lang="en-US" smtClean="0"/>
               <a:pPr/>
-              <a:t>11/1/20</a:t>
+              <a:t>4/14/2021</a:t>
             </a:fld>
             <a:endParaRPr lang="en-US" dirty="0"/>
           </a:p>
@@ -1768,7 +1768,7 @@
           <a:p>
             <a:fld id="{2F15B853-9033-E54B-8ED3-ACA75527692D}" type="datetime1">
               <a:rPr lang="en-US" smtClean="0"/>
-              <a:t>11/1/20</a:t>
+              <a:t>4/14/2021</a:t>
             </a:fld>
             <a:endParaRPr lang="en-US"/>
           </a:p>
@@ -1966,7 +1966,7 @@
           <a:p>
             <a:fld id="{A9285094-3301-894A-B968-9AB7F58AF041}" type="datetime1">
               <a:rPr lang="en-US" smtClean="0"/>
-              <a:t>11/1/20</a:t>
+              <a:t>4/14/2021</a:t>
             </a:fld>
             <a:endParaRPr lang="en-US"/>
           </a:p>
@@ -2174,7 +2174,7 @@
           <a:p>
             <a:fld id="{6B308625-4955-8449-821F-C24C954B4CE7}" type="datetime1">
               <a:rPr lang="en-US" smtClean="0"/>
-              <a:t>11/1/20</a:t>
+              <a:t>4/14/2021</a:t>
             </a:fld>
             <a:endParaRPr lang="en-US"/>
           </a:p>
@@ -2372,7 +2372,7 @@
           <a:p>
             <a:fld id="{F4339BEE-9082-824F-9FE8-A73B8649373C}" type="datetime1">
               <a:rPr lang="en-US" smtClean="0"/>
-              <a:t>11/1/20</a:t>
+              <a:t>4/14/2021</a:t>
             </a:fld>
             <a:endParaRPr lang="en-US"/>
           </a:p>
@@ -2647,7 +2647,7 @@
           <a:p>
             <a:fld id="{0A5BCA3A-B122-CD4B-9E4B-5FC53C67B8A3}" type="datetime1">
               <a:rPr lang="en-US" smtClean="0"/>
-              <a:t>11/1/20</a:t>
+              <a:t>4/14/2021</a:t>
             </a:fld>
             <a:endParaRPr lang="en-US"/>
           </a:p>
@@ -2912,7 +2912,7 @@
           <a:p>
             <a:fld id="{E4EAB6FE-AA41-4244-B6ED-DBD0B8C3C94D}" type="datetime1">
               <a:rPr lang="en-US" smtClean="0"/>
-              <a:t>11/1/20</a:t>
+              <a:t>4/14/2021</a:t>
             </a:fld>
             <a:endParaRPr lang="en-US"/>
           </a:p>
@@ -3324,7 +3324,7 @@
           <a:p>
             <a:fld id="{0125816F-807B-2B43-B88E-ABC5F6D182F4}" type="datetime1">
               <a:rPr lang="en-US" smtClean="0"/>
-              <a:t>11/1/20</a:t>
+              <a:t>4/14/2021</a:t>
             </a:fld>
             <a:endParaRPr lang="en-US"/>
           </a:p>
@@ -3465,7 +3465,7 @@
           <a:p>
             <a:fld id="{FC402AE1-5483-4147-A0B4-4CC8FC31B757}" type="datetime1">
               <a:rPr lang="en-US" smtClean="0"/>
-              <a:t>11/1/20</a:t>
+              <a:t>4/14/2021</a:t>
             </a:fld>
             <a:endParaRPr lang="en-US"/>
           </a:p>
@@ -3578,7 +3578,7 @@
           <a:p>
             <a:fld id="{AF6A64FF-219C-7344-A0AC-964997E22DFB}" type="datetime1">
               <a:rPr lang="en-US" smtClean="0"/>
-              <a:t>11/1/20</a:t>
+              <a:t>4/14/2021</a:t>
             </a:fld>
             <a:endParaRPr lang="en-US"/>
           </a:p>
@@ -3889,7 +3889,7 @@
           <a:p>
             <a:fld id="{939C6B78-8263-F947-8DCB-C192D73C2A8C}" type="datetime1">
               <a:rPr lang="en-US" smtClean="0"/>
-              <a:t>11/1/20</a:t>
+              <a:t>4/14/2021</a:t>
             </a:fld>
             <a:endParaRPr lang="en-US"/>
           </a:p>
@@ -4180,7 +4180,7 @@
           <a:p>
             <a:fld id="{099F02DF-4A6E-4345-8766-CA6FCC3AFB8D}" type="datetime1">
               <a:rPr lang="en-US" smtClean="0"/>
-              <a:t>11/1/20</a:t>
+              <a:t>4/14/2021</a:t>
             </a:fld>
             <a:endParaRPr lang="en-US"/>
           </a:p>
@@ -4424,7 +4424,7 @@
           <a:p>
             <a:fld id="{C5E7DC65-9412-614E-9DC9-FC959AFBF189}" type="datetime1">
               <a:rPr lang="en-US" smtClean="0"/>
-              <a:t>11/1/20</a:t>
+              <a:t>4/14/2021</a:t>
             </a:fld>
             <a:endParaRPr lang="en-US" dirty="0"/>
           </a:p>

</xml_diff>